<commit_message>
made some improvements to my slides
</commit_message>
<xml_diff>
--- a/storyq/Behaviour-Driven Development.pptx
+++ b/storyq/Behaviour-Driven Development.pptx
@@ -5,19 +5,23 @@
     <p:sldMasterId id="2147483648" r:id="rId1"/>
   </p:sldMasterIdLst>
   <p:notesMasterIdLst>
-    <p:notesMasterId r:id="rId12"/>
+    <p:notesMasterId r:id="rId16"/>
   </p:notesMasterIdLst>
   <p:sldIdLst>
     <p:sldId id="256" r:id="rId2"/>
     <p:sldId id="258" r:id="rId3"/>
     <p:sldId id="257" r:id="rId4"/>
-    <p:sldId id="263" r:id="rId5"/>
-    <p:sldId id="260" r:id="rId6"/>
-    <p:sldId id="264" r:id="rId7"/>
-    <p:sldId id="265" r:id="rId8"/>
-    <p:sldId id="268" r:id="rId9"/>
-    <p:sldId id="266" r:id="rId10"/>
-    <p:sldId id="267" r:id="rId11"/>
+    <p:sldId id="269" r:id="rId5"/>
+    <p:sldId id="270" r:id="rId6"/>
+    <p:sldId id="263" r:id="rId7"/>
+    <p:sldId id="271" r:id="rId8"/>
+    <p:sldId id="260" r:id="rId9"/>
+    <p:sldId id="264" r:id="rId10"/>
+    <p:sldId id="265" r:id="rId11"/>
+    <p:sldId id="268" r:id="rId12"/>
+    <p:sldId id="266" r:id="rId13"/>
+    <p:sldId id="267" r:id="rId14"/>
+    <p:sldId id="272" r:id="rId15"/>
   </p:sldIdLst>
   <p:sldSz cx="9144000" cy="6858000" type="screen4x3"/>
   <p:notesSz cx="6858000" cy="9144000"/>
@@ -119,6 +123,2243 @@
 </p:presentation>
 </file>
 
+<file path=ppt/diagrams/colors1.xml><?xml version="1.0" encoding="utf-8"?>
+<dgm:colorsDef xmlns:dgm="http://schemas.openxmlformats.org/drawingml/2006/diagram" xmlns:a="http://schemas.openxmlformats.org/drawingml/2006/main" uniqueId="urn:microsoft.com/office/officeart/2005/8/colors/accent1_2">
+  <dgm:title val=""/>
+  <dgm:desc val=""/>
+  <dgm:catLst>
+    <dgm:cat type="accent1" pri="11200"/>
+  </dgm:catLst>
+  <dgm:styleLbl name="node0">
+    <dgm:fillClrLst meth="repeat">
+      <a:schemeClr val="accent1"/>
+    </dgm:fillClrLst>
+    <dgm:linClrLst meth="repeat">
+      <a:schemeClr val="lt1"/>
+    </dgm:linClrLst>
+    <dgm:effectClrLst/>
+    <dgm:txLinClrLst/>
+    <dgm:txFillClrLst/>
+    <dgm:txEffectClrLst/>
+  </dgm:styleLbl>
+  <dgm:styleLbl name="alignNode1">
+    <dgm:fillClrLst meth="repeat">
+      <a:schemeClr val="accent1"/>
+    </dgm:fillClrLst>
+    <dgm:linClrLst meth="repeat">
+      <a:schemeClr val="accent1"/>
+    </dgm:linClrLst>
+    <dgm:effectClrLst/>
+    <dgm:txLinClrLst/>
+    <dgm:txFillClrLst/>
+    <dgm:txEffectClrLst/>
+  </dgm:styleLbl>
+  <dgm:styleLbl name="node1">
+    <dgm:fillClrLst meth="repeat">
+      <a:schemeClr val="accent1"/>
+    </dgm:fillClrLst>
+    <dgm:linClrLst meth="repeat">
+      <a:schemeClr val="lt1"/>
+    </dgm:linClrLst>
+    <dgm:effectClrLst/>
+    <dgm:txLinClrLst/>
+    <dgm:txFillClrLst/>
+    <dgm:txEffectClrLst/>
+  </dgm:styleLbl>
+  <dgm:styleLbl name="lnNode1">
+    <dgm:fillClrLst meth="repeat">
+      <a:schemeClr val="accent1"/>
+    </dgm:fillClrLst>
+    <dgm:linClrLst meth="repeat">
+      <a:schemeClr val="lt1"/>
+    </dgm:linClrLst>
+    <dgm:effectClrLst/>
+    <dgm:txLinClrLst/>
+    <dgm:txFillClrLst/>
+    <dgm:txEffectClrLst/>
+  </dgm:styleLbl>
+  <dgm:styleLbl name="vennNode1">
+    <dgm:fillClrLst meth="repeat">
+      <a:schemeClr val="accent1">
+        <a:alpha val="50000"/>
+      </a:schemeClr>
+    </dgm:fillClrLst>
+    <dgm:linClrLst meth="repeat">
+      <a:schemeClr val="lt1"/>
+    </dgm:linClrLst>
+    <dgm:effectClrLst/>
+    <dgm:txLinClrLst/>
+    <dgm:txFillClrLst/>
+    <dgm:txEffectClrLst/>
+  </dgm:styleLbl>
+  <dgm:styleLbl name="node2">
+    <dgm:fillClrLst meth="repeat">
+      <a:schemeClr val="accent1"/>
+    </dgm:fillClrLst>
+    <dgm:linClrLst meth="repeat">
+      <a:schemeClr val="lt1"/>
+    </dgm:linClrLst>
+    <dgm:effectClrLst/>
+    <dgm:txLinClrLst/>
+    <dgm:txFillClrLst/>
+    <dgm:txEffectClrLst/>
+  </dgm:styleLbl>
+  <dgm:styleLbl name="node3">
+    <dgm:fillClrLst meth="repeat">
+      <a:schemeClr val="accent1"/>
+    </dgm:fillClrLst>
+    <dgm:linClrLst meth="repeat">
+      <a:schemeClr val="lt1"/>
+    </dgm:linClrLst>
+    <dgm:effectClrLst/>
+    <dgm:txLinClrLst/>
+    <dgm:txFillClrLst/>
+    <dgm:txEffectClrLst/>
+  </dgm:styleLbl>
+  <dgm:styleLbl name="node4">
+    <dgm:fillClrLst meth="repeat">
+      <a:schemeClr val="accent1"/>
+    </dgm:fillClrLst>
+    <dgm:linClrLst meth="repeat">
+      <a:schemeClr val="lt1"/>
+    </dgm:linClrLst>
+    <dgm:effectClrLst/>
+    <dgm:txLinClrLst/>
+    <dgm:txFillClrLst/>
+    <dgm:txEffectClrLst/>
+  </dgm:styleLbl>
+  <dgm:styleLbl name="fgImgPlace1">
+    <dgm:fillClrLst meth="repeat">
+      <a:schemeClr val="accent1">
+        <a:tint val="50000"/>
+      </a:schemeClr>
+    </dgm:fillClrLst>
+    <dgm:linClrLst meth="repeat">
+      <a:schemeClr val="lt1"/>
+    </dgm:linClrLst>
+    <dgm:effectClrLst/>
+    <dgm:txLinClrLst/>
+    <dgm:txFillClrLst meth="repeat">
+      <a:schemeClr val="lt1"/>
+    </dgm:txFillClrLst>
+    <dgm:txEffectClrLst/>
+  </dgm:styleLbl>
+  <dgm:styleLbl name="alignImgPlace1">
+    <dgm:fillClrLst meth="repeat">
+      <a:schemeClr val="accent1">
+        <a:tint val="50000"/>
+      </a:schemeClr>
+    </dgm:fillClrLst>
+    <dgm:linClrLst meth="repeat">
+      <a:schemeClr val="lt1"/>
+    </dgm:linClrLst>
+    <dgm:effectClrLst/>
+    <dgm:txLinClrLst/>
+    <dgm:txFillClrLst meth="repeat">
+      <a:schemeClr val="lt1"/>
+    </dgm:txFillClrLst>
+    <dgm:txEffectClrLst/>
+  </dgm:styleLbl>
+  <dgm:styleLbl name="bgImgPlace1">
+    <dgm:fillClrLst meth="repeat">
+      <a:schemeClr val="accent1">
+        <a:tint val="50000"/>
+      </a:schemeClr>
+    </dgm:fillClrLst>
+    <dgm:linClrLst meth="repeat">
+      <a:schemeClr val="lt1"/>
+    </dgm:linClrLst>
+    <dgm:effectClrLst/>
+    <dgm:txLinClrLst/>
+    <dgm:txFillClrLst meth="repeat">
+      <a:schemeClr val="lt1"/>
+    </dgm:txFillClrLst>
+    <dgm:txEffectClrLst/>
+  </dgm:styleLbl>
+  <dgm:styleLbl name="sibTrans2D1">
+    <dgm:fillClrLst meth="repeat">
+      <a:schemeClr val="accent1">
+        <a:tint val="60000"/>
+      </a:schemeClr>
+    </dgm:fillClrLst>
+    <dgm:linClrLst meth="repeat">
+      <a:schemeClr val="accent1">
+        <a:tint val="60000"/>
+      </a:schemeClr>
+    </dgm:linClrLst>
+    <dgm:effectClrLst/>
+    <dgm:txLinClrLst/>
+    <dgm:txFillClrLst/>
+    <dgm:txEffectClrLst/>
+  </dgm:styleLbl>
+  <dgm:styleLbl name="fgSibTrans2D1">
+    <dgm:fillClrLst meth="repeat">
+      <a:schemeClr val="accent1">
+        <a:tint val="60000"/>
+      </a:schemeClr>
+    </dgm:fillClrLst>
+    <dgm:linClrLst meth="repeat">
+      <a:schemeClr val="accent1">
+        <a:tint val="60000"/>
+      </a:schemeClr>
+    </dgm:linClrLst>
+    <dgm:effectClrLst/>
+    <dgm:txLinClrLst/>
+    <dgm:txFillClrLst/>
+    <dgm:txEffectClrLst/>
+  </dgm:styleLbl>
+  <dgm:styleLbl name="bgSibTrans2D1">
+    <dgm:fillClrLst meth="repeat">
+      <a:schemeClr val="accent1">
+        <a:tint val="60000"/>
+      </a:schemeClr>
+    </dgm:fillClrLst>
+    <dgm:linClrLst meth="repeat">
+      <a:schemeClr val="accent1">
+        <a:tint val="60000"/>
+      </a:schemeClr>
+    </dgm:linClrLst>
+    <dgm:effectClrLst/>
+    <dgm:txLinClrLst/>
+    <dgm:txFillClrLst/>
+    <dgm:txEffectClrLst/>
+  </dgm:styleLbl>
+  <dgm:styleLbl name="sibTrans1D1">
+    <dgm:fillClrLst meth="repeat">
+      <a:schemeClr val="accent1"/>
+    </dgm:fillClrLst>
+    <dgm:linClrLst meth="repeat">
+      <a:schemeClr val="accent1"/>
+    </dgm:linClrLst>
+    <dgm:effectClrLst/>
+    <dgm:txLinClrLst/>
+    <dgm:txFillClrLst meth="repeat">
+      <a:schemeClr val="tx1"/>
+    </dgm:txFillClrLst>
+    <dgm:txEffectClrLst/>
+  </dgm:styleLbl>
+  <dgm:styleLbl name="callout">
+    <dgm:fillClrLst meth="repeat">
+      <a:schemeClr val="accent1"/>
+    </dgm:fillClrLst>
+    <dgm:linClrLst meth="repeat">
+      <a:schemeClr val="accent1">
+        <a:tint val="50000"/>
+      </a:schemeClr>
+    </dgm:linClrLst>
+    <dgm:effectClrLst/>
+    <dgm:txLinClrLst/>
+    <dgm:txFillClrLst meth="repeat">
+      <a:schemeClr val="tx1"/>
+    </dgm:txFillClrLst>
+    <dgm:txEffectClrLst/>
+  </dgm:styleLbl>
+  <dgm:styleLbl name="asst0">
+    <dgm:fillClrLst meth="repeat">
+      <a:schemeClr val="accent1"/>
+    </dgm:fillClrLst>
+    <dgm:linClrLst meth="repeat">
+      <a:schemeClr val="lt1"/>
+    </dgm:linClrLst>
+    <dgm:effectClrLst/>
+    <dgm:txLinClrLst/>
+    <dgm:txFillClrLst/>
+    <dgm:txEffectClrLst/>
+  </dgm:styleLbl>
+  <dgm:styleLbl name="asst1">
+    <dgm:fillClrLst meth="repeat">
+      <a:schemeClr val="accent1"/>
+    </dgm:fillClrLst>
+    <dgm:linClrLst meth="repeat">
+      <a:schemeClr val="lt1"/>
+    </dgm:linClrLst>
+    <dgm:effectClrLst/>
+    <dgm:txLinClrLst/>
+    <dgm:txFillClrLst/>
+    <dgm:txEffectClrLst/>
+  </dgm:styleLbl>
+  <dgm:styleLbl name="asst2">
+    <dgm:fillClrLst meth="repeat">
+      <a:schemeClr val="accent1"/>
+    </dgm:fillClrLst>
+    <dgm:linClrLst meth="repeat">
+      <a:schemeClr val="lt1"/>
+    </dgm:linClrLst>
+    <dgm:effectClrLst/>
+    <dgm:txLinClrLst/>
+    <dgm:txFillClrLst/>
+    <dgm:txEffectClrLst/>
+  </dgm:styleLbl>
+  <dgm:styleLbl name="asst3">
+    <dgm:fillClrLst meth="repeat">
+      <a:schemeClr val="accent1"/>
+    </dgm:fillClrLst>
+    <dgm:linClrLst meth="repeat">
+      <a:schemeClr val="lt1"/>
+    </dgm:linClrLst>
+    <dgm:effectClrLst/>
+    <dgm:txLinClrLst/>
+    <dgm:txFillClrLst/>
+    <dgm:txEffectClrLst/>
+  </dgm:styleLbl>
+  <dgm:styleLbl name="asst4">
+    <dgm:fillClrLst meth="repeat">
+      <a:schemeClr val="accent1"/>
+    </dgm:fillClrLst>
+    <dgm:linClrLst meth="repeat">
+      <a:schemeClr val="lt1"/>
+    </dgm:linClrLst>
+    <dgm:effectClrLst/>
+    <dgm:txLinClrLst/>
+    <dgm:txFillClrLst/>
+    <dgm:txEffectClrLst/>
+  </dgm:styleLbl>
+  <dgm:styleLbl name="parChTrans2D1">
+    <dgm:fillClrLst meth="repeat">
+      <a:schemeClr val="accent1">
+        <a:tint val="60000"/>
+      </a:schemeClr>
+    </dgm:fillClrLst>
+    <dgm:linClrLst meth="repeat">
+      <a:schemeClr val="accent1">
+        <a:tint val="60000"/>
+      </a:schemeClr>
+    </dgm:linClrLst>
+    <dgm:effectClrLst/>
+    <dgm:txLinClrLst/>
+    <dgm:txFillClrLst meth="repeat">
+      <a:schemeClr val="lt1"/>
+    </dgm:txFillClrLst>
+    <dgm:txEffectClrLst/>
+  </dgm:styleLbl>
+  <dgm:styleLbl name="parChTrans2D2">
+    <dgm:fillClrLst meth="repeat">
+      <a:schemeClr val="accent1"/>
+    </dgm:fillClrLst>
+    <dgm:linClrLst meth="repeat">
+      <a:schemeClr val="accent1"/>
+    </dgm:linClrLst>
+    <dgm:effectClrLst/>
+    <dgm:txLinClrLst/>
+    <dgm:txFillClrLst meth="repeat">
+      <a:schemeClr val="lt1"/>
+    </dgm:txFillClrLst>
+    <dgm:txEffectClrLst/>
+  </dgm:styleLbl>
+  <dgm:styleLbl name="parChTrans2D3">
+    <dgm:fillClrLst meth="repeat">
+      <a:schemeClr val="accent1"/>
+    </dgm:fillClrLst>
+    <dgm:linClrLst meth="repeat">
+      <a:schemeClr val="accent1"/>
+    </dgm:linClrLst>
+    <dgm:effectClrLst/>
+    <dgm:txLinClrLst/>
+    <dgm:txFillClrLst meth="repeat">
+      <a:schemeClr val="lt1"/>
+    </dgm:txFillClrLst>
+    <dgm:txEffectClrLst/>
+  </dgm:styleLbl>
+  <dgm:styleLbl name="parChTrans2D4">
+    <dgm:fillClrLst meth="repeat">
+      <a:schemeClr val="accent1"/>
+    </dgm:fillClrLst>
+    <dgm:linClrLst meth="repeat">
+      <a:schemeClr val="accent1"/>
+    </dgm:linClrLst>
+    <dgm:effectClrLst/>
+    <dgm:txLinClrLst/>
+    <dgm:txFillClrLst meth="repeat">
+      <a:schemeClr val="lt1"/>
+    </dgm:txFillClrLst>
+    <dgm:txEffectClrLst/>
+  </dgm:styleLbl>
+  <dgm:styleLbl name="parChTrans1D1">
+    <dgm:fillClrLst meth="repeat">
+      <a:schemeClr val="accent1"/>
+    </dgm:fillClrLst>
+    <dgm:linClrLst meth="repeat">
+      <a:schemeClr val="accent1">
+        <a:shade val="60000"/>
+      </a:schemeClr>
+    </dgm:linClrLst>
+    <dgm:effectClrLst/>
+    <dgm:txLinClrLst/>
+    <dgm:txFillClrLst meth="repeat">
+      <a:schemeClr val="tx1"/>
+    </dgm:txFillClrLst>
+    <dgm:txEffectClrLst/>
+  </dgm:styleLbl>
+  <dgm:styleLbl name="parChTrans1D2">
+    <dgm:fillClrLst meth="repeat">
+      <a:schemeClr val="accent1"/>
+    </dgm:fillClrLst>
+    <dgm:linClrLst meth="repeat">
+      <a:schemeClr val="accent1">
+        <a:shade val="60000"/>
+      </a:schemeClr>
+    </dgm:linClrLst>
+    <dgm:effectClrLst/>
+    <dgm:txLinClrLst/>
+    <dgm:txFillClrLst meth="repeat">
+      <a:schemeClr val="tx1"/>
+    </dgm:txFillClrLst>
+    <dgm:txEffectClrLst/>
+  </dgm:styleLbl>
+  <dgm:styleLbl name="parChTrans1D3">
+    <dgm:fillClrLst meth="repeat">
+      <a:schemeClr val="accent1"/>
+    </dgm:fillClrLst>
+    <dgm:linClrLst meth="repeat">
+      <a:schemeClr val="accent1">
+        <a:shade val="80000"/>
+      </a:schemeClr>
+    </dgm:linClrLst>
+    <dgm:effectClrLst/>
+    <dgm:txLinClrLst/>
+    <dgm:txFillClrLst meth="repeat">
+      <a:schemeClr val="tx1"/>
+    </dgm:txFillClrLst>
+    <dgm:txEffectClrLst/>
+  </dgm:styleLbl>
+  <dgm:styleLbl name="parChTrans1D4">
+    <dgm:fillClrLst meth="repeat">
+      <a:schemeClr val="accent1"/>
+    </dgm:fillClrLst>
+    <dgm:linClrLst meth="repeat">
+      <a:schemeClr val="accent1">
+        <a:shade val="80000"/>
+      </a:schemeClr>
+    </dgm:linClrLst>
+    <dgm:effectClrLst/>
+    <dgm:txLinClrLst/>
+    <dgm:txFillClrLst meth="repeat">
+      <a:schemeClr val="tx1"/>
+    </dgm:txFillClrLst>
+    <dgm:txEffectClrLst/>
+  </dgm:styleLbl>
+  <dgm:styleLbl name="fgAcc1">
+    <dgm:fillClrLst meth="repeat">
+      <a:schemeClr val="lt1">
+        <a:alpha val="90000"/>
+      </a:schemeClr>
+    </dgm:fillClrLst>
+    <dgm:linClrLst meth="repeat">
+      <a:schemeClr val="accent1"/>
+    </dgm:linClrLst>
+    <dgm:effectClrLst/>
+    <dgm:txLinClrLst/>
+    <dgm:txFillClrLst meth="repeat">
+      <a:schemeClr val="dk1"/>
+    </dgm:txFillClrLst>
+    <dgm:txEffectClrLst/>
+  </dgm:styleLbl>
+  <dgm:styleLbl name="conFgAcc1">
+    <dgm:fillClrLst meth="repeat">
+      <a:schemeClr val="lt1">
+        <a:alpha val="90000"/>
+      </a:schemeClr>
+    </dgm:fillClrLst>
+    <dgm:linClrLst meth="repeat">
+      <a:schemeClr val="accent1"/>
+    </dgm:linClrLst>
+    <dgm:effectClrLst/>
+    <dgm:txLinClrLst/>
+    <dgm:txFillClrLst meth="repeat">
+      <a:schemeClr val="dk1"/>
+    </dgm:txFillClrLst>
+    <dgm:txEffectClrLst/>
+  </dgm:styleLbl>
+  <dgm:styleLbl name="alignAcc1">
+    <dgm:fillClrLst meth="repeat">
+      <a:schemeClr val="lt1">
+        <a:alpha val="90000"/>
+      </a:schemeClr>
+    </dgm:fillClrLst>
+    <dgm:linClrLst meth="repeat">
+      <a:schemeClr val="accent1"/>
+    </dgm:linClrLst>
+    <dgm:effectClrLst/>
+    <dgm:txLinClrLst/>
+    <dgm:txFillClrLst meth="repeat">
+      <a:schemeClr val="dk1"/>
+    </dgm:txFillClrLst>
+    <dgm:txEffectClrLst/>
+  </dgm:styleLbl>
+  <dgm:styleLbl name="trAlignAcc1">
+    <dgm:fillClrLst meth="repeat">
+      <a:schemeClr val="lt1">
+        <a:alpha val="40000"/>
+      </a:schemeClr>
+    </dgm:fillClrLst>
+    <dgm:linClrLst meth="repeat">
+      <a:schemeClr val="accent1"/>
+    </dgm:linClrLst>
+    <dgm:effectClrLst/>
+    <dgm:txLinClrLst/>
+    <dgm:txFillClrLst meth="repeat">
+      <a:schemeClr val="dk1"/>
+    </dgm:txFillClrLst>
+    <dgm:txEffectClrLst/>
+  </dgm:styleLbl>
+  <dgm:styleLbl name="bgAcc1">
+    <dgm:fillClrLst meth="repeat">
+      <a:schemeClr val="lt1">
+        <a:alpha val="90000"/>
+      </a:schemeClr>
+    </dgm:fillClrLst>
+    <dgm:linClrLst meth="repeat">
+      <a:schemeClr val="accent1"/>
+    </dgm:linClrLst>
+    <dgm:effectClrLst/>
+    <dgm:txLinClrLst/>
+    <dgm:txFillClrLst meth="repeat">
+      <a:schemeClr val="dk1"/>
+    </dgm:txFillClrLst>
+    <dgm:txEffectClrLst/>
+  </dgm:styleLbl>
+  <dgm:styleLbl name="solidFgAcc1">
+    <dgm:fillClrLst meth="repeat">
+      <a:schemeClr val="lt1"/>
+    </dgm:fillClrLst>
+    <dgm:linClrLst meth="repeat">
+      <a:schemeClr val="accent1"/>
+    </dgm:linClrLst>
+    <dgm:effectClrLst/>
+    <dgm:txLinClrLst/>
+    <dgm:txFillClrLst meth="repeat">
+      <a:schemeClr val="dk1"/>
+    </dgm:txFillClrLst>
+    <dgm:txEffectClrLst/>
+  </dgm:styleLbl>
+  <dgm:styleLbl name="solidAlignAcc1">
+    <dgm:fillClrLst meth="repeat">
+      <a:schemeClr val="lt1"/>
+    </dgm:fillClrLst>
+    <dgm:linClrLst meth="repeat">
+      <a:schemeClr val="accent1"/>
+    </dgm:linClrLst>
+    <dgm:effectClrLst/>
+    <dgm:txLinClrLst/>
+    <dgm:txFillClrLst meth="repeat">
+      <a:schemeClr val="dk1"/>
+    </dgm:txFillClrLst>
+    <dgm:txEffectClrLst/>
+  </dgm:styleLbl>
+  <dgm:styleLbl name="solidBgAcc1">
+    <dgm:fillClrLst meth="repeat">
+      <a:schemeClr val="lt1"/>
+    </dgm:fillClrLst>
+    <dgm:linClrLst meth="repeat">
+      <a:schemeClr val="accent1"/>
+    </dgm:linClrLst>
+    <dgm:effectClrLst/>
+    <dgm:txLinClrLst/>
+    <dgm:txFillClrLst meth="repeat">
+      <a:schemeClr val="dk1"/>
+    </dgm:txFillClrLst>
+    <dgm:txEffectClrLst/>
+  </dgm:styleLbl>
+  <dgm:styleLbl name="fgAccFollowNode1">
+    <dgm:fillClrLst meth="repeat">
+      <a:schemeClr val="accent1">
+        <a:alpha val="90000"/>
+        <a:tint val="40000"/>
+      </a:schemeClr>
+    </dgm:fillClrLst>
+    <dgm:linClrLst meth="repeat">
+      <a:schemeClr val="accent1">
+        <a:alpha val="90000"/>
+        <a:tint val="40000"/>
+      </a:schemeClr>
+    </dgm:linClrLst>
+    <dgm:effectClrLst/>
+    <dgm:txLinClrLst/>
+    <dgm:txFillClrLst meth="repeat">
+      <a:schemeClr val="dk1"/>
+    </dgm:txFillClrLst>
+    <dgm:txEffectClrLst/>
+  </dgm:styleLbl>
+  <dgm:styleLbl name="alignAccFollowNode1">
+    <dgm:fillClrLst meth="repeat">
+      <a:schemeClr val="accent1">
+        <a:alpha val="90000"/>
+        <a:tint val="40000"/>
+      </a:schemeClr>
+    </dgm:fillClrLst>
+    <dgm:linClrLst meth="repeat">
+      <a:schemeClr val="accent1">
+        <a:alpha val="90000"/>
+        <a:tint val="40000"/>
+      </a:schemeClr>
+    </dgm:linClrLst>
+    <dgm:effectClrLst/>
+    <dgm:txLinClrLst/>
+    <dgm:txFillClrLst meth="repeat">
+      <a:schemeClr val="dk1"/>
+    </dgm:txFillClrLst>
+    <dgm:txEffectClrLst/>
+  </dgm:styleLbl>
+  <dgm:styleLbl name="bgAccFollowNode1">
+    <dgm:fillClrLst meth="repeat">
+      <a:schemeClr val="accent1">
+        <a:alpha val="90000"/>
+        <a:tint val="40000"/>
+      </a:schemeClr>
+    </dgm:fillClrLst>
+    <dgm:linClrLst meth="repeat">
+      <a:schemeClr val="accent1">
+        <a:alpha val="90000"/>
+        <a:tint val="40000"/>
+      </a:schemeClr>
+    </dgm:linClrLst>
+    <dgm:effectClrLst/>
+    <dgm:txLinClrLst/>
+    <dgm:txFillClrLst meth="repeat">
+      <a:schemeClr val="dk1"/>
+    </dgm:txFillClrLst>
+    <dgm:txEffectClrLst/>
+  </dgm:styleLbl>
+  <dgm:styleLbl name="fgAcc0">
+    <dgm:fillClrLst meth="repeat">
+      <a:schemeClr val="lt1">
+        <a:alpha val="90000"/>
+      </a:schemeClr>
+    </dgm:fillClrLst>
+    <dgm:linClrLst meth="repeat">
+      <a:schemeClr val="accent1"/>
+    </dgm:linClrLst>
+    <dgm:effectClrLst/>
+    <dgm:txLinClrLst/>
+    <dgm:txFillClrLst meth="repeat">
+      <a:schemeClr val="dk1"/>
+    </dgm:txFillClrLst>
+    <dgm:txEffectClrLst/>
+  </dgm:styleLbl>
+  <dgm:styleLbl name="fgAcc2">
+    <dgm:fillClrLst meth="repeat">
+      <a:schemeClr val="lt1">
+        <a:alpha val="90000"/>
+      </a:schemeClr>
+    </dgm:fillClrLst>
+    <dgm:linClrLst meth="repeat">
+      <a:schemeClr val="accent1"/>
+    </dgm:linClrLst>
+    <dgm:effectClrLst/>
+    <dgm:txLinClrLst/>
+    <dgm:txFillClrLst meth="repeat">
+      <a:schemeClr val="dk1"/>
+    </dgm:txFillClrLst>
+    <dgm:txEffectClrLst/>
+  </dgm:styleLbl>
+  <dgm:styleLbl name="fgAcc3">
+    <dgm:fillClrLst meth="repeat">
+      <a:schemeClr val="lt1">
+        <a:alpha val="90000"/>
+      </a:schemeClr>
+    </dgm:fillClrLst>
+    <dgm:linClrLst meth="repeat">
+      <a:schemeClr val="accent1"/>
+    </dgm:linClrLst>
+    <dgm:effectClrLst/>
+    <dgm:txLinClrLst/>
+    <dgm:txFillClrLst meth="repeat">
+      <a:schemeClr val="dk1"/>
+    </dgm:txFillClrLst>
+    <dgm:txEffectClrLst/>
+  </dgm:styleLbl>
+  <dgm:styleLbl name="fgAcc4">
+    <dgm:fillClrLst meth="repeat">
+      <a:schemeClr val="lt1">
+        <a:alpha val="90000"/>
+      </a:schemeClr>
+    </dgm:fillClrLst>
+    <dgm:linClrLst meth="repeat">
+      <a:schemeClr val="accent1"/>
+    </dgm:linClrLst>
+    <dgm:effectClrLst/>
+    <dgm:txLinClrLst/>
+    <dgm:txFillClrLst meth="repeat">
+      <a:schemeClr val="dk1"/>
+    </dgm:txFillClrLst>
+    <dgm:txEffectClrLst/>
+  </dgm:styleLbl>
+  <dgm:styleLbl name="bgShp">
+    <dgm:fillClrLst meth="repeat">
+      <a:schemeClr val="accent1">
+        <a:tint val="40000"/>
+      </a:schemeClr>
+    </dgm:fillClrLst>
+    <dgm:linClrLst meth="repeat">
+      <a:schemeClr val="accent1"/>
+    </dgm:linClrLst>
+    <dgm:effectClrLst/>
+    <dgm:txLinClrLst/>
+    <dgm:txFillClrLst meth="repeat">
+      <a:schemeClr val="dk1"/>
+    </dgm:txFillClrLst>
+    <dgm:txEffectClrLst/>
+  </dgm:styleLbl>
+  <dgm:styleLbl name="dkBgShp">
+    <dgm:fillClrLst meth="repeat">
+      <a:schemeClr val="accent1">
+        <a:shade val="80000"/>
+      </a:schemeClr>
+    </dgm:fillClrLst>
+    <dgm:linClrLst meth="repeat">
+      <a:schemeClr val="accent1"/>
+    </dgm:linClrLst>
+    <dgm:effectClrLst/>
+    <dgm:txLinClrLst/>
+    <dgm:txFillClrLst meth="repeat">
+      <a:schemeClr val="lt1"/>
+    </dgm:txFillClrLst>
+    <dgm:txEffectClrLst/>
+  </dgm:styleLbl>
+  <dgm:styleLbl name="trBgShp">
+    <dgm:fillClrLst meth="repeat">
+      <a:schemeClr val="accent1">
+        <a:tint val="50000"/>
+        <a:alpha val="40000"/>
+      </a:schemeClr>
+    </dgm:fillClrLst>
+    <dgm:linClrLst meth="repeat">
+      <a:schemeClr val="accent1"/>
+    </dgm:linClrLst>
+    <dgm:effectClrLst/>
+    <dgm:txLinClrLst/>
+    <dgm:txFillClrLst meth="repeat">
+      <a:schemeClr val="lt1"/>
+    </dgm:txFillClrLst>
+    <dgm:txEffectClrLst/>
+  </dgm:styleLbl>
+  <dgm:styleLbl name="fgShp">
+    <dgm:fillClrLst meth="repeat">
+      <a:schemeClr val="accent1">
+        <a:tint val="60000"/>
+      </a:schemeClr>
+    </dgm:fillClrLst>
+    <dgm:linClrLst meth="repeat">
+      <a:schemeClr val="lt1"/>
+    </dgm:linClrLst>
+    <dgm:effectClrLst/>
+    <dgm:txLinClrLst/>
+    <dgm:txFillClrLst meth="repeat">
+      <a:schemeClr val="dk1"/>
+    </dgm:txFillClrLst>
+    <dgm:txEffectClrLst/>
+  </dgm:styleLbl>
+  <dgm:styleLbl name="revTx">
+    <dgm:fillClrLst meth="repeat">
+      <a:schemeClr val="lt1">
+        <a:alpha val="0"/>
+      </a:schemeClr>
+    </dgm:fillClrLst>
+    <dgm:linClrLst meth="repeat">
+      <a:schemeClr val="dk1">
+        <a:alpha val="0"/>
+      </a:schemeClr>
+    </dgm:linClrLst>
+    <dgm:effectClrLst/>
+    <dgm:txLinClrLst/>
+    <dgm:txFillClrLst meth="repeat">
+      <a:schemeClr val="tx1"/>
+    </dgm:txFillClrLst>
+    <dgm:txEffectClrLst/>
+  </dgm:styleLbl>
+</dgm:colorsDef>
+</file>
+
+<file path=ppt/diagrams/data1.xml><?xml version="1.0" encoding="utf-8"?>
+<dgm:dataModel xmlns:dgm="http://schemas.openxmlformats.org/drawingml/2006/diagram" xmlns:a="http://schemas.openxmlformats.org/drawingml/2006/main">
+  <dgm:ptLst>
+    <dgm:pt modelId="{2CDDA613-A307-4B38-B1DB-229F91CA17B3}" type="doc">
+      <dgm:prSet loTypeId="urn:microsoft.com/office/officeart/2005/8/layout/cycle1" loCatId="cycle" qsTypeId="urn:microsoft.com/office/officeart/2005/8/quickstyle/simple1" qsCatId="simple" csTypeId="urn:microsoft.com/office/officeart/2005/8/colors/accent1_2" csCatId="accent1" phldr="1"/>
+      <dgm:spPr/>
+      <dgm:t>
+        <a:bodyPr/>
+        <a:lstStyle/>
+        <a:p>
+          <a:endParaRPr lang="en-AU"/>
+        </a:p>
+      </dgm:t>
+    </dgm:pt>
+    <dgm:pt modelId="{EEA45DA9-0663-4ACB-849B-BD0AC27F3D6C}">
+      <dgm:prSet phldrT="[Text]"/>
+      <dgm:spPr/>
+      <dgm:t>
+        <a:bodyPr/>
+        <a:lstStyle/>
+        <a:p>
+          <a:r>
+            <a:rPr lang="en-AU" dirty="0" smtClean="0"/>
+            <a:t>Write a user story that delivers some value to the user</a:t>
+          </a:r>
+          <a:endParaRPr lang="en-AU" dirty="0"/>
+        </a:p>
+      </dgm:t>
+    </dgm:pt>
+    <dgm:pt modelId="{E731FDCF-0434-471C-8EE2-D16BE5187BE1}" type="parTrans" cxnId="{D5C83F08-0609-4D4C-9F42-2ADD56D63EE2}">
+      <dgm:prSet/>
+      <dgm:spPr/>
+      <dgm:t>
+        <a:bodyPr/>
+        <a:lstStyle/>
+        <a:p>
+          <a:endParaRPr lang="en-AU"/>
+        </a:p>
+      </dgm:t>
+    </dgm:pt>
+    <dgm:pt modelId="{AFC181B8-6D97-41C8-A0D6-2A945F622476}" type="sibTrans" cxnId="{D5C83F08-0609-4D4C-9F42-2ADD56D63EE2}">
+      <dgm:prSet/>
+      <dgm:spPr/>
+      <dgm:t>
+        <a:bodyPr/>
+        <a:lstStyle/>
+        <a:p>
+          <a:endParaRPr lang="en-AU"/>
+        </a:p>
+      </dgm:t>
+    </dgm:pt>
+    <dgm:pt modelId="{7A6FD9D4-9AAD-4E46-B1A5-DAE9E0396C85}">
+      <dgm:prSet phldrT="[Text]"/>
+      <dgm:spPr/>
+      <dgm:t>
+        <a:bodyPr/>
+        <a:lstStyle/>
+        <a:p>
+          <a:r>
+            <a:rPr lang="en-AU" dirty="0" smtClean="0"/>
+            <a:t>Define the behaviour using executable scenarios</a:t>
+          </a:r>
+          <a:endParaRPr lang="en-AU" dirty="0"/>
+        </a:p>
+      </dgm:t>
+    </dgm:pt>
+    <dgm:pt modelId="{D15137A6-0AF9-4292-957E-10870DC76615}" type="parTrans" cxnId="{91BB9457-14A8-48F0-B04A-9C1D631C1CCB}">
+      <dgm:prSet/>
+      <dgm:spPr/>
+      <dgm:t>
+        <a:bodyPr/>
+        <a:lstStyle/>
+        <a:p>
+          <a:endParaRPr lang="en-AU"/>
+        </a:p>
+      </dgm:t>
+    </dgm:pt>
+    <dgm:pt modelId="{3AA01E92-FA70-4509-8C26-E5A9364524D6}" type="sibTrans" cxnId="{91BB9457-14A8-48F0-B04A-9C1D631C1CCB}">
+      <dgm:prSet/>
+      <dgm:spPr/>
+      <dgm:t>
+        <a:bodyPr/>
+        <a:lstStyle/>
+        <a:p>
+          <a:endParaRPr lang="en-AU"/>
+        </a:p>
+      </dgm:t>
+    </dgm:pt>
+    <dgm:pt modelId="{678D64B6-91C2-4F61-9D7A-9FFC1319D019}">
+      <dgm:prSet phldrT="[Text]"/>
+      <dgm:spPr/>
+      <dgm:t>
+        <a:bodyPr/>
+        <a:lstStyle/>
+        <a:p>
+          <a:r>
+            <a:rPr lang="en-AU" dirty="0" smtClean="0"/>
+            <a:t>Implement the behaviour until each scenario passes</a:t>
+          </a:r>
+          <a:endParaRPr lang="en-AU" dirty="0"/>
+        </a:p>
+      </dgm:t>
+    </dgm:pt>
+    <dgm:pt modelId="{F1D9F280-94C0-42CE-AD0A-25C513C2CE68}" type="parTrans" cxnId="{4ED9E514-187F-4C30-B72A-BF093D6CFB73}">
+      <dgm:prSet/>
+      <dgm:spPr/>
+      <dgm:t>
+        <a:bodyPr/>
+        <a:lstStyle/>
+        <a:p>
+          <a:endParaRPr lang="en-AU"/>
+        </a:p>
+      </dgm:t>
+    </dgm:pt>
+    <dgm:pt modelId="{D8B90E3D-10EF-4598-8197-AF7D763CE0D3}" type="sibTrans" cxnId="{4ED9E514-187F-4C30-B72A-BF093D6CFB73}">
+      <dgm:prSet/>
+      <dgm:spPr/>
+      <dgm:t>
+        <a:bodyPr/>
+        <a:lstStyle/>
+        <a:p>
+          <a:endParaRPr lang="en-AU"/>
+        </a:p>
+      </dgm:t>
+    </dgm:pt>
+    <dgm:pt modelId="{ED8F3375-2A04-4962-8B82-32EA264FEDC7}" type="pres">
+      <dgm:prSet presAssocID="{2CDDA613-A307-4B38-B1DB-229F91CA17B3}" presName="cycle" presStyleCnt="0">
+        <dgm:presLayoutVars>
+          <dgm:dir/>
+          <dgm:resizeHandles val="exact"/>
+        </dgm:presLayoutVars>
+      </dgm:prSet>
+      <dgm:spPr/>
+      <dgm:t>
+        <a:bodyPr/>
+        <a:lstStyle/>
+        <a:p>
+          <a:endParaRPr lang="en-AU"/>
+        </a:p>
+      </dgm:t>
+    </dgm:pt>
+    <dgm:pt modelId="{F2BF0D40-91F8-4572-B9C0-B7888FFD1877}" type="pres">
+      <dgm:prSet presAssocID="{EEA45DA9-0663-4ACB-849B-BD0AC27F3D6C}" presName="dummy" presStyleCnt="0"/>
+      <dgm:spPr/>
+    </dgm:pt>
+    <dgm:pt modelId="{98E03FB8-A5A6-4AEA-9ADC-0CCF2A383B50}" type="pres">
+      <dgm:prSet presAssocID="{EEA45DA9-0663-4ACB-849B-BD0AC27F3D6C}" presName="node" presStyleLbl="revTx" presStyleIdx="0" presStyleCnt="3">
+        <dgm:presLayoutVars>
+          <dgm:bulletEnabled val="1"/>
+        </dgm:presLayoutVars>
+      </dgm:prSet>
+      <dgm:spPr/>
+      <dgm:t>
+        <a:bodyPr/>
+        <a:lstStyle/>
+        <a:p>
+          <a:endParaRPr lang="en-AU"/>
+        </a:p>
+      </dgm:t>
+    </dgm:pt>
+    <dgm:pt modelId="{381F5905-BDD4-42B7-8313-AA068BA99765}" type="pres">
+      <dgm:prSet presAssocID="{AFC181B8-6D97-41C8-A0D6-2A945F622476}" presName="sibTrans" presStyleLbl="node1" presStyleIdx="0" presStyleCnt="3"/>
+      <dgm:spPr/>
+      <dgm:t>
+        <a:bodyPr/>
+        <a:lstStyle/>
+        <a:p>
+          <a:endParaRPr lang="en-AU"/>
+        </a:p>
+      </dgm:t>
+    </dgm:pt>
+    <dgm:pt modelId="{0EA80442-327F-4DF8-A9B1-154786519D1E}" type="pres">
+      <dgm:prSet presAssocID="{7A6FD9D4-9AAD-4E46-B1A5-DAE9E0396C85}" presName="dummy" presStyleCnt="0"/>
+      <dgm:spPr/>
+    </dgm:pt>
+    <dgm:pt modelId="{905204AE-AD6F-4A2C-94DE-2038F473020E}" type="pres">
+      <dgm:prSet presAssocID="{7A6FD9D4-9AAD-4E46-B1A5-DAE9E0396C85}" presName="node" presStyleLbl="revTx" presStyleIdx="1" presStyleCnt="3">
+        <dgm:presLayoutVars>
+          <dgm:bulletEnabled val="1"/>
+        </dgm:presLayoutVars>
+      </dgm:prSet>
+      <dgm:spPr/>
+      <dgm:t>
+        <a:bodyPr/>
+        <a:lstStyle/>
+        <a:p>
+          <a:endParaRPr lang="en-AU"/>
+        </a:p>
+      </dgm:t>
+    </dgm:pt>
+    <dgm:pt modelId="{08CE98DB-89AF-4867-B11C-3657949C890B}" type="pres">
+      <dgm:prSet presAssocID="{3AA01E92-FA70-4509-8C26-E5A9364524D6}" presName="sibTrans" presStyleLbl="node1" presStyleIdx="1" presStyleCnt="3" custScaleY="100001" custLinFactNeighborY="-488"/>
+      <dgm:spPr/>
+      <dgm:t>
+        <a:bodyPr/>
+        <a:lstStyle/>
+        <a:p>
+          <a:endParaRPr lang="en-AU"/>
+        </a:p>
+      </dgm:t>
+    </dgm:pt>
+    <dgm:pt modelId="{C4ACD3EE-3DA1-43E2-B204-049F8DEFF951}" type="pres">
+      <dgm:prSet presAssocID="{678D64B6-91C2-4F61-9D7A-9FFC1319D019}" presName="dummy" presStyleCnt="0"/>
+      <dgm:spPr/>
+    </dgm:pt>
+    <dgm:pt modelId="{021FC082-622D-48F0-A920-E4F33264ADBB}" type="pres">
+      <dgm:prSet presAssocID="{678D64B6-91C2-4F61-9D7A-9FFC1319D019}" presName="node" presStyleLbl="revTx" presStyleIdx="2" presStyleCnt="3">
+        <dgm:presLayoutVars>
+          <dgm:bulletEnabled val="1"/>
+        </dgm:presLayoutVars>
+      </dgm:prSet>
+      <dgm:spPr/>
+      <dgm:t>
+        <a:bodyPr/>
+        <a:lstStyle/>
+        <a:p>
+          <a:endParaRPr lang="en-AU"/>
+        </a:p>
+      </dgm:t>
+    </dgm:pt>
+    <dgm:pt modelId="{FDC21FFD-6212-405C-8F68-899970586896}" type="pres">
+      <dgm:prSet presAssocID="{D8B90E3D-10EF-4598-8197-AF7D763CE0D3}" presName="sibTrans" presStyleLbl="node1" presStyleIdx="2" presStyleCnt="3"/>
+      <dgm:spPr/>
+      <dgm:t>
+        <a:bodyPr/>
+        <a:lstStyle/>
+        <a:p>
+          <a:endParaRPr lang="en-AU"/>
+        </a:p>
+      </dgm:t>
+    </dgm:pt>
+  </dgm:ptLst>
+  <dgm:cxnLst>
+    <dgm:cxn modelId="{E0CF67B0-D244-48F7-8297-B18F8D22E788}" type="presOf" srcId="{3AA01E92-FA70-4509-8C26-E5A9364524D6}" destId="{08CE98DB-89AF-4867-B11C-3657949C890B}" srcOrd="0" destOrd="0" presId="urn:microsoft.com/office/officeart/2005/8/layout/cycle1"/>
+    <dgm:cxn modelId="{D25DDA9A-CCF8-466F-A03C-B1ECCDF00C77}" type="presOf" srcId="{EEA45DA9-0663-4ACB-849B-BD0AC27F3D6C}" destId="{98E03FB8-A5A6-4AEA-9ADC-0CCF2A383B50}" srcOrd="0" destOrd="0" presId="urn:microsoft.com/office/officeart/2005/8/layout/cycle1"/>
+    <dgm:cxn modelId="{302A505A-7875-4D9F-8B9A-05735BA3AF7D}" type="presOf" srcId="{678D64B6-91C2-4F61-9D7A-9FFC1319D019}" destId="{021FC082-622D-48F0-A920-E4F33264ADBB}" srcOrd="0" destOrd="0" presId="urn:microsoft.com/office/officeart/2005/8/layout/cycle1"/>
+    <dgm:cxn modelId="{569CC1E6-6223-4FFC-8489-1611E536FF46}" type="presOf" srcId="{2CDDA613-A307-4B38-B1DB-229F91CA17B3}" destId="{ED8F3375-2A04-4962-8B82-32EA264FEDC7}" srcOrd="0" destOrd="0" presId="urn:microsoft.com/office/officeart/2005/8/layout/cycle1"/>
+    <dgm:cxn modelId="{4ED9E514-187F-4C30-B72A-BF093D6CFB73}" srcId="{2CDDA613-A307-4B38-B1DB-229F91CA17B3}" destId="{678D64B6-91C2-4F61-9D7A-9FFC1319D019}" srcOrd="2" destOrd="0" parTransId="{F1D9F280-94C0-42CE-AD0A-25C513C2CE68}" sibTransId="{D8B90E3D-10EF-4598-8197-AF7D763CE0D3}"/>
+    <dgm:cxn modelId="{B5C63E8F-6CB8-4594-98CE-FCC25D314F1F}" type="presOf" srcId="{D8B90E3D-10EF-4598-8197-AF7D763CE0D3}" destId="{FDC21FFD-6212-405C-8F68-899970586896}" srcOrd="0" destOrd="0" presId="urn:microsoft.com/office/officeart/2005/8/layout/cycle1"/>
+    <dgm:cxn modelId="{91BB9457-14A8-48F0-B04A-9C1D631C1CCB}" srcId="{2CDDA613-A307-4B38-B1DB-229F91CA17B3}" destId="{7A6FD9D4-9AAD-4E46-B1A5-DAE9E0396C85}" srcOrd="1" destOrd="0" parTransId="{D15137A6-0AF9-4292-957E-10870DC76615}" sibTransId="{3AA01E92-FA70-4509-8C26-E5A9364524D6}"/>
+    <dgm:cxn modelId="{B3800106-ABF2-4B66-9E76-C9626F68BB3D}" type="presOf" srcId="{AFC181B8-6D97-41C8-A0D6-2A945F622476}" destId="{381F5905-BDD4-42B7-8313-AA068BA99765}" srcOrd="0" destOrd="0" presId="urn:microsoft.com/office/officeart/2005/8/layout/cycle1"/>
+    <dgm:cxn modelId="{17532ADF-42E9-441A-8E2C-FD894D781987}" type="presOf" srcId="{7A6FD9D4-9AAD-4E46-B1A5-DAE9E0396C85}" destId="{905204AE-AD6F-4A2C-94DE-2038F473020E}" srcOrd="0" destOrd="0" presId="urn:microsoft.com/office/officeart/2005/8/layout/cycle1"/>
+    <dgm:cxn modelId="{D5C83F08-0609-4D4C-9F42-2ADD56D63EE2}" srcId="{2CDDA613-A307-4B38-B1DB-229F91CA17B3}" destId="{EEA45DA9-0663-4ACB-849B-BD0AC27F3D6C}" srcOrd="0" destOrd="0" parTransId="{E731FDCF-0434-471C-8EE2-D16BE5187BE1}" sibTransId="{AFC181B8-6D97-41C8-A0D6-2A945F622476}"/>
+    <dgm:cxn modelId="{357D94D1-572A-453F-AA90-6E5CC2423FE8}" type="presParOf" srcId="{ED8F3375-2A04-4962-8B82-32EA264FEDC7}" destId="{F2BF0D40-91F8-4572-B9C0-B7888FFD1877}" srcOrd="0" destOrd="0" presId="urn:microsoft.com/office/officeart/2005/8/layout/cycle1"/>
+    <dgm:cxn modelId="{669AE226-CBC3-4D4E-A9BE-86FC61BE9A15}" type="presParOf" srcId="{ED8F3375-2A04-4962-8B82-32EA264FEDC7}" destId="{98E03FB8-A5A6-4AEA-9ADC-0CCF2A383B50}" srcOrd="1" destOrd="0" presId="urn:microsoft.com/office/officeart/2005/8/layout/cycle1"/>
+    <dgm:cxn modelId="{9AE6A4C4-FE25-42A2-A41C-C49BDC2005A9}" type="presParOf" srcId="{ED8F3375-2A04-4962-8B82-32EA264FEDC7}" destId="{381F5905-BDD4-42B7-8313-AA068BA99765}" srcOrd="2" destOrd="0" presId="urn:microsoft.com/office/officeart/2005/8/layout/cycle1"/>
+    <dgm:cxn modelId="{F581F83B-2A30-4CA7-9F0A-00CEE8A23D5B}" type="presParOf" srcId="{ED8F3375-2A04-4962-8B82-32EA264FEDC7}" destId="{0EA80442-327F-4DF8-A9B1-154786519D1E}" srcOrd="3" destOrd="0" presId="urn:microsoft.com/office/officeart/2005/8/layout/cycle1"/>
+    <dgm:cxn modelId="{592D9C7E-4800-4CCE-824B-1C12CF6EFDCF}" type="presParOf" srcId="{ED8F3375-2A04-4962-8B82-32EA264FEDC7}" destId="{905204AE-AD6F-4A2C-94DE-2038F473020E}" srcOrd="4" destOrd="0" presId="urn:microsoft.com/office/officeart/2005/8/layout/cycle1"/>
+    <dgm:cxn modelId="{101F6332-92F4-490C-900A-A7E49320B8F3}" type="presParOf" srcId="{ED8F3375-2A04-4962-8B82-32EA264FEDC7}" destId="{08CE98DB-89AF-4867-B11C-3657949C890B}" srcOrd="5" destOrd="0" presId="urn:microsoft.com/office/officeart/2005/8/layout/cycle1"/>
+    <dgm:cxn modelId="{84B8B785-9ACE-402C-B42D-9D2BACE53800}" type="presParOf" srcId="{ED8F3375-2A04-4962-8B82-32EA264FEDC7}" destId="{C4ACD3EE-3DA1-43E2-B204-049F8DEFF951}" srcOrd="6" destOrd="0" presId="urn:microsoft.com/office/officeart/2005/8/layout/cycle1"/>
+    <dgm:cxn modelId="{E50FFFEC-CD37-4AE9-9831-EE35B4DC3F5F}" type="presParOf" srcId="{ED8F3375-2A04-4962-8B82-32EA264FEDC7}" destId="{021FC082-622D-48F0-A920-E4F33264ADBB}" srcOrd="7" destOrd="0" presId="urn:microsoft.com/office/officeart/2005/8/layout/cycle1"/>
+    <dgm:cxn modelId="{78C0637F-1F78-476F-9209-CCC52E824E72}" type="presParOf" srcId="{ED8F3375-2A04-4962-8B82-32EA264FEDC7}" destId="{FDC21FFD-6212-405C-8F68-899970586896}" srcOrd="8" destOrd="0" presId="urn:microsoft.com/office/officeart/2005/8/layout/cycle1"/>
+  </dgm:cxnLst>
+  <dgm:bg/>
+  <dgm:whole/>
+</dgm:dataModel>
+</file>
+
+<file path=ppt/diagrams/layout1.xml><?xml version="1.0" encoding="utf-8"?>
+<dgm:layoutDef xmlns:dgm="http://schemas.openxmlformats.org/drawingml/2006/diagram" xmlns:a="http://schemas.openxmlformats.org/drawingml/2006/main" uniqueId="urn:microsoft.com/office/officeart/2005/8/layout/cycle1">
+  <dgm:title val=""/>
+  <dgm:desc val=""/>
+  <dgm:catLst>
+    <dgm:cat type="cycle" pri="2000"/>
+  </dgm:catLst>
+  <dgm:sampData>
+    <dgm:dataModel>
+      <dgm:ptLst>
+        <dgm:pt modelId="0" type="doc"/>
+        <dgm:pt modelId="1">
+          <dgm:prSet phldr="1"/>
+        </dgm:pt>
+        <dgm:pt modelId="2">
+          <dgm:prSet phldr="1"/>
+        </dgm:pt>
+        <dgm:pt modelId="3">
+          <dgm:prSet phldr="1"/>
+        </dgm:pt>
+        <dgm:pt modelId="4">
+          <dgm:prSet phldr="1"/>
+        </dgm:pt>
+        <dgm:pt modelId="5">
+          <dgm:prSet phldr="1"/>
+        </dgm:pt>
+      </dgm:ptLst>
+      <dgm:cxnLst>
+        <dgm:cxn modelId="6" srcId="0" destId="1" srcOrd="0" destOrd="0"/>
+        <dgm:cxn modelId="7" srcId="0" destId="2" srcOrd="1" destOrd="0"/>
+        <dgm:cxn modelId="8" srcId="0" destId="3" srcOrd="2" destOrd="0"/>
+        <dgm:cxn modelId="9" srcId="0" destId="4" srcOrd="3" destOrd="0"/>
+        <dgm:cxn modelId="10" srcId="0" destId="5" srcOrd="4" destOrd="0"/>
+      </dgm:cxnLst>
+      <dgm:bg/>
+      <dgm:whole/>
+    </dgm:dataModel>
+  </dgm:sampData>
+  <dgm:styleData>
+    <dgm:dataModel>
+      <dgm:ptLst>
+        <dgm:pt modelId="0" type="doc"/>
+        <dgm:pt modelId="1"/>
+        <dgm:pt modelId="2"/>
+        <dgm:pt modelId="3"/>
+      </dgm:ptLst>
+      <dgm:cxnLst>
+        <dgm:cxn modelId="4" srcId="0" destId="1" srcOrd="0" destOrd="0"/>
+        <dgm:cxn modelId="5" srcId="0" destId="2" srcOrd="1" destOrd="0"/>
+        <dgm:cxn modelId="6" srcId="0" destId="3" srcOrd="2" destOrd="0"/>
+      </dgm:cxnLst>
+      <dgm:bg/>
+      <dgm:whole/>
+    </dgm:dataModel>
+  </dgm:styleData>
+  <dgm:clrData>
+    <dgm:dataModel>
+      <dgm:ptLst>
+        <dgm:pt modelId="0" type="doc"/>
+        <dgm:pt modelId="1"/>
+        <dgm:pt modelId="2"/>
+        <dgm:pt modelId="3"/>
+        <dgm:pt modelId="4"/>
+        <dgm:pt modelId="5"/>
+        <dgm:pt modelId="6"/>
+      </dgm:ptLst>
+      <dgm:cxnLst>
+        <dgm:cxn modelId="7" srcId="0" destId="1" srcOrd="0" destOrd="0"/>
+        <dgm:cxn modelId="8" srcId="0" destId="2" srcOrd="1" destOrd="0"/>
+        <dgm:cxn modelId="9" srcId="0" destId="3" srcOrd="2" destOrd="0"/>
+        <dgm:cxn modelId="10" srcId="0" destId="4" srcOrd="3" destOrd="0"/>
+        <dgm:cxn modelId="11" srcId="0" destId="5" srcOrd="4" destOrd="0"/>
+        <dgm:cxn modelId="12" srcId="0" destId="6" srcOrd="5" destOrd="0"/>
+      </dgm:cxnLst>
+      <dgm:bg/>
+      <dgm:whole/>
+    </dgm:dataModel>
+  </dgm:clrData>
+  <dgm:layoutNode name="cycle">
+    <dgm:varLst>
+      <dgm:dir/>
+      <dgm:resizeHandles val="exact"/>
+    </dgm:varLst>
+    <dgm:choose name="Name0">
+      <dgm:if name="Name1" func="var" arg="dir" op="equ" val="norm">
+        <dgm:alg type="cycle">
+          <dgm:param type="stAng" val="0"/>
+          <dgm:param type="spanAng" val="360"/>
+        </dgm:alg>
+      </dgm:if>
+      <dgm:else name="Name2">
+        <dgm:alg type="cycle">
+          <dgm:param type="stAng" val="0"/>
+          <dgm:param type="spanAng" val="-360"/>
+        </dgm:alg>
+      </dgm:else>
+    </dgm:choose>
+    <dgm:shape xmlns:r="http://schemas.openxmlformats.org/officeDocument/2006/relationships" r:blip="">
+      <dgm:adjLst/>
+    </dgm:shape>
+    <dgm:presOf/>
+    <dgm:choose name="Name3">
+      <dgm:if name="Name4" func="var" arg="dir" op="equ" val="norm">
+        <dgm:constrLst>
+          <dgm:constr type="diam" val="1"/>
+          <dgm:constr type="w" for="ch" forName="node" refType="w"/>
+          <dgm:constr type="w" for="ch" ptType="sibTrans" refType="w" refFor="ch" refForName="node" fact="0.5"/>
+          <dgm:constr type="h" for="ch" ptType="sibTrans" op="equ"/>
+          <dgm:constr type="diam" for="ch" ptType="sibTrans" refType="diam" op="equ"/>
+          <dgm:constr type="sibSp" refType="w" refFor="ch" refForName="node" fact="0.15"/>
+          <dgm:constr type="w" for="ch" forName="dummy" refType="sibSp" fact="2.8"/>
+          <dgm:constr type="primFontSz" for="ch" forName="node" op="equ" val="65"/>
+        </dgm:constrLst>
+      </dgm:if>
+      <dgm:else name="Name5">
+        <dgm:constrLst>
+          <dgm:constr type="diam" val="1"/>
+          <dgm:constr type="w" for="ch" forName="node" refType="w"/>
+          <dgm:constr type="w" for="ch" ptType="sibTrans" refType="w" refFor="ch" refForName="node" fact="0.5"/>
+          <dgm:constr type="h" for="ch" ptType="sibTrans" op="equ"/>
+          <dgm:constr type="diam" for="ch" ptType="sibTrans" refType="diam" op="equ" fact="-1"/>
+          <dgm:constr type="sibSp" refType="w" refFor="ch" refForName="node" fact="0.15"/>
+          <dgm:constr type="w" for="ch" forName="dummy" refType="sibSp" fact="2.8"/>
+          <dgm:constr type="primFontSz" for="ch" forName="node" op="equ" val="65"/>
+        </dgm:constrLst>
+      </dgm:else>
+    </dgm:choose>
+    <dgm:ruleLst>
+      <dgm:rule type="diam" val="INF" fact="NaN" max="NaN"/>
+    </dgm:ruleLst>
+    <dgm:forEach name="nodesForEach" axis="ch" ptType="node">
+      <dgm:choose name="Name6">
+        <dgm:if name="Name7" axis="par ch" ptType="doc node" func="cnt" op="gt" val="1">
+          <dgm:layoutNode name="dummy">
+            <dgm:alg type="sp"/>
+            <dgm:shape xmlns:r="http://schemas.openxmlformats.org/officeDocument/2006/relationships" r:blip="">
+              <dgm:adjLst/>
+            </dgm:shape>
+            <dgm:presOf/>
+            <dgm:constrLst>
+              <dgm:constr type="h" refType="w"/>
+            </dgm:constrLst>
+            <dgm:ruleLst/>
+          </dgm:layoutNode>
+        </dgm:if>
+        <dgm:else name="Name8"/>
+      </dgm:choose>
+      <dgm:layoutNode name="node" styleLbl="revTx">
+        <dgm:varLst>
+          <dgm:bulletEnabled val="1"/>
+        </dgm:varLst>
+        <dgm:alg type="tx">
+          <dgm:param type="txAnchorVertCh" val="mid"/>
+        </dgm:alg>
+        <dgm:shape xmlns:r="http://schemas.openxmlformats.org/officeDocument/2006/relationships" type="rect" r:blip="">
+          <dgm:adjLst/>
+        </dgm:shape>
+        <dgm:presOf axis="desOrSelf" ptType="node"/>
+        <dgm:constrLst>
+          <dgm:constr type="h" refType="w"/>
+          <dgm:constr type="lMarg" refType="primFontSz" fact="0.1"/>
+          <dgm:constr type="rMarg" refType="primFontSz" fact="0.1"/>
+          <dgm:constr type="tMarg" refType="primFontSz" fact="0.1"/>
+          <dgm:constr type="bMarg" refType="primFontSz" fact="0.1"/>
+        </dgm:constrLst>
+        <dgm:ruleLst>
+          <dgm:rule type="primFontSz" val="5" fact="NaN" max="NaN"/>
+        </dgm:ruleLst>
+      </dgm:layoutNode>
+      <dgm:choose name="Name9">
+        <dgm:if name="Name10" axis="par ch" ptType="doc node" func="cnt" op="gt" val="1">
+          <dgm:forEach name="Name11" axis="followSib" ptType="sibTrans" hideLastTrans="0" cnt="1">
+            <dgm:layoutNode name="sibTrans" styleLbl="node1">
+              <dgm:alg type="conn">
+                <dgm:param type="connRout" val="curve"/>
+                <dgm:param type="begPts" val="radial"/>
+                <dgm:param type="endPts" val="radial"/>
+              </dgm:alg>
+              <dgm:shape xmlns:r="http://schemas.openxmlformats.org/officeDocument/2006/relationships" type="conn" r:blip="">
+                <dgm:adjLst/>
+              </dgm:shape>
+              <dgm:presOf axis="self"/>
+              <dgm:constrLst>
+                <dgm:constr type="h" refType="w" fact="0.65"/>
+                <dgm:constr type="begPad"/>
+                <dgm:constr type="endPad"/>
+              </dgm:constrLst>
+              <dgm:ruleLst/>
+            </dgm:layoutNode>
+          </dgm:forEach>
+        </dgm:if>
+        <dgm:else name="Name12"/>
+      </dgm:choose>
+    </dgm:forEach>
+  </dgm:layoutNode>
+</dgm:layoutDef>
+</file>
+
+<file path=ppt/diagrams/quickStyle1.xml><?xml version="1.0" encoding="utf-8"?>
+<dgm:styleDef xmlns:dgm="http://schemas.openxmlformats.org/drawingml/2006/diagram" xmlns:a="http://schemas.openxmlformats.org/drawingml/2006/main" uniqueId="urn:microsoft.com/office/officeart/2005/8/quickstyle/simple1">
+  <dgm:title val=""/>
+  <dgm:desc val=""/>
+  <dgm:catLst>
+    <dgm:cat type="simple" pri="10100"/>
+  </dgm:catLst>
+  <dgm:scene3d>
+    <a:camera prst="orthographicFront"/>
+    <a:lightRig rig="threePt" dir="t"/>
+  </dgm:scene3d>
+  <dgm:styleLbl name="node0">
+    <dgm:scene3d>
+      <a:camera prst="orthographicFront"/>
+      <a:lightRig rig="threePt" dir="t"/>
+    </dgm:scene3d>
+    <dgm:sp3d/>
+    <dgm:txPr/>
+    <dgm:style>
+      <a:lnRef idx="2">
+        <a:scrgbClr r="0" g="0" b="0"/>
+      </a:lnRef>
+      <a:fillRef idx="1">
+        <a:scrgbClr r="0" g="0" b="0"/>
+      </a:fillRef>
+      <a:effectRef idx="0">
+        <a:scrgbClr r="0" g="0" b="0"/>
+      </a:effectRef>
+      <a:fontRef idx="minor">
+        <a:schemeClr val="lt1"/>
+      </a:fontRef>
+    </dgm:style>
+  </dgm:styleLbl>
+  <dgm:styleLbl name="lnNode1">
+    <dgm:scene3d>
+      <a:camera prst="orthographicFront"/>
+      <a:lightRig rig="threePt" dir="t"/>
+    </dgm:scene3d>
+    <dgm:sp3d/>
+    <dgm:txPr/>
+    <dgm:style>
+      <a:lnRef idx="2">
+        <a:scrgbClr r="0" g="0" b="0"/>
+      </a:lnRef>
+      <a:fillRef idx="1">
+        <a:scrgbClr r="0" g="0" b="0"/>
+      </a:fillRef>
+      <a:effectRef idx="0">
+        <a:scrgbClr r="0" g="0" b="0"/>
+      </a:effectRef>
+      <a:fontRef idx="minor">
+        <a:schemeClr val="lt1"/>
+      </a:fontRef>
+    </dgm:style>
+  </dgm:styleLbl>
+  <dgm:styleLbl name="vennNode1">
+    <dgm:scene3d>
+      <a:camera prst="orthographicFront"/>
+      <a:lightRig rig="threePt" dir="t"/>
+    </dgm:scene3d>
+    <dgm:sp3d/>
+    <dgm:txPr/>
+    <dgm:style>
+      <a:lnRef idx="2">
+        <a:scrgbClr r="0" g="0" b="0"/>
+      </a:lnRef>
+      <a:fillRef idx="1">
+        <a:scrgbClr r="0" g="0" b="0"/>
+      </a:fillRef>
+      <a:effectRef idx="0">
+        <a:scrgbClr r="0" g="0" b="0"/>
+      </a:effectRef>
+      <a:fontRef idx="minor">
+        <a:schemeClr val="tx1"/>
+      </a:fontRef>
+    </dgm:style>
+  </dgm:styleLbl>
+  <dgm:styleLbl name="alignNode1">
+    <dgm:scene3d>
+      <a:camera prst="orthographicFront"/>
+      <a:lightRig rig="threePt" dir="t"/>
+    </dgm:scene3d>
+    <dgm:sp3d/>
+    <dgm:txPr/>
+    <dgm:style>
+      <a:lnRef idx="2">
+        <a:scrgbClr r="0" g="0" b="0"/>
+      </a:lnRef>
+      <a:fillRef idx="1">
+        <a:scrgbClr r="0" g="0" b="0"/>
+      </a:fillRef>
+      <a:effectRef idx="0">
+        <a:scrgbClr r="0" g="0" b="0"/>
+      </a:effectRef>
+      <a:fontRef idx="minor">
+        <a:schemeClr val="lt1"/>
+      </a:fontRef>
+    </dgm:style>
+  </dgm:styleLbl>
+  <dgm:styleLbl name="node1">
+    <dgm:scene3d>
+      <a:camera prst="orthographicFront"/>
+      <a:lightRig rig="threePt" dir="t"/>
+    </dgm:scene3d>
+    <dgm:sp3d/>
+    <dgm:txPr/>
+    <dgm:style>
+      <a:lnRef idx="2">
+        <a:scrgbClr r="0" g="0" b="0"/>
+      </a:lnRef>
+      <a:fillRef idx="1">
+        <a:scrgbClr r="0" g="0" b="0"/>
+      </a:fillRef>
+      <a:effectRef idx="0">
+        <a:scrgbClr r="0" g="0" b="0"/>
+      </a:effectRef>
+      <a:fontRef idx="minor">
+        <a:schemeClr val="lt1"/>
+      </a:fontRef>
+    </dgm:style>
+  </dgm:styleLbl>
+  <dgm:styleLbl name="node2">
+    <dgm:scene3d>
+      <a:camera prst="orthographicFront"/>
+      <a:lightRig rig="threePt" dir="t"/>
+    </dgm:scene3d>
+    <dgm:sp3d/>
+    <dgm:txPr/>
+    <dgm:style>
+      <a:lnRef idx="2">
+        <a:scrgbClr r="0" g="0" b="0"/>
+      </a:lnRef>
+      <a:fillRef idx="1">
+        <a:scrgbClr r="0" g="0" b="0"/>
+      </a:fillRef>
+      <a:effectRef idx="0">
+        <a:scrgbClr r="0" g="0" b="0"/>
+      </a:effectRef>
+      <a:fontRef idx="minor">
+        <a:schemeClr val="lt1"/>
+      </a:fontRef>
+    </dgm:style>
+  </dgm:styleLbl>
+  <dgm:styleLbl name="node3">
+    <dgm:scene3d>
+      <a:camera prst="orthographicFront"/>
+      <a:lightRig rig="threePt" dir="t"/>
+    </dgm:scene3d>
+    <dgm:sp3d/>
+    <dgm:txPr/>
+    <dgm:style>
+      <a:lnRef idx="2">
+        <a:scrgbClr r="0" g="0" b="0"/>
+      </a:lnRef>
+      <a:fillRef idx="1">
+        <a:scrgbClr r="0" g="0" b="0"/>
+      </a:fillRef>
+      <a:effectRef idx="0">
+        <a:scrgbClr r="0" g="0" b="0"/>
+      </a:effectRef>
+      <a:fontRef idx="minor">
+        <a:schemeClr val="lt1"/>
+      </a:fontRef>
+    </dgm:style>
+  </dgm:styleLbl>
+  <dgm:styleLbl name="node4">
+    <dgm:scene3d>
+      <a:camera prst="orthographicFront"/>
+      <a:lightRig rig="threePt" dir="t"/>
+    </dgm:scene3d>
+    <dgm:sp3d/>
+    <dgm:txPr/>
+    <dgm:style>
+      <a:lnRef idx="2">
+        <a:scrgbClr r="0" g="0" b="0"/>
+      </a:lnRef>
+      <a:fillRef idx="1">
+        <a:scrgbClr r="0" g="0" b="0"/>
+      </a:fillRef>
+      <a:effectRef idx="0">
+        <a:scrgbClr r="0" g="0" b="0"/>
+      </a:effectRef>
+      <a:fontRef idx="minor">
+        <a:schemeClr val="lt1"/>
+      </a:fontRef>
+    </dgm:style>
+  </dgm:styleLbl>
+  <dgm:styleLbl name="fgImgPlace1">
+    <dgm:scene3d>
+      <a:camera prst="orthographicFront"/>
+      <a:lightRig rig="threePt" dir="t"/>
+    </dgm:scene3d>
+    <dgm:sp3d/>
+    <dgm:txPr/>
+    <dgm:style>
+      <a:lnRef idx="2">
+        <a:scrgbClr r="0" g="0" b="0"/>
+      </a:lnRef>
+      <a:fillRef idx="1">
+        <a:scrgbClr r="0" g="0" b="0"/>
+      </a:fillRef>
+      <a:effectRef idx="0">
+        <a:scrgbClr r="0" g="0" b="0"/>
+      </a:effectRef>
+      <a:fontRef idx="minor"/>
+    </dgm:style>
+  </dgm:styleLbl>
+  <dgm:styleLbl name="alignImgPlace1">
+    <dgm:scene3d>
+      <a:camera prst="orthographicFront"/>
+      <a:lightRig rig="threePt" dir="t"/>
+    </dgm:scene3d>
+    <dgm:sp3d/>
+    <dgm:txPr/>
+    <dgm:style>
+      <a:lnRef idx="2">
+        <a:scrgbClr r="0" g="0" b="0"/>
+      </a:lnRef>
+      <a:fillRef idx="1">
+        <a:scrgbClr r="0" g="0" b="0"/>
+      </a:fillRef>
+      <a:effectRef idx="0">
+        <a:scrgbClr r="0" g="0" b="0"/>
+      </a:effectRef>
+      <a:fontRef idx="minor"/>
+    </dgm:style>
+  </dgm:styleLbl>
+  <dgm:styleLbl name="bgImgPlace1">
+    <dgm:scene3d>
+      <a:camera prst="orthographicFront"/>
+      <a:lightRig rig="threePt" dir="t"/>
+    </dgm:scene3d>
+    <dgm:sp3d/>
+    <dgm:txPr/>
+    <dgm:style>
+      <a:lnRef idx="2">
+        <a:scrgbClr r="0" g="0" b="0"/>
+      </a:lnRef>
+      <a:fillRef idx="1">
+        <a:scrgbClr r="0" g="0" b="0"/>
+      </a:fillRef>
+      <a:effectRef idx="0">
+        <a:scrgbClr r="0" g="0" b="0"/>
+      </a:effectRef>
+      <a:fontRef idx="minor"/>
+    </dgm:style>
+  </dgm:styleLbl>
+  <dgm:styleLbl name="sibTrans2D1">
+    <dgm:scene3d>
+      <a:camera prst="orthographicFront"/>
+      <a:lightRig rig="threePt" dir="t"/>
+    </dgm:scene3d>
+    <dgm:sp3d/>
+    <dgm:txPr/>
+    <dgm:style>
+      <a:lnRef idx="0">
+        <a:scrgbClr r="0" g="0" b="0"/>
+      </a:lnRef>
+      <a:fillRef idx="1">
+        <a:scrgbClr r="0" g="0" b="0"/>
+      </a:fillRef>
+      <a:effectRef idx="0">
+        <a:scrgbClr r="0" g="0" b="0"/>
+      </a:effectRef>
+      <a:fontRef idx="minor">
+        <a:schemeClr val="lt1"/>
+      </a:fontRef>
+    </dgm:style>
+  </dgm:styleLbl>
+  <dgm:styleLbl name="fgSibTrans2D1">
+    <dgm:scene3d>
+      <a:camera prst="orthographicFront"/>
+      <a:lightRig rig="threePt" dir="t"/>
+    </dgm:scene3d>
+    <dgm:sp3d/>
+    <dgm:txPr/>
+    <dgm:style>
+      <a:lnRef idx="0">
+        <a:scrgbClr r="0" g="0" b="0"/>
+      </a:lnRef>
+      <a:fillRef idx="1">
+        <a:scrgbClr r="0" g="0" b="0"/>
+      </a:fillRef>
+      <a:effectRef idx="0">
+        <a:scrgbClr r="0" g="0" b="0"/>
+      </a:effectRef>
+      <a:fontRef idx="minor">
+        <a:schemeClr val="lt1"/>
+      </a:fontRef>
+    </dgm:style>
+  </dgm:styleLbl>
+  <dgm:styleLbl name="bgSibTrans2D1">
+    <dgm:scene3d>
+      <a:camera prst="orthographicFront"/>
+      <a:lightRig rig="threePt" dir="t"/>
+    </dgm:scene3d>
+    <dgm:sp3d/>
+    <dgm:txPr/>
+    <dgm:style>
+      <a:lnRef idx="0">
+        <a:scrgbClr r="0" g="0" b="0"/>
+      </a:lnRef>
+      <a:fillRef idx="1">
+        <a:scrgbClr r="0" g="0" b="0"/>
+      </a:fillRef>
+      <a:effectRef idx="0">
+        <a:scrgbClr r="0" g="0" b="0"/>
+      </a:effectRef>
+      <a:fontRef idx="minor">
+        <a:schemeClr val="lt1"/>
+      </a:fontRef>
+    </dgm:style>
+  </dgm:styleLbl>
+  <dgm:styleLbl name="sibTrans1D1">
+    <dgm:scene3d>
+      <a:camera prst="orthographicFront"/>
+      <a:lightRig rig="threePt" dir="t"/>
+    </dgm:scene3d>
+    <dgm:sp3d/>
+    <dgm:txPr/>
+    <dgm:style>
+      <a:lnRef idx="1">
+        <a:scrgbClr r="0" g="0" b="0"/>
+      </a:lnRef>
+      <a:fillRef idx="0">
+        <a:scrgbClr r="0" g="0" b="0"/>
+      </a:fillRef>
+      <a:effectRef idx="0">
+        <a:scrgbClr r="0" g="0" b="0"/>
+      </a:effectRef>
+      <a:fontRef idx="minor"/>
+    </dgm:style>
+  </dgm:styleLbl>
+  <dgm:styleLbl name="callout">
+    <dgm:scene3d>
+      <a:camera prst="orthographicFront"/>
+      <a:lightRig rig="threePt" dir="t"/>
+    </dgm:scene3d>
+    <dgm:sp3d/>
+    <dgm:txPr/>
+    <dgm:style>
+      <a:lnRef idx="2">
+        <a:scrgbClr r="0" g="0" b="0"/>
+      </a:lnRef>
+      <a:fillRef idx="1">
+        <a:scrgbClr r="0" g="0" b="0"/>
+      </a:fillRef>
+      <a:effectRef idx="0">
+        <a:scrgbClr r="0" g="0" b="0"/>
+      </a:effectRef>
+      <a:fontRef idx="minor"/>
+    </dgm:style>
+  </dgm:styleLbl>
+  <dgm:styleLbl name="asst0">
+    <dgm:scene3d>
+      <a:camera prst="orthographicFront"/>
+      <a:lightRig rig="threePt" dir="t"/>
+    </dgm:scene3d>
+    <dgm:sp3d/>
+    <dgm:txPr/>
+    <dgm:style>
+      <a:lnRef idx="2">
+        <a:scrgbClr r="0" g="0" b="0"/>
+      </a:lnRef>
+      <a:fillRef idx="1">
+        <a:scrgbClr r="0" g="0" b="0"/>
+      </a:fillRef>
+      <a:effectRef idx="0">
+        <a:scrgbClr r="0" g="0" b="0"/>
+      </a:effectRef>
+      <a:fontRef idx="minor">
+        <a:schemeClr val="lt1"/>
+      </a:fontRef>
+    </dgm:style>
+  </dgm:styleLbl>
+  <dgm:styleLbl name="asst1">
+    <dgm:scene3d>
+      <a:camera prst="orthographicFront"/>
+      <a:lightRig rig="threePt" dir="t"/>
+    </dgm:scene3d>
+    <dgm:sp3d/>
+    <dgm:txPr/>
+    <dgm:style>
+      <a:lnRef idx="2">
+        <a:scrgbClr r="0" g="0" b="0"/>
+      </a:lnRef>
+      <a:fillRef idx="1">
+        <a:scrgbClr r="0" g="0" b="0"/>
+      </a:fillRef>
+      <a:effectRef idx="0">
+        <a:scrgbClr r="0" g="0" b="0"/>
+      </a:effectRef>
+      <a:fontRef idx="minor">
+        <a:schemeClr val="lt1"/>
+      </a:fontRef>
+    </dgm:style>
+  </dgm:styleLbl>
+  <dgm:styleLbl name="asst2">
+    <dgm:scene3d>
+      <a:camera prst="orthographicFront"/>
+      <a:lightRig rig="threePt" dir="t"/>
+    </dgm:scene3d>
+    <dgm:sp3d/>
+    <dgm:txPr/>
+    <dgm:style>
+      <a:lnRef idx="2">
+        <a:scrgbClr r="0" g="0" b="0"/>
+      </a:lnRef>
+      <a:fillRef idx="1">
+        <a:scrgbClr r="0" g="0" b="0"/>
+      </a:fillRef>
+      <a:effectRef idx="0">
+        <a:scrgbClr r="0" g="0" b="0"/>
+      </a:effectRef>
+      <a:fontRef idx="minor">
+        <a:schemeClr val="lt1"/>
+      </a:fontRef>
+    </dgm:style>
+  </dgm:styleLbl>
+  <dgm:styleLbl name="asst3">
+    <dgm:scene3d>
+      <a:camera prst="orthographicFront"/>
+      <a:lightRig rig="threePt" dir="t"/>
+    </dgm:scene3d>
+    <dgm:sp3d/>
+    <dgm:txPr/>
+    <dgm:style>
+      <a:lnRef idx="2">
+        <a:scrgbClr r="0" g="0" b="0"/>
+      </a:lnRef>
+      <a:fillRef idx="1">
+        <a:scrgbClr r="0" g="0" b="0"/>
+      </a:fillRef>
+      <a:effectRef idx="0">
+        <a:scrgbClr r="0" g="0" b="0"/>
+      </a:effectRef>
+      <a:fontRef idx="minor">
+        <a:schemeClr val="lt1"/>
+      </a:fontRef>
+    </dgm:style>
+  </dgm:styleLbl>
+  <dgm:styleLbl name="asst4">
+    <dgm:scene3d>
+      <a:camera prst="orthographicFront"/>
+      <a:lightRig rig="threePt" dir="t"/>
+    </dgm:scene3d>
+    <dgm:sp3d/>
+    <dgm:txPr/>
+    <dgm:style>
+      <a:lnRef idx="2">
+        <a:scrgbClr r="0" g="0" b="0"/>
+      </a:lnRef>
+      <a:fillRef idx="1">
+        <a:scrgbClr r="0" g="0" b="0"/>
+      </a:fillRef>
+      <a:effectRef idx="0">
+        <a:scrgbClr r="0" g="0" b="0"/>
+      </a:effectRef>
+      <a:fontRef idx="minor">
+        <a:schemeClr val="lt1"/>
+      </a:fontRef>
+    </dgm:style>
+  </dgm:styleLbl>
+  <dgm:styleLbl name="parChTrans2D1">
+    <dgm:scene3d>
+      <a:camera prst="orthographicFront"/>
+      <a:lightRig rig="threePt" dir="t"/>
+    </dgm:scene3d>
+    <dgm:sp3d/>
+    <dgm:txPr/>
+    <dgm:style>
+      <a:lnRef idx="2">
+        <a:scrgbClr r="0" g="0" b="0"/>
+      </a:lnRef>
+      <a:fillRef idx="1">
+        <a:scrgbClr r="0" g="0" b="0"/>
+      </a:fillRef>
+      <a:effectRef idx="0">
+        <a:scrgbClr r="0" g="0" b="0"/>
+      </a:effectRef>
+      <a:fontRef idx="minor">
+        <a:schemeClr val="lt1"/>
+      </a:fontRef>
+    </dgm:style>
+  </dgm:styleLbl>
+  <dgm:styleLbl name="parChTrans2D2">
+    <dgm:scene3d>
+      <a:camera prst="orthographicFront"/>
+      <a:lightRig rig="threePt" dir="t"/>
+    </dgm:scene3d>
+    <dgm:sp3d/>
+    <dgm:txPr/>
+    <dgm:style>
+      <a:lnRef idx="2">
+        <a:scrgbClr r="0" g="0" b="0"/>
+      </a:lnRef>
+      <a:fillRef idx="1">
+        <a:scrgbClr r="0" g="0" b="0"/>
+      </a:fillRef>
+      <a:effectRef idx="0">
+        <a:scrgbClr r="0" g="0" b="0"/>
+      </a:effectRef>
+      <a:fontRef idx="minor">
+        <a:schemeClr val="lt1"/>
+      </a:fontRef>
+    </dgm:style>
+  </dgm:styleLbl>
+  <dgm:styleLbl name="parChTrans2D3">
+    <dgm:scene3d>
+      <a:camera prst="orthographicFront"/>
+      <a:lightRig rig="threePt" dir="t"/>
+    </dgm:scene3d>
+    <dgm:sp3d/>
+    <dgm:txPr/>
+    <dgm:style>
+      <a:lnRef idx="2">
+        <a:scrgbClr r="0" g="0" b="0"/>
+      </a:lnRef>
+      <a:fillRef idx="1">
+        <a:scrgbClr r="0" g="0" b="0"/>
+      </a:fillRef>
+      <a:effectRef idx="0">
+        <a:scrgbClr r="0" g="0" b="0"/>
+      </a:effectRef>
+      <a:fontRef idx="minor">
+        <a:schemeClr val="lt1"/>
+      </a:fontRef>
+    </dgm:style>
+  </dgm:styleLbl>
+  <dgm:styleLbl name="parChTrans2D4">
+    <dgm:scene3d>
+      <a:camera prst="orthographicFront"/>
+      <a:lightRig rig="threePt" dir="t"/>
+    </dgm:scene3d>
+    <dgm:sp3d/>
+    <dgm:txPr/>
+    <dgm:style>
+      <a:lnRef idx="2">
+        <a:scrgbClr r="0" g="0" b="0"/>
+      </a:lnRef>
+      <a:fillRef idx="1">
+        <a:scrgbClr r="0" g="0" b="0"/>
+      </a:fillRef>
+      <a:effectRef idx="0">
+        <a:scrgbClr r="0" g="0" b="0"/>
+      </a:effectRef>
+      <a:fontRef idx="minor">
+        <a:schemeClr val="lt1"/>
+      </a:fontRef>
+    </dgm:style>
+  </dgm:styleLbl>
+  <dgm:styleLbl name="parChTrans1D1">
+    <dgm:scene3d>
+      <a:camera prst="orthographicFront"/>
+      <a:lightRig rig="threePt" dir="t"/>
+    </dgm:scene3d>
+    <dgm:sp3d/>
+    <dgm:txPr/>
+    <dgm:style>
+      <a:lnRef idx="2">
+        <a:scrgbClr r="0" g="0" b="0"/>
+      </a:lnRef>
+      <a:fillRef idx="0">
+        <a:scrgbClr r="0" g="0" b="0"/>
+      </a:fillRef>
+      <a:effectRef idx="0">
+        <a:scrgbClr r="0" g="0" b="0"/>
+      </a:effectRef>
+      <a:fontRef idx="minor"/>
+    </dgm:style>
+  </dgm:styleLbl>
+  <dgm:styleLbl name="parChTrans1D2">
+    <dgm:scene3d>
+      <a:camera prst="orthographicFront"/>
+      <a:lightRig rig="threePt" dir="t"/>
+    </dgm:scene3d>
+    <dgm:sp3d/>
+    <dgm:txPr/>
+    <dgm:style>
+      <a:lnRef idx="2">
+        <a:scrgbClr r="0" g="0" b="0"/>
+      </a:lnRef>
+      <a:fillRef idx="0">
+        <a:scrgbClr r="0" g="0" b="0"/>
+      </a:fillRef>
+      <a:effectRef idx="0">
+        <a:scrgbClr r="0" g="0" b="0"/>
+      </a:effectRef>
+      <a:fontRef idx="minor"/>
+    </dgm:style>
+  </dgm:styleLbl>
+  <dgm:styleLbl name="parChTrans1D3">
+    <dgm:scene3d>
+      <a:camera prst="orthographicFront"/>
+      <a:lightRig rig="threePt" dir="t"/>
+    </dgm:scene3d>
+    <dgm:sp3d/>
+    <dgm:txPr/>
+    <dgm:style>
+      <a:lnRef idx="2">
+        <a:scrgbClr r="0" g="0" b="0"/>
+      </a:lnRef>
+      <a:fillRef idx="0">
+        <a:scrgbClr r="0" g="0" b="0"/>
+      </a:fillRef>
+      <a:effectRef idx="0">
+        <a:scrgbClr r="0" g="0" b="0"/>
+      </a:effectRef>
+      <a:fontRef idx="minor"/>
+    </dgm:style>
+  </dgm:styleLbl>
+  <dgm:styleLbl name="parChTrans1D4">
+    <dgm:scene3d>
+      <a:camera prst="orthographicFront"/>
+      <a:lightRig rig="threePt" dir="t"/>
+    </dgm:scene3d>
+    <dgm:sp3d/>
+    <dgm:txPr/>
+    <dgm:style>
+      <a:lnRef idx="2">
+        <a:scrgbClr r="0" g="0" b="0"/>
+      </a:lnRef>
+      <a:fillRef idx="0">
+        <a:scrgbClr r="0" g="0" b="0"/>
+      </a:fillRef>
+      <a:effectRef idx="0">
+        <a:scrgbClr r="0" g="0" b="0"/>
+      </a:effectRef>
+      <a:fontRef idx="minor"/>
+    </dgm:style>
+  </dgm:styleLbl>
+  <dgm:styleLbl name="fgAcc1">
+    <dgm:scene3d>
+      <a:camera prst="orthographicFront"/>
+      <a:lightRig rig="threePt" dir="t"/>
+    </dgm:scene3d>
+    <dgm:sp3d/>
+    <dgm:txPr/>
+    <dgm:style>
+      <a:lnRef idx="2">
+        <a:scrgbClr r="0" g="0" b="0"/>
+      </a:lnRef>
+      <a:fillRef idx="1">
+        <a:scrgbClr r="0" g="0" b="0"/>
+      </a:fillRef>
+      <a:effectRef idx="0">
+        <a:scrgbClr r="0" g="0" b="0"/>
+      </a:effectRef>
+      <a:fontRef idx="minor"/>
+    </dgm:style>
+  </dgm:styleLbl>
+  <dgm:styleLbl name="conFgAcc1">
+    <dgm:scene3d>
+      <a:camera prst="orthographicFront"/>
+      <a:lightRig rig="threePt" dir="t"/>
+    </dgm:scene3d>
+    <dgm:sp3d/>
+    <dgm:txPr/>
+    <dgm:style>
+      <a:lnRef idx="2">
+        <a:scrgbClr r="0" g="0" b="0"/>
+      </a:lnRef>
+      <a:fillRef idx="1">
+        <a:scrgbClr r="0" g="0" b="0"/>
+      </a:fillRef>
+      <a:effectRef idx="0">
+        <a:scrgbClr r="0" g="0" b="0"/>
+      </a:effectRef>
+      <a:fontRef idx="minor"/>
+    </dgm:style>
+  </dgm:styleLbl>
+  <dgm:styleLbl name="alignAcc1">
+    <dgm:scene3d>
+      <a:camera prst="orthographicFront"/>
+      <a:lightRig rig="threePt" dir="t"/>
+    </dgm:scene3d>
+    <dgm:sp3d/>
+    <dgm:txPr/>
+    <dgm:style>
+      <a:lnRef idx="2">
+        <a:scrgbClr r="0" g="0" b="0"/>
+      </a:lnRef>
+      <a:fillRef idx="1">
+        <a:scrgbClr r="0" g="0" b="0"/>
+      </a:fillRef>
+      <a:effectRef idx="0">
+        <a:scrgbClr r="0" g="0" b="0"/>
+      </a:effectRef>
+      <a:fontRef idx="minor"/>
+    </dgm:style>
+  </dgm:styleLbl>
+  <dgm:styleLbl name="trAlignAcc1">
+    <dgm:scene3d>
+      <a:camera prst="orthographicFront"/>
+      <a:lightRig rig="threePt" dir="t"/>
+    </dgm:scene3d>
+    <dgm:sp3d/>
+    <dgm:txPr/>
+    <dgm:style>
+      <a:lnRef idx="1">
+        <a:scrgbClr r="0" g="0" b="0"/>
+      </a:lnRef>
+      <a:fillRef idx="1">
+        <a:scrgbClr r="0" g="0" b="0"/>
+      </a:fillRef>
+      <a:effectRef idx="0">
+        <a:scrgbClr r="0" g="0" b="0"/>
+      </a:effectRef>
+      <a:fontRef idx="minor"/>
+    </dgm:style>
+  </dgm:styleLbl>
+  <dgm:styleLbl name="bgAcc1">
+    <dgm:scene3d>
+      <a:camera prst="orthographicFront"/>
+      <a:lightRig rig="threePt" dir="t"/>
+    </dgm:scene3d>
+    <dgm:sp3d/>
+    <dgm:txPr/>
+    <dgm:style>
+      <a:lnRef idx="2">
+        <a:scrgbClr r="0" g="0" b="0"/>
+      </a:lnRef>
+      <a:fillRef idx="1">
+        <a:scrgbClr r="0" g="0" b="0"/>
+      </a:fillRef>
+      <a:effectRef idx="0">
+        <a:scrgbClr r="0" g="0" b="0"/>
+      </a:effectRef>
+      <a:fontRef idx="minor"/>
+    </dgm:style>
+  </dgm:styleLbl>
+  <dgm:styleLbl name="solidFgAcc1">
+    <dgm:scene3d>
+      <a:camera prst="orthographicFront"/>
+      <a:lightRig rig="threePt" dir="t"/>
+    </dgm:scene3d>
+    <dgm:sp3d/>
+    <dgm:txPr/>
+    <dgm:style>
+      <a:lnRef idx="2">
+        <a:scrgbClr r="0" g="0" b="0"/>
+      </a:lnRef>
+      <a:fillRef idx="1">
+        <a:scrgbClr r="0" g="0" b="0"/>
+      </a:fillRef>
+      <a:effectRef idx="0">
+        <a:scrgbClr r="0" g="0" b="0"/>
+      </a:effectRef>
+      <a:fontRef idx="minor"/>
+    </dgm:style>
+  </dgm:styleLbl>
+  <dgm:styleLbl name="solidAlignAcc1">
+    <dgm:scene3d>
+      <a:camera prst="orthographicFront"/>
+      <a:lightRig rig="threePt" dir="t"/>
+    </dgm:scene3d>
+    <dgm:sp3d/>
+    <dgm:txPr/>
+    <dgm:style>
+      <a:lnRef idx="2">
+        <a:scrgbClr r="0" g="0" b="0"/>
+      </a:lnRef>
+      <a:fillRef idx="1">
+        <a:scrgbClr r="0" g="0" b="0"/>
+      </a:fillRef>
+      <a:effectRef idx="0">
+        <a:scrgbClr r="0" g="0" b="0"/>
+      </a:effectRef>
+      <a:fontRef idx="minor"/>
+    </dgm:style>
+  </dgm:styleLbl>
+  <dgm:styleLbl name="solidBgAcc1">
+    <dgm:scene3d>
+      <a:camera prst="orthographicFront"/>
+      <a:lightRig rig="threePt" dir="t"/>
+    </dgm:scene3d>
+    <dgm:sp3d/>
+    <dgm:txPr/>
+    <dgm:style>
+      <a:lnRef idx="2">
+        <a:scrgbClr r="0" g="0" b="0"/>
+      </a:lnRef>
+      <a:fillRef idx="1">
+        <a:scrgbClr r="0" g="0" b="0"/>
+      </a:fillRef>
+      <a:effectRef idx="0">
+        <a:scrgbClr r="0" g="0" b="0"/>
+      </a:effectRef>
+      <a:fontRef idx="minor"/>
+    </dgm:style>
+  </dgm:styleLbl>
+  <dgm:styleLbl name="fgAccFollowNode1">
+    <dgm:scene3d>
+      <a:camera prst="orthographicFront"/>
+      <a:lightRig rig="threePt" dir="t"/>
+    </dgm:scene3d>
+    <dgm:sp3d/>
+    <dgm:txPr/>
+    <dgm:style>
+      <a:lnRef idx="2">
+        <a:scrgbClr r="0" g="0" b="0"/>
+      </a:lnRef>
+      <a:fillRef idx="1">
+        <a:scrgbClr r="0" g="0" b="0"/>
+      </a:fillRef>
+      <a:effectRef idx="0">
+        <a:scrgbClr r="0" g="0" b="0"/>
+      </a:effectRef>
+      <a:fontRef idx="minor"/>
+    </dgm:style>
+  </dgm:styleLbl>
+  <dgm:styleLbl name="alignAccFollowNode1">
+    <dgm:scene3d>
+      <a:camera prst="orthographicFront"/>
+      <a:lightRig rig="threePt" dir="t"/>
+    </dgm:scene3d>
+    <dgm:sp3d/>
+    <dgm:txPr/>
+    <dgm:style>
+      <a:lnRef idx="2">
+        <a:scrgbClr r="0" g="0" b="0"/>
+      </a:lnRef>
+      <a:fillRef idx="1">
+        <a:scrgbClr r="0" g="0" b="0"/>
+      </a:fillRef>
+      <a:effectRef idx="0">
+        <a:scrgbClr r="0" g="0" b="0"/>
+      </a:effectRef>
+      <a:fontRef idx="minor"/>
+    </dgm:style>
+  </dgm:styleLbl>
+  <dgm:styleLbl name="bgAccFollowNode1">
+    <dgm:scene3d>
+      <a:camera prst="orthographicFront"/>
+      <a:lightRig rig="threePt" dir="t"/>
+    </dgm:scene3d>
+    <dgm:sp3d/>
+    <dgm:txPr/>
+    <dgm:style>
+      <a:lnRef idx="2">
+        <a:scrgbClr r="0" g="0" b="0"/>
+      </a:lnRef>
+      <a:fillRef idx="1">
+        <a:scrgbClr r="0" g="0" b="0"/>
+      </a:fillRef>
+      <a:effectRef idx="0">
+        <a:scrgbClr r="0" g="0" b="0"/>
+      </a:effectRef>
+      <a:fontRef idx="minor"/>
+    </dgm:style>
+  </dgm:styleLbl>
+  <dgm:styleLbl name="fgAcc0">
+    <dgm:scene3d>
+      <a:camera prst="orthographicFront"/>
+      <a:lightRig rig="threePt" dir="t"/>
+    </dgm:scene3d>
+    <dgm:sp3d/>
+    <dgm:txPr/>
+    <dgm:style>
+      <a:lnRef idx="2">
+        <a:scrgbClr r="0" g="0" b="0"/>
+      </a:lnRef>
+      <a:fillRef idx="1">
+        <a:scrgbClr r="0" g="0" b="0"/>
+      </a:fillRef>
+      <a:effectRef idx="0">
+        <a:scrgbClr r="0" g="0" b="0"/>
+      </a:effectRef>
+      <a:fontRef idx="minor"/>
+    </dgm:style>
+  </dgm:styleLbl>
+  <dgm:styleLbl name="fgAcc2">
+    <dgm:scene3d>
+      <a:camera prst="orthographicFront"/>
+      <a:lightRig rig="threePt" dir="t"/>
+    </dgm:scene3d>
+    <dgm:sp3d/>
+    <dgm:txPr/>
+    <dgm:style>
+      <a:lnRef idx="2">
+        <a:scrgbClr r="0" g="0" b="0"/>
+      </a:lnRef>
+      <a:fillRef idx="1">
+        <a:scrgbClr r="0" g="0" b="0"/>
+      </a:fillRef>
+      <a:effectRef idx="0">
+        <a:scrgbClr r="0" g="0" b="0"/>
+      </a:effectRef>
+      <a:fontRef idx="minor"/>
+    </dgm:style>
+  </dgm:styleLbl>
+  <dgm:styleLbl name="fgAcc3">
+    <dgm:scene3d>
+      <a:camera prst="orthographicFront"/>
+      <a:lightRig rig="threePt" dir="t"/>
+    </dgm:scene3d>
+    <dgm:sp3d/>
+    <dgm:txPr/>
+    <dgm:style>
+      <a:lnRef idx="2">
+        <a:scrgbClr r="0" g="0" b="0"/>
+      </a:lnRef>
+      <a:fillRef idx="1">
+        <a:scrgbClr r="0" g="0" b="0"/>
+      </a:fillRef>
+      <a:effectRef idx="0">
+        <a:scrgbClr r="0" g="0" b="0"/>
+      </a:effectRef>
+      <a:fontRef idx="minor"/>
+    </dgm:style>
+  </dgm:styleLbl>
+  <dgm:styleLbl name="fgAcc4">
+    <dgm:scene3d>
+      <a:camera prst="orthographicFront"/>
+      <a:lightRig rig="threePt" dir="t"/>
+    </dgm:scene3d>
+    <dgm:sp3d/>
+    <dgm:txPr/>
+    <dgm:style>
+      <a:lnRef idx="2">
+        <a:scrgbClr r="0" g="0" b="0"/>
+      </a:lnRef>
+      <a:fillRef idx="1">
+        <a:scrgbClr r="0" g="0" b="0"/>
+      </a:fillRef>
+      <a:effectRef idx="0">
+        <a:scrgbClr r="0" g="0" b="0"/>
+      </a:effectRef>
+      <a:fontRef idx="minor"/>
+    </dgm:style>
+  </dgm:styleLbl>
+  <dgm:styleLbl name="bgShp">
+    <dgm:scene3d>
+      <a:camera prst="orthographicFront"/>
+      <a:lightRig rig="threePt" dir="t"/>
+    </dgm:scene3d>
+    <dgm:sp3d/>
+    <dgm:txPr/>
+    <dgm:style>
+      <a:lnRef idx="0">
+        <a:scrgbClr r="0" g="0" b="0"/>
+      </a:lnRef>
+      <a:fillRef idx="1">
+        <a:scrgbClr r="0" g="0" b="0"/>
+      </a:fillRef>
+      <a:effectRef idx="0">
+        <a:scrgbClr r="0" g="0" b="0"/>
+      </a:effectRef>
+      <a:fontRef idx="minor"/>
+    </dgm:style>
+  </dgm:styleLbl>
+  <dgm:styleLbl name="dkBgShp">
+    <dgm:scene3d>
+      <a:camera prst="orthographicFront"/>
+      <a:lightRig rig="threePt" dir="t"/>
+    </dgm:scene3d>
+    <dgm:sp3d/>
+    <dgm:txPr/>
+    <dgm:style>
+      <a:lnRef idx="0">
+        <a:scrgbClr r="0" g="0" b="0"/>
+      </a:lnRef>
+      <a:fillRef idx="1">
+        <a:scrgbClr r="0" g="0" b="0"/>
+      </a:fillRef>
+      <a:effectRef idx="0">
+        <a:scrgbClr r="0" g="0" b="0"/>
+      </a:effectRef>
+      <a:fontRef idx="minor"/>
+    </dgm:style>
+  </dgm:styleLbl>
+  <dgm:styleLbl name="trBgShp">
+    <dgm:scene3d>
+      <a:camera prst="orthographicFront"/>
+      <a:lightRig rig="threePt" dir="t"/>
+    </dgm:scene3d>
+    <dgm:sp3d/>
+    <dgm:txPr/>
+    <dgm:style>
+      <a:lnRef idx="0">
+        <a:scrgbClr r="0" g="0" b="0"/>
+      </a:lnRef>
+      <a:fillRef idx="1">
+        <a:scrgbClr r="0" g="0" b="0"/>
+      </a:fillRef>
+      <a:effectRef idx="0">
+        <a:scrgbClr r="0" g="0" b="0"/>
+      </a:effectRef>
+      <a:fontRef idx="minor"/>
+    </dgm:style>
+  </dgm:styleLbl>
+  <dgm:styleLbl name="fgShp">
+    <dgm:scene3d>
+      <a:camera prst="orthographicFront"/>
+      <a:lightRig rig="threePt" dir="t"/>
+    </dgm:scene3d>
+    <dgm:sp3d/>
+    <dgm:txPr/>
+    <dgm:style>
+      <a:lnRef idx="2">
+        <a:scrgbClr r="0" g="0" b="0"/>
+      </a:lnRef>
+      <a:fillRef idx="1">
+        <a:scrgbClr r="0" g="0" b="0"/>
+      </a:fillRef>
+      <a:effectRef idx="0">
+        <a:scrgbClr r="0" g="0" b="0"/>
+      </a:effectRef>
+      <a:fontRef idx="minor"/>
+    </dgm:style>
+  </dgm:styleLbl>
+  <dgm:styleLbl name="revTx">
+    <dgm:scene3d>
+      <a:camera prst="orthographicFront"/>
+      <a:lightRig rig="threePt" dir="t"/>
+    </dgm:scene3d>
+    <dgm:sp3d/>
+    <dgm:txPr/>
+    <dgm:style>
+      <a:lnRef idx="0">
+        <a:scrgbClr r="0" g="0" b="0"/>
+      </a:lnRef>
+      <a:fillRef idx="0">
+        <a:scrgbClr r="0" g="0" b="0"/>
+      </a:fillRef>
+      <a:effectRef idx="0">
+        <a:scrgbClr r="0" g="0" b="0"/>
+      </a:effectRef>
+      <a:fontRef idx="minor"/>
+    </dgm:style>
+  </dgm:styleLbl>
+</dgm:styleDef>
+</file>
+
 <file path=ppt/notesMasters/notesMaster1.xml><?xml version="1.0" encoding="utf-8"?>
 <p:notesMaster xmlns:a="http://schemas.openxmlformats.org/drawingml/2006/main" xmlns:r="http://schemas.openxmlformats.org/officeDocument/2006/relationships" xmlns:p="http://schemas.openxmlformats.org/presentationml/2006/main">
   <p:cSld>
@@ -202,7 +2443,7 @@
             <a:fld id="{86A6A338-5E60-4AC9-B283-A898931FB0A1}" type="datetimeFigureOut">
               <a:rPr lang="en-AU" smtClean="0"/>
               <a:pPr/>
-              <a:t>23/07/2010</a:t>
+              <a:t>1/11/2010</a:t>
             </a:fld>
             <a:endParaRPr lang="en-AU"/>
           </a:p>
@@ -727,7 +2968,117 @@
             <a:fld id="{9965E4C6-BEFA-461A-9D1C-3128EBE9C339}" type="slidenum">
               <a:rPr lang="en-AU" smtClean="0"/>
               <a:pPr/>
-              <a:t>4</a:t>
+              <a:t>6</a:t>
+            </a:fld>
+            <a:endParaRPr lang="en-AU"/>
+          </a:p>
+        </p:txBody>
+      </p:sp>
+    </p:spTree>
+  </p:cSld>
+  <p:clrMapOvr>
+    <a:masterClrMapping/>
+  </p:clrMapOvr>
+</p:notes>
+</file>
+
+<file path=ppt/notesSlides/notesSlide4.xml><?xml version="1.0" encoding="utf-8"?>
+<p:notes xmlns:a="http://schemas.openxmlformats.org/drawingml/2006/main" xmlns:r="http://schemas.openxmlformats.org/officeDocument/2006/relationships" xmlns:p="http://schemas.openxmlformats.org/presentationml/2006/main">
+  <p:cSld>
+    <p:spTree>
+      <p:nvGrpSpPr>
+        <p:cNvPr id="1" name=""/>
+        <p:cNvGrpSpPr/>
+        <p:nvPr/>
+      </p:nvGrpSpPr>
+      <p:grpSpPr>
+        <a:xfrm>
+          <a:off x="0" y="0"/>
+          <a:ext cx="0" cy="0"/>
+          <a:chOff x="0" y="0"/>
+          <a:chExt cx="0" cy="0"/>
+        </a:xfrm>
+      </p:grpSpPr>
+      <p:sp>
+        <p:nvSpPr>
+          <p:cNvPr id="2" name="Slide Image Placeholder 1"/>
+          <p:cNvSpPr>
+            <a:spLocks noGrp="1" noRot="1" noChangeAspect="1"/>
+          </p:cNvSpPr>
+          <p:nvPr>
+            <p:ph type="sldImg"/>
+          </p:nvPr>
+        </p:nvSpPr>
+        <p:spPr/>
+      </p:sp>
+      <p:sp>
+        <p:nvSpPr>
+          <p:cNvPr id="3" name="Notes Placeholder 2"/>
+          <p:cNvSpPr>
+            <a:spLocks noGrp="1"/>
+          </p:cNvSpPr>
+          <p:nvPr>
+            <p:ph type="body" idx="1"/>
+          </p:nvPr>
+        </p:nvSpPr>
+        <p:spPr/>
+        <p:txBody>
+          <a:bodyPr>
+            <a:normAutofit/>
+          </a:bodyPr>
+          <a:lstStyle/>
+          <a:p>
+            <a:r>
+              <a:rPr lang="en-AU" dirty="0" smtClean="0"/>
+              <a:t>Jump to</a:t>
+            </a:r>
+            <a:r>
+              <a:rPr lang="en-AU" baseline="0" dirty="0" smtClean="0"/>
+              <a:t> </a:t>
+            </a:r>
+            <a:r>
+              <a:rPr lang="en-AU" baseline="0" dirty="0" err="1" smtClean="0"/>
+              <a:t>StoryQ</a:t>
+            </a:r>
+            <a:r>
+              <a:rPr lang="en-AU" baseline="0" dirty="0" smtClean="0"/>
+              <a:t> Converter</a:t>
+            </a:r>
+          </a:p>
+          <a:p>
+            <a:r>
+              <a:rPr lang="en-AU" baseline="0" dirty="0" smtClean="0"/>
+              <a:t>Write first specification</a:t>
+            </a:r>
+          </a:p>
+          <a:p>
+            <a:r>
+              <a:rPr lang="en-AU" baseline="0" dirty="0" smtClean="0"/>
+              <a:t>Show report</a:t>
+            </a:r>
+            <a:endParaRPr lang="en-AU" dirty="0"/>
+          </a:p>
+        </p:txBody>
+      </p:sp>
+      <p:sp>
+        <p:nvSpPr>
+          <p:cNvPr id="4" name="Slide Number Placeholder 3"/>
+          <p:cNvSpPr>
+            <a:spLocks noGrp="1"/>
+          </p:cNvSpPr>
+          <p:nvPr>
+            <p:ph type="sldNum" sz="quarter" idx="10"/>
+          </p:nvPr>
+        </p:nvSpPr>
+        <p:spPr/>
+        <p:txBody>
+          <a:bodyPr/>
+          <a:lstStyle/>
+          <a:p>
+            <a:fld id="{9965E4C6-BEFA-461A-9D1C-3128EBE9C339}" type="slidenum">
+              <a:rPr lang="en-AU" smtClean="0"/>
+              <a:pPr/>
+              <a:t>9</a:t>
             </a:fld>
             <a:endParaRPr lang="en-AU"/>
           </a:p>
@@ -923,7 +3274,7 @@
             <a:fld id="{56F824FB-4E7C-457B-8E7E-4E137938C231}" type="datetimeFigureOut">
               <a:rPr lang="en-AU" smtClean="0"/>
               <a:pPr/>
-              <a:t>23/07/2010</a:t>
+              <a:t>1/11/2010</a:t>
             </a:fld>
             <a:endParaRPr lang="en-AU"/>
           </a:p>
@@ -1090,7 +3441,7 @@
             <a:fld id="{56F824FB-4E7C-457B-8E7E-4E137938C231}" type="datetimeFigureOut">
               <a:rPr lang="en-AU" smtClean="0"/>
               <a:pPr/>
-              <a:t>23/07/2010</a:t>
+              <a:t>1/11/2010</a:t>
             </a:fld>
             <a:endParaRPr lang="en-AU"/>
           </a:p>
@@ -1267,7 +3618,7 @@
             <a:fld id="{56F824FB-4E7C-457B-8E7E-4E137938C231}" type="datetimeFigureOut">
               <a:rPr lang="en-AU" smtClean="0"/>
               <a:pPr/>
-              <a:t>23/07/2010</a:t>
+              <a:t>1/11/2010</a:t>
             </a:fld>
             <a:endParaRPr lang="en-AU"/>
           </a:p>
@@ -1434,7 +3785,7 @@
             <a:fld id="{56F824FB-4E7C-457B-8E7E-4E137938C231}" type="datetimeFigureOut">
               <a:rPr lang="en-AU" smtClean="0"/>
               <a:pPr/>
-              <a:t>23/07/2010</a:t>
+              <a:t>1/11/2010</a:t>
             </a:fld>
             <a:endParaRPr lang="en-AU"/>
           </a:p>
@@ -1677,7 +4028,7 @@
             <a:fld id="{56F824FB-4E7C-457B-8E7E-4E137938C231}" type="datetimeFigureOut">
               <a:rPr lang="en-AU" smtClean="0"/>
               <a:pPr/>
-              <a:t>23/07/2010</a:t>
+              <a:t>1/11/2010</a:t>
             </a:fld>
             <a:endParaRPr lang="en-AU"/>
           </a:p>
@@ -1962,7 +4313,7 @@
             <a:fld id="{56F824FB-4E7C-457B-8E7E-4E137938C231}" type="datetimeFigureOut">
               <a:rPr lang="en-AU" smtClean="0"/>
               <a:pPr/>
-              <a:t>23/07/2010</a:t>
+              <a:t>1/11/2010</a:t>
             </a:fld>
             <a:endParaRPr lang="en-AU"/>
           </a:p>
@@ -2381,7 +4732,7 @@
             <a:fld id="{56F824FB-4E7C-457B-8E7E-4E137938C231}" type="datetimeFigureOut">
               <a:rPr lang="en-AU" smtClean="0"/>
               <a:pPr/>
-              <a:t>23/07/2010</a:t>
+              <a:t>1/11/2010</a:t>
             </a:fld>
             <a:endParaRPr lang="en-AU"/>
           </a:p>
@@ -2496,7 +4847,7 @@
             <a:fld id="{56F824FB-4E7C-457B-8E7E-4E137938C231}" type="datetimeFigureOut">
               <a:rPr lang="en-AU" smtClean="0"/>
               <a:pPr/>
-              <a:t>23/07/2010</a:t>
+              <a:t>1/11/2010</a:t>
             </a:fld>
             <a:endParaRPr lang="en-AU"/>
           </a:p>
@@ -2588,7 +4939,7 @@
             <a:fld id="{56F824FB-4E7C-457B-8E7E-4E137938C231}" type="datetimeFigureOut">
               <a:rPr lang="en-AU" smtClean="0"/>
               <a:pPr/>
-              <a:t>23/07/2010</a:t>
+              <a:t>1/11/2010</a:t>
             </a:fld>
             <a:endParaRPr lang="en-AU"/>
           </a:p>
@@ -2862,7 +5213,7 @@
             <a:fld id="{56F824FB-4E7C-457B-8E7E-4E137938C231}" type="datetimeFigureOut">
               <a:rPr lang="en-AU" smtClean="0"/>
               <a:pPr/>
-              <a:t>23/07/2010</a:t>
+              <a:t>1/11/2010</a:t>
             </a:fld>
             <a:endParaRPr lang="en-AU"/>
           </a:p>
@@ -3112,7 +5463,7 @@
             <a:fld id="{56F824FB-4E7C-457B-8E7E-4E137938C231}" type="datetimeFigureOut">
               <a:rPr lang="en-AU" smtClean="0"/>
               <a:pPr/>
-              <a:t>23/07/2010</a:t>
+              <a:t>1/11/2010</a:t>
             </a:fld>
             <a:endParaRPr lang="en-AU"/>
           </a:p>
@@ -3322,7 +5673,7 @@
             <a:fld id="{56F824FB-4E7C-457B-8E7E-4E137938C231}" type="datetimeFigureOut">
               <a:rPr lang="en-AU" smtClean="0"/>
               <a:pPr/>
-              <a:t>23/07/2010</a:t>
+              <a:t>1/11/2010</a:t>
             </a:fld>
             <a:endParaRPr lang="en-AU"/>
           </a:p>
@@ -3848,6 +6199,38 @@
           </a:ln>
         </p:spPr>
       </p:pic>
+      <p:pic>
+        <p:nvPicPr>
+          <p:cNvPr id="2050" name="Picture 2"/>
+          <p:cNvPicPr>
+            <a:picLocks noChangeAspect="1" noChangeArrowheads="1"/>
+          </p:cNvPicPr>
+          <p:nvPr/>
+        </p:nvPicPr>
+        <p:blipFill>
+          <a:blip r:embed="rId3"/>
+          <a:srcRect/>
+          <a:stretch>
+            <a:fillRect/>
+          </a:stretch>
+        </p:blipFill>
+        <p:spPr bwMode="auto">
+          <a:xfrm>
+            <a:off x="642910" y="3571876"/>
+            <a:ext cx="2781316" cy="2781316"/>
+          </a:xfrm>
+          <a:prstGeom prst="rect">
+            <a:avLst/>
+          </a:prstGeom>
+          <a:noFill/>
+          <a:ln w="9525">
+            <a:noFill/>
+            <a:miter lim="800000"/>
+            <a:headEnd/>
+            <a:tailEnd/>
+          </a:ln>
+        </p:spPr>
+      </p:pic>
     </p:spTree>
   </p:cSld>
   <p:clrMapOvr>
@@ -3856,7 +6239,174 @@
   <p:timing>
     <p:tnLst>
       <p:par>
-        <p:cTn id="1" dur="indefinite" restart="never" nodeType="tmRoot"/>
+        <p:cTn id="1" dur="indefinite" restart="never" nodeType="tmRoot">
+          <p:childTnLst>
+            <p:seq concurrent="1" nextAc="seek">
+              <p:cTn id="2" dur="indefinite" nodeType="mainSeq">
+                <p:childTnLst>
+                  <p:par>
+                    <p:cTn id="3" fill="hold">
+                      <p:stCondLst>
+                        <p:cond delay="indefinite"/>
+                      </p:stCondLst>
+                      <p:childTnLst>
+                        <p:par>
+                          <p:cTn id="4" fill="hold">
+                            <p:stCondLst>
+                              <p:cond delay="0"/>
+                            </p:stCondLst>
+                            <p:childTnLst>
+                              <p:par>
+                                <p:cTn id="5" presetID="2" presetClass="entr" presetSubtype="2" fill="hold" nodeType="clickEffect">
+                                  <p:stCondLst>
+                                    <p:cond delay="0"/>
+                                  </p:stCondLst>
+                                  <p:childTnLst>
+                                    <p:set>
+                                      <p:cBhvr>
+                                        <p:cTn id="6" dur="1" fill="hold">
+                                          <p:stCondLst>
+                                            <p:cond delay="0"/>
+                                          </p:stCondLst>
+                                        </p:cTn>
+                                        <p:tgtEl>
+                                          <p:spTgt spid="2050"/>
+                                        </p:tgtEl>
+                                        <p:attrNameLst>
+                                          <p:attrName>style.visibility</p:attrName>
+                                        </p:attrNameLst>
+                                      </p:cBhvr>
+                                      <p:to>
+                                        <p:strVal val="visible"/>
+                                      </p:to>
+                                    </p:set>
+                                    <p:anim calcmode="lin" valueType="num">
+                                      <p:cBhvr additive="base">
+                                        <p:cTn id="7" dur="2000" fill="hold"/>
+                                        <p:tgtEl>
+                                          <p:spTgt spid="2050"/>
+                                        </p:tgtEl>
+                                        <p:attrNameLst>
+                                          <p:attrName>ppt_x</p:attrName>
+                                        </p:attrNameLst>
+                                      </p:cBhvr>
+                                      <p:tavLst>
+                                        <p:tav tm="0">
+                                          <p:val>
+                                            <p:strVal val="1+#ppt_w/2"/>
+                                          </p:val>
+                                        </p:tav>
+                                        <p:tav tm="100000">
+                                          <p:val>
+                                            <p:strVal val="#ppt_x"/>
+                                          </p:val>
+                                        </p:tav>
+                                      </p:tavLst>
+                                    </p:anim>
+                                    <p:anim calcmode="lin" valueType="num">
+                                      <p:cBhvr additive="base">
+                                        <p:cTn id="8" dur="2000" fill="hold"/>
+                                        <p:tgtEl>
+                                          <p:spTgt spid="2050"/>
+                                        </p:tgtEl>
+                                        <p:attrNameLst>
+                                          <p:attrName>ppt_y</p:attrName>
+                                        </p:attrNameLst>
+                                      </p:cBhvr>
+                                      <p:tavLst>
+                                        <p:tav tm="0">
+                                          <p:val>
+                                            <p:strVal val="#ppt_y"/>
+                                          </p:val>
+                                        </p:tav>
+                                        <p:tav tm="100000">
+                                          <p:val>
+                                            <p:strVal val="#ppt_y"/>
+                                          </p:val>
+                                        </p:tav>
+                                      </p:tavLst>
+                                    </p:anim>
+                                  </p:childTnLst>
+                                </p:cTn>
+                              </p:par>
+                            </p:childTnLst>
+                          </p:cTn>
+                        </p:par>
+                      </p:childTnLst>
+                    </p:cTn>
+                  </p:par>
+                  <p:par>
+                    <p:cTn id="9" fill="hold">
+                      <p:stCondLst>
+                        <p:cond delay="indefinite"/>
+                      </p:stCondLst>
+                      <p:childTnLst>
+                        <p:par>
+                          <p:cTn id="10" fill="hold">
+                            <p:stCondLst>
+                              <p:cond delay="0"/>
+                            </p:stCondLst>
+                            <p:childTnLst>
+                              <p:par>
+                                <p:cTn id="11" presetID="10" presetClass="exit" presetSubtype="0" fill="hold" nodeType="clickEffect">
+                                  <p:stCondLst>
+                                    <p:cond delay="0"/>
+                                  </p:stCondLst>
+                                  <p:childTnLst>
+                                    <p:animEffect transition="out" filter="fade">
+                                      <p:cBhvr>
+                                        <p:cTn id="12" dur="3000"/>
+                                        <p:tgtEl>
+                                          <p:spTgt spid="2050"/>
+                                        </p:tgtEl>
+                                      </p:cBhvr>
+                                    </p:animEffect>
+                                    <p:set>
+                                      <p:cBhvr>
+                                        <p:cTn id="13" dur="1" fill="hold">
+                                          <p:stCondLst>
+                                            <p:cond delay="2999"/>
+                                          </p:stCondLst>
+                                        </p:cTn>
+                                        <p:tgtEl>
+                                          <p:spTgt spid="2050"/>
+                                        </p:tgtEl>
+                                        <p:attrNameLst>
+                                          <p:attrName>style.visibility</p:attrName>
+                                        </p:attrNameLst>
+                                      </p:cBhvr>
+                                      <p:to>
+                                        <p:strVal val="hidden"/>
+                                      </p:to>
+                                    </p:set>
+                                  </p:childTnLst>
+                                </p:cTn>
+                              </p:par>
+                            </p:childTnLst>
+                          </p:cTn>
+                        </p:par>
+                      </p:childTnLst>
+                    </p:cTn>
+                  </p:par>
+                </p:childTnLst>
+              </p:cTn>
+              <p:prevCondLst>
+                <p:cond evt="onPrev" delay="0">
+                  <p:tgtEl>
+                    <p:sldTgt/>
+                  </p:tgtEl>
+                </p:cond>
+              </p:prevCondLst>
+              <p:nextCondLst>
+                <p:cond evt="onNext" delay="0">
+                  <p:tgtEl>
+                    <p:sldTgt/>
+                  </p:tgtEl>
+                </p:cond>
+              </p:nextCondLst>
+            </p:seq>
+          </p:childTnLst>
+        </p:cTn>
       </p:par>
     </p:tnLst>
   </p:timing>
@@ -3882,77 +6432,63 @@
       </p:grpSpPr>
       <p:sp>
         <p:nvSpPr>
-          <p:cNvPr id="2" name="Title 1"/>
-          <p:cNvSpPr>
-            <a:spLocks noGrp="1"/>
-          </p:cNvSpPr>
-          <p:nvPr>
-            <p:ph type="title"/>
-          </p:nvPr>
-        </p:nvSpPr>
-        <p:spPr/>
+          <p:cNvPr id="3" name="Content Placeholder 2"/>
+          <p:cNvSpPr>
+            <a:spLocks noGrp="1"/>
+          </p:cNvSpPr>
+          <p:nvPr>
+            <p:ph idx="1"/>
+          </p:nvPr>
+        </p:nvSpPr>
+        <p:spPr>
+          <a:xfrm>
+            <a:off x="467544" y="1124744"/>
+            <a:ext cx="8229600" cy="4525963"/>
+          </a:xfrm>
+        </p:spPr>
         <p:txBody>
           <a:bodyPr/>
           <a:lstStyle/>
           <a:p>
+            <a:pPr>
+              <a:buNone/>
+            </a:pPr>
             <a:r>
               <a:rPr lang="en-AU" dirty="0" smtClean="0"/>
-              <a:t>Meet the competition</a:t>
-            </a:r>
-            <a:endParaRPr lang="en-AU" dirty="0"/>
-          </a:p>
-        </p:txBody>
-      </p:sp>
-      <p:sp>
-        <p:nvSpPr>
-          <p:cNvPr id="3" name="Content Placeholder 2"/>
-          <p:cNvSpPr>
-            <a:spLocks noGrp="1"/>
-          </p:cNvSpPr>
-          <p:nvPr>
-            <p:ph idx="1"/>
-          </p:nvPr>
-        </p:nvSpPr>
-        <p:spPr/>
-        <p:txBody>
-          <a:bodyPr/>
-          <a:lstStyle/>
-          <a:p>
+              <a:t>with scenario Generate a hash </a:t>
+            </a:r>
             <a:r>
               <a:rPr lang="en-AU" dirty="0" err="1" smtClean="0"/>
-              <a:t>MSPec</a:t>
-            </a:r>
+              <a:t>repeatably</a:t>
+            </a:r>
+            <a:endParaRPr lang="en-AU" dirty="0" smtClean="0"/>
+          </a:p>
+          <a:p>
+            <a:pPr>
+              <a:buNone/>
+            </a:pPr>
             <a:r>
               <a:rPr lang="en-AU" dirty="0" smtClean="0"/>
-              <a:t> </a:t>
-            </a:r>
-            <a:r>
-              <a:rPr lang="en-AU" dirty="0" smtClean="0">
-                <a:hlinkClick r:id="rId2"/>
-              </a:rPr>
-              <a:t>http://github.com/machine/machine.specifications</a:t>
-            </a:r>
-            <a:endParaRPr lang="en-AU" dirty="0" smtClean="0"/>
-          </a:p>
-          <a:p>
-            <a:r>
-              <a:rPr lang="en-AU" dirty="0" err="1" smtClean="0"/>
-              <a:t>Specflow</a:t>
-            </a:r>
+              <a:t>given a string "A man is rich in proportion to the number of things he can afford to let alone."</a:t>
+            </a:r>
+          </a:p>
+          <a:p>
+            <a:pPr>
+              <a:buNone/>
+            </a:pPr>
             <a:r>
               <a:rPr lang="en-AU" dirty="0" smtClean="0"/>
-              <a:t> </a:t>
-            </a:r>
-            <a:r>
-              <a:rPr lang="en-AU" dirty="0" smtClean="0">
-                <a:hlinkClick r:id="rId3"/>
-              </a:rPr>
-              <a:t>http://www.specflow.org/</a:t>
-            </a:r>
-            <a:endParaRPr lang="en-AU" dirty="0" smtClean="0"/>
-          </a:p>
-          <a:p>
-            <a:endParaRPr lang="en-AU" dirty="0"/>
+              <a:t>when a hash is generated twice</a:t>
+            </a:r>
+          </a:p>
+          <a:p>
+            <a:pPr>
+              <a:buNone/>
+            </a:pPr>
+            <a:r>
+              <a:rPr lang="en-AU" dirty="0" smtClean="0"/>
+              <a:t>then the first result is equal to the second result</a:t>
+            </a:r>
           </a:p>
         </p:txBody>
       </p:sp>
@@ -3968,6 +6504,379 @@
       </p:par>
     </p:tnLst>
   </p:timing>
+</p:sld>
+</file>
+
+<file path=ppt/slides/slide11.xml><?xml version="1.0" encoding="utf-8"?>
+<p:sld xmlns:a="http://schemas.openxmlformats.org/drawingml/2006/main" xmlns:r="http://schemas.openxmlformats.org/officeDocument/2006/relationships" xmlns:p="http://schemas.openxmlformats.org/presentationml/2006/main">
+  <p:cSld>
+    <p:spTree>
+      <p:nvGrpSpPr>
+        <p:cNvPr id="1" name=""/>
+        <p:cNvGrpSpPr/>
+        <p:nvPr/>
+      </p:nvGrpSpPr>
+      <p:grpSpPr>
+        <a:xfrm>
+          <a:off x="0" y="0"/>
+          <a:ext cx="0" cy="0"/>
+          <a:chOff x="0" y="0"/>
+          <a:chExt cx="0" cy="0"/>
+        </a:xfrm>
+      </p:grpSpPr>
+      <p:sp>
+        <p:nvSpPr>
+          <p:cNvPr id="4" name="TextBox 3"/>
+          <p:cNvSpPr txBox="1"/>
+          <p:nvPr/>
+        </p:nvSpPr>
+        <p:spPr>
+          <a:xfrm>
+            <a:off x="467544" y="1124744"/>
+            <a:ext cx="8208912" cy="3539430"/>
+          </a:xfrm>
+          <a:prstGeom prst="rect">
+            <a:avLst/>
+          </a:prstGeom>
+          <a:noFill/>
+        </p:spPr>
+        <p:txBody>
+          <a:bodyPr wrap="square" rtlCol="0">
+            <a:spAutoFit/>
+          </a:bodyPr>
+          <a:lstStyle/>
+          <a:p>
+            <a:r>
+              <a:rPr lang="en-AU" sz="3200" dirty="0" smtClean="0"/>
+              <a:t>with scenario Generate different hashes</a:t>
+            </a:r>
+          </a:p>
+          <a:p>
+            <a:r>
+              <a:rPr lang="en-AU" sz="3200" dirty="0" smtClean="0"/>
+              <a:t>given the strings "cellar door" and "A man is rich in proportion to the number of things he can afford to let alone."</a:t>
+            </a:r>
+          </a:p>
+          <a:p>
+            <a:r>
+              <a:rPr lang="en-AU" sz="3200" dirty="0" smtClean="0"/>
+              <a:t>when a hash is generated for each string</a:t>
+            </a:r>
+          </a:p>
+          <a:p>
+            <a:r>
+              <a:rPr lang="en-AU" sz="3200" dirty="0" smtClean="0"/>
+              <a:t>then the first result is not equal to the second result</a:t>
+            </a:r>
+            <a:endParaRPr lang="en-AU" sz="3200" dirty="0"/>
+          </a:p>
+        </p:txBody>
+      </p:sp>
+    </p:spTree>
+  </p:cSld>
+  <p:clrMapOvr>
+    <a:masterClrMapping/>
+  </p:clrMapOvr>
+  <p:timing>
+    <p:tnLst>
+      <p:par>
+        <p:cTn id="1" dur="indefinite" restart="never" nodeType="tmRoot"/>
+      </p:par>
+    </p:tnLst>
+  </p:timing>
+</p:sld>
+</file>
+
+<file path=ppt/slides/slide12.xml><?xml version="1.0" encoding="utf-8"?>
+<p:sld xmlns:a="http://schemas.openxmlformats.org/drawingml/2006/main" xmlns:r="http://schemas.openxmlformats.org/officeDocument/2006/relationships" xmlns:p="http://schemas.openxmlformats.org/presentationml/2006/main">
+  <p:cSld>
+    <p:spTree>
+      <p:nvGrpSpPr>
+        <p:cNvPr id="1" name=""/>
+        <p:cNvGrpSpPr/>
+        <p:nvPr/>
+      </p:nvGrpSpPr>
+      <p:grpSpPr>
+        <a:xfrm>
+          <a:off x="0" y="0"/>
+          <a:ext cx="0" cy="0"/>
+          <a:chOff x="0" y="0"/>
+          <a:chExt cx="0" cy="0"/>
+        </a:xfrm>
+      </p:grpSpPr>
+      <p:sp>
+        <p:nvSpPr>
+          <p:cNvPr id="2" name="Title 1"/>
+          <p:cNvSpPr>
+            <a:spLocks noGrp="1"/>
+          </p:cNvSpPr>
+          <p:nvPr>
+            <p:ph type="title"/>
+          </p:nvPr>
+        </p:nvSpPr>
+        <p:spPr/>
+        <p:txBody>
+          <a:bodyPr/>
+          <a:lstStyle/>
+          <a:p>
+            <a:r>
+              <a:rPr lang="en-AU" dirty="0" err="1" smtClean="0"/>
+              <a:t>StoryQ</a:t>
+            </a:r>
+            <a:endParaRPr lang="en-AU" dirty="0"/>
+          </a:p>
+        </p:txBody>
+      </p:sp>
+      <p:sp>
+        <p:nvSpPr>
+          <p:cNvPr id="3" name="Content Placeholder 2"/>
+          <p:cNvSpPr>
+            <a:spLocks noGrp="1"/>
+          </p:cNvSpPr>
+          <p:nvPr>
+            <p:ph idx="1"/>
+          </p:nvPr>
+        </p:nvSpPr>
+        <p:spPr/>
+        <p:txBody>
+          <a:bodyPr/>
+          <a:lstStyle/>
+          <a:p>
+            <a:pPr>
+              <a:buNone/>
+            </a:pPr>
+            <a:r>
+              <a:rPr lang="en-AU" dirty="0" smtClean="0">
+                <a:hlinkClick r:id="rId2"/>
+              </a:rPr>
+              <a:t>http://storyq.codeplex.com/</a:t>
+            </a:r>
+            <a:endParaRPr lang="en-AU" dirty="0" smtClean="0"/>
+          </a:p>
+          <a:p>
+            <a:pPr>
+              <a:buNone/>
+            </a:pPr>
+            <a:endParaRPr lang="en-AU" dirty="0"/>
+          </a:p>
+        </p:txBody>
+      </p:sp>
+    </p:spTree>
+  </p:cSld>
+  <p:clrMapOvr>
+    <a:masterClrMapping/>
+  </p:clrMapOvr>
+  <p:timing>
+    <p:tnLst>
+      <p:par>
+        <p:cTn id="1" dur="indefinite" restart="never" nodeType="tmRoot"/>
+      </p:par>
+    </p:tnLst>
+  </p:timing>
+</p:sld>
+</file>
+
+<file path=ppt/slides/slide13.xml><?xml version="1.0" encoding="utf-8"?>
+<p:sld xmlns:a="http://schemas.openxmlformats.org/drawingml/2006/main" xmlns:r="http://schemas.openxmlformats.org/officeDocument/2006/relationships" xmlns:p="http://schemas.openxmlformats.org/presentationml/2006/main">
+  <p:cSld>
+    <p:spTree>
+      <p:nvGrpSpPr>
+        <p:cNvPr id="1" name=""/>
+        <p:cNvGrpSpPr/>
+        <p:nvPr/>
+      </p:nvGrpSpPr>
+      <p:grpSpPr>
+        <a:xfrm>
+          <a:off x="0" y="0"/>
+          <a:ext cx="0" cy="0"/>
+          <a:chOff x="0" y="0"/>
+          <a:chExt cx="0" cy="0"/>
+        </a:xfrm>
+      </p:grpSpPr>
+      <p:sp>
+        <p:nvSpPr>
+          <p:cNvPr id="2" name="Title 1"/>
+          <p:cNvSpPr>
+            <a:spLocks noGrp="1"/>
+          </p:cNvSpPr>
+          <p:nvPr>
+            <p:ph type="title"/>
+          </p:nvPr>
+        </p:nvSpPr>
+        <p:spPr/>
+        <p:txBody>
+          <a:bodyPr/>
+          <a:lstStyle/>
+          <a:p>
+            <a:r>
+              <a:rPr lang="en-AU" dirty="0" smtClean="0"/>
+              <a:t>Meet the competition</a:t>
+            </a:r>
+            <a:endParaRPr lang="en-AU" dirty="0"/>
+          </a:p>
+        </p:txBody>
+      </p:sp>
+      <p:sp>
+        <p:nvSpPr>
+          <p:cNvPr id="3" name="Content Placeholder 2"/>
+          <p:cNvSpPr>
+            <a:spLocks noGrp="1"/>
+          </p:cNvSpPr>
+          <p:nvPr>
+            <p:ph idx="1"/>
+          </p:nvPr>
+        </p:nvSpPr>
+        <p:spPr/>
+        <p:txBody>
+          <a:bodyPr/>
+          <a:lstStyle/>
+          <a:p>
+            <a:r>
+              <a:rPr lang="en-AU" dirty="0" err="1" smtClean="0"/>
+              <a:t>MSPec</a:t>
+            </a:r>
+            <a:r>
+              <a:rPr lang="en-AU" dirty="0" smtClean="0"/>
+              <a:t> </a:t>
+            </a:r>
+            <a:r>
+              <a:rPr lang="en-AU" dirty="0" smtClean="0">
+                <a:hlinkClick r:id="rId2"/>
+              </a:rPr>
+              <a:t>http://github.com/machine/machine.specifications</a:t>
+            </a:r>
+            <a:endParaRPr lang="en-AU" dirty="0" smtClean="0"/>
+          </a:p>
+          <a:p>
+            <a:r>
+              <a:rPr lang="en-AU" dirty="0" err="1" smtClean="0"/>
+              <a:t>Specflow</a:t>
+            </a:r>
+            <a:r>
+              <a:rPr lang="en-AU" dirty="0" smtClean="0"/>
+              <a:t> </a:t>
+            </a:r>
+            <a:r>
+              <a:rPr lang="en-AU" dirty="0" smtClean="0">
+                <a:hlinkClick r:id="rId3"/>
+              </a:rPr>
+              <a:t>http://www.specflow.org/</a:t>
+            </a:r>
+            <a:endParaRPr lang="en-AU" dirty="0" smtClean="0"/>
+          </a:p>
+          <a:p>
+            <a:endParaRPr lang="en-AU" dirty="0"/>
+          </a:p>
+        </p:txBody>
+      </p:sp>
+    </p:spTree>
+  </p:cSld>
+  <p:clrMapOvr>
+    <a:masterClrMapping/>
+  </p:clrMapOvr>
+  <p:timing>
+    <p:tnLst>
+      <p:par>
+        <p:cTn id="1" dur="indefinite" restart="never" nodeType="tmRoot"/>
+      </p:par>
+    </p:tnLst>
+  </p:timing>
+</p:sld>
+</file>
+
+<file path=ppt/slides/slide14.xml><?xml version="1.0" encoding="utf-8"?>
+<p:sld xmlns:a="http://schemas.openxmlformats.org/drawingml/2006/main" xmlns:r="http://schemas.openxmlformats.org/officeDocument/2006/relationships" xmlns:p="http://schemas.openxmlformats.org/presentationml/2006/main">
+  <p:cSld>
+    <p:spTree>
+      <p:nvGrpSpPr>
+        <p:cNvPr id="1" name=""/>
+        <p:cNvGrpSpPr/>
+        <p:nvPr/>
+      </p:nvGrpSpPr>
+      <p:grpSpPr>
+        <a:xfrm>
+          <a:off x="0" y="0"/>
+          <a:ext cx="0" cy="0"/>
+          <a:chOff x="0" y="0"/>
+          <a:chExt cx="0" cy="0"/>
+        </a:xfrm>
+      </p:grpSpPr>
+      <p:sp>
+        <p:nvSpPr>
+          <p:cNvPr id="2" name="Title 1"/>
+          <p:cNvSpPr>
+            <a:spLocks noGrp="1"/>
+          </p:cNvSpPr>
+          <p:nvPr>
+            <p:ph type="title"/>
+          </p:nvPr>
+        </p:nvSpPr>
+        <p:spPr/>
+        <p:txBody>
+          <a:bodyPr>
+            <a:normAutofit/>
+          </a:bodyPr>
+          <a:lstStyle/>
+          <a:p>
+            <a:r>
+              <a:rPr lang="en-AU" dirty="0" smtClean="0"/>
+              <a:t>Still Don’t Get BDD?</a:t>
+            </a:r>
+            <a:endParaRPr lang="en-AU" dirty="0"/>
+          </a:p>
+        </p:txBody>
+      </p:sp>
+      <p:sp>
+        <p:nvSpPr>
+          <p:cNvPr id="3" name="Content Placeholder 2"/>
+          <p:cNvSpPr>
+            <a:spLocks noGrp="1"/>
+          </p:cNvSpPr>
+          <p:nvPr>
+            <p:ph idx="1"/>
+          </p:nvPr>
+        </p:nvSpPr>
+        <p:spPr/>
+        <p:txBody>
+          <a:bodyPr/>
+          <a:lstStyle/>
+          <a:p>
+            <a:r>
+              <a:rPr lang="en-GB" dirty="0" smtClean="0">
+                <a:hlinkClick r:id="rId2"/>
+              </a:rPr>
+              <a:t>http://dannorth.net/introducing-bdd</a:t>
+            </a:r>
+            <a:endParaRPr lang="en-GB" dirty="0" smtClean="0"/>
+          </a:p>
+          <a:p>
+            <a:r>
+              <a:rPr lang="en-AU" dirty="0" smtClean="0">
+                <a:hlinkClick r:id="rId3"/>
+              </a:rPr>
+              <a:t>http://</a:t>
+            </a:r>
+            <a:r>
+              <a:rPr lang="en-AU" dirty="0" smtClean="0">
+                <a:hlinkClick r:id="rId3"/>
+              </a:rPr>
+              <a:t>www.code-magazine.com/article.aspx?quickid=0805061</a:t>
+            </a:r>
+            <a:endParaRPr lang="en-AU" dirty="0" smtClean="0"/>
+          </a:p>
+          <a:p>
+            <a:pPr>
+              <a:buNone/>
+            </a:pPr>
+            <a:endParaRPr lang="en-AU" dirty="0"/>
+          </a:p>
+        </p:txBody>
+      </p:sp>
+    </p:spTree>
+  </p:cSld>
+  <p:clrMapOvr>
+    <a:masterClrMapping/>
+  </p:clrMapOvr>
 </p:sld>
 </file>
 
@@ -4233,64 +7142,78 @@
       </p:grpSpPr>
       <p:sp>
         <p:nvSpPr>
-          <p:cNvPr id="2" name="Title 1"/>
-          <p:cNvSpPr>
-            <a:spLocks noGrp="1"/>
-          </p:cNvSpPr>
-          <p:nvPr>
-            <p:ph type="title"/>
-          </p:nvPr>
-        </p:nvSpPr>
-        <p:spPr/>
-        <p:txBody>
-          <a:bodyPr>
-            <a:normAutofit fontScale="90000"/>
+          <p:cNvPr id="4" name="TextBox 3"/>
+          <p:cNvSpPr txBox="1"/>
+          <p:nvPr/>
+        </p:nvSpPr>
+        <p:spPr>
+          <a:xfrm>
+            <a:off x="500034" y="1142984"/>
+            <a:ext cx="8286808" cy="3046988"/>
+          </a:xfrm>
+          <a:prstGeom prst="rect">
+            <a:avLst/>
+          </a:prstGeom>
+          <a:noFill/>
+        </p:spPr>
+        <p:txBody>
+          <a:bodyPr wrap="square" rtlCol="0">
+            <a:spAutoFit/>
           </a:bodyPr>
           <a:lstStyle/>
           <a:p>
-            <a:r>
-              <a:rPr lang="en-AU" b="1" dirty="0" smtClean="0"/>
-              <a:t>Behaviour-Driven Development Workflow</a:t>
-            </a:r>
-            <a:endParaRPr lang="en-AU" b="1" dirty="0"/>
-          </a:p>
-        </p:txBody>
-      </p:sp>
-      <p:sp>
-        <p:nvSpPr>
-          <p:cNvPr id="3" name="Content Placeholder 2"/>
-          <p:cNvSpPr>
-            <a:spLocks noGrp="1"/>
-          </p:cNvSpPr>
-          <p:nvPr>
-            <p:ph idx="1"/>
-          </p:nvPr>
-        </p:nvSpPr>
-        <p:spPr/>
-        <p:txBody>
-          <a:bodyPr/>
-          <a:lstStyle/>
-          <a:p>
-            <a:r>
-              <a:rPr lang="en-AU" dirty="0" smtClean="0"/>
-              <a:t>Write the user stories that define the features of the application</a:t>
-            </a:r>
-          </a:p>
-          <a:p>
-            <a:r>
-              <a:rPr lang="en-AU" dirty="0" smtClean="0"/>
-              <a:t>For each story list the behaviours of the application in the context / specification style (arrange, act, assert)</a:t>
-            </a:r>
-          </a:p>
-          <a:p>
-            <a:r>
-              <a:rPr lang="en-AU" dirty="0" smtClean="0"/>
-              <a:t>Implement the specifications until everything is passing</a:t>
-            </a:r>
-            <a:endParaRPr lang="en-AU" dirty="0"/>
-          </a:p>
-        </p:txBody>
-      </p:sp>
+            <a:pPr algn="just"/>
+            <a:r>
+              <a:rPr lang="en-GB" sz="3200" dirty="0" smtClean="0"/>
+              <a:t>“Behaviour-driven development is about implementing an application by describing its behaviour from the perspective of its stakeholders”</a:t>
+            </a:r>
+          </a:p>
+          <a:p>
+            <a:pPr algn="just"/>
+            <a:endParaRPr lang="en-GB" sz="3200" dirty="0" smtClean="0"/>
+          </a:p>
+          <a:p>
+            <a:pPr algn="just"/>
+            <a:r>
+              <a:rPr lang="en-GB" sz="3200" dirty="0" smtClean="0"/>
+              <a:t>Dan North</a:t>
+            </a:r>
+            <a:endParaRPr lang="en-AU" sz="3200" dirty="0"/>
+          </a:p>
+        </p:txBody>
+      </p:sp>
+      <p:pic>
+        <p:nvPicPr>
+          <p:cNvPr id="1026" name="Picture 2"/>
+          <p:cNvPicPr>
+            <a:picLocks noChangeAspect="1" noChangeArrowheads="1"/>
+          </p:cNvPicPr>
+          <p:nvPr/>
+        </p:nvPicPr>
+        <p:blipFill>
+          <a:blip r:embed="rId2"/>
+          <a:srcRect/>
+          <a:stretch>
+            <a:fillRect/>
+          </a:stretch>
+        </p:blipFill>
+        <p:spPr bwMode="auto">
+          <a:xfrm>
+            <a:off x="2500298" y="3500438"/>
+            <a:ext cx="1028700" cy="1447800"/>
+          </a:xfrm>
+          <a:prstGeom prst="rect">
+            <a:avLst/>
+          </a:prstGeom>
+          <a:noFill/>
+          <a:ln w="9525">
+            <a:noFill/>
+            <a:miter lim="800000"/>
+            <a:headEnd/>
+            <a:tailEnd/>
+          </a:ln>
+        </p:spPr>
+      </p:pic>
     </p:spTree>
   </p:cSld>
   <p:clrMapOvr>
@@ -4335,59 +7258,51 @@
         </p:nvSpPr>
         <p:spPr/>
         <p:txBody>
+          <a:bodyPr>
+            <a:normAutofit/>
+          </a:bodyPr>
+          <a:lstStyle/>
+          <a:p>
+            <a:r>
+              <a:rPr lang="en-AU" dirty="0" smtClean="0"/>
+              <a:t>Features</a:t>
+            </a:r>
+            <a:endParaRPr lang="en-AU" dirty="0"/>
+          </a:p>
+        </p:txBody>
+      </p:sp>
+      <p:sp>
+        <p:nvSpPr>
+          <p:cNvPr id="3" name="Content Placeholder 2"/>
+          <p:cNvSpPr>
+            <a:spLocks noGrp="1"/>
+          </p:cNvSpPr>
+          <p:nvPr>
+            <p:ph idx="1"/>
+          </p:nvPr>
+        </p:nvSpPr>
+        <p:spPr/>
+        <p:txBody>
           <a:bodyPr/>
           <a:lstStyle/>
           <a:p>
+            <a:pPr marL="514350" indent="-514350">
+              <a:buFont typeface="+mj-lt"/>
+              <a:buAutoNum type="arabicPeriod"/>
+            </a:pPr>
             <a:r>
               <a:rPr lang="en-AU" dirty="0" smtClean="0"/>
-              <a:t>A String Hasher</a:t>
-            </a:r>
-            <a:endParaRPr lang="en-AU" dirty="0"/>
-          </a:p>
-        </p:txBody>
-      </p:sp>
-      <p:sp>
-        <p:nvSpPr>
-          <p:cNvPr id="3" name="Content Placeholder 2"/>
-          <p:cNvSpPr>
-            <a:spLocks noGrp="1"/>
-          </p:cNvSpPr>
-          <p:nvPr>
-            <p:ph idx="1"/>
-          </p:nvPr>
-        </p:nvSpPr>
-        <p:spPr/>
-        <p:txBody>
-          <a:bodyPr/>
-          <a:lstStyle/>
-          <a:p>
-            <a:pPr>
-              <a:buNone/>
+              <a:t>Tests are written outside-in, using the customer’s language and a simple test grammar.</a:t>
+            </a:r>
+          </a:p>
+          <a:p>
+            <a:pPr marL="514350" indent="-514350">
+              <a:buFont typeface="+mj-lt"/>
+              <a:buAutoNum type="arabicPeriod"/>
             </a:pPr>
             <a:r>
               <a:rPr lang="en-AU" dirty="0" smtClean="0"/>
-              <a:t>User Story: Generate a hash of a string</a:t>
-            </a:r>
-            <a:br>
-              <a:rPr lang="en-AU" dirty="0" smtClean="0"/>
-            </a:br>
-            <a:r>
-              <a:rPr lang="en-AU" dirty="0" smtClean="0"/>
-              <a:t>In order to reliably generate a consistent short representation of some text</a:t>
-            </a:r>
-            <a:br>
-              <a:rPr lang="en-AU" dirty="0" smtClean="0"/>
-            </a:br>
-            <a:r>
-              <a:rPr lang="en-AU" dirty="0" smtClean="0"/>
-              <a:t>As an application user</a:t>
-            </a:r>
-            <a:br>
-              <a:rPr lang="en-AU" dirty="0" smtClean="0"/>
-            </a:br>
-            <a:r>
-              <a:rPr lang="en-AU" dirty="0" smtClean="0"/>
-              <a:t>I want to generate a hash of a string</a:t>
+              <a:t>Tests verify the intended behaviour, not the details of the implementation.</a:t>
             </a:r>
             <a:endParaRPr lang="en-AU" dirty="0"/>
           </a:p>
@@ -4427,107 +7342,50 @@
       </p:grpSpPr>
       <p:sp>
         <p:nvSpPr>
-          <p:cNvPr id="3" name="Content Placeholder 2"/>
-          <p:cNvSpPr>
-            <a:spLocks noGrp="1"/>
-          </p:cNvSpPr>
-          <p:nvPr>
-            <p:ph idx="1"/>
+          <p:cNvPr id="2" name="Title 1"/>
+          <p:cNvSpPr>
+            <a:spLocks noGrp="1"/>
+          </p:cNvSpPr>
+          <p:nvPr>
+            <p:ph type="title"/>
           </p:nvPr>
         </p:nvSpPr>
         <p:spPr>
           <a:xfrm>
-            <a:off x="457200" y="1135285"/>
-            <a:ext cx="8229600" cy="4525963"/>
+            <a:off x="485804" y="71414"/>
+            <a:ext cx="8229600" cy="1143000"/>
           </a:xfrm>
         </p:spPr>
         <p:txBody>
-          <a:bodyPr/>
+          <a:bodyPr>
+            <a:normAutofit fontScale="90000"/>
+          </a:bodyPr>
           <a:lstStyle/>
           <a:p>
-            <a:pPr>
-              <a:buNone/>
-            </a:pPr>
-            <a:r>
-              <a:rPr lang="en-AU" dirty="0" smtClean="0"/>
-              <a:t>Scenario: Generate a hash of a </a:t>
-            </a:r>
-            <a:r>
-              <a:rPr lang="en-AU" dirty="0" smtClean="0"/>
-              <a:t>string</a:t>
-            </a:r>
-            <a:br>
-              <a:rPr lang="en-AU" dirty="0" smtClean="0"/>
-            </a:br>
-            <a:endParaRPr lang="en-AU" dirty="0" smtClean="0"/>
-          </a:p>
-          <a:p>
-            <a:pPr>
-              <a:buNone/>
-            </a:pPr>
-            <a:r>
-              <a:rPr lang="en-AU" dirty="0" smtClean="0"/>
-              <a:t>given </a:t>
-            </a:r>
-            <a:r>
-              <a:rPr lang="en-AU" dirty="0" smtClean="0"/>
-              <a:t>a string "cellar </a:t>
-            </a:r>
-            <a:r>
-              <a:rPr lang="en-AU" dirty="0" smtClean="0"/>
-              <a:t>door”</a:t>
-            </a:r>
-          </a:p>
-          <a:p>
-            <a:pPr>
-              <a:buNone/>
-            </a:pPr>
-            <a:r>
-              <a:rPr lang="en-AU" dirty="0" smtClean="0"/>
-              <a:t>when </a:t>
-            </a:r>
-            <a:r>
-              <a:rPr lang="en-AU" dirty="0" smtClean="0"/>
-              <a:t>the hash is </a:t>
-            </a:r>
-            <a:r>
-              <a:rPr lang="en-AU" dirty="0" smtClean="0"/>
-              <a:t>generated</a:t>
-            </a:r>
-          </a:p>
-          <a:p>
-            <a:pPr>
-              <a:buNone/>
-            </a:pPr>
-            <a:r>
-              <a:rPr lang="en-AU" dirty="0" smtClean="0"/>
-              <a:t>then </a:t>
-            </a:r>
-            <a:r>
-              <a:rPr lang="en-AU" dirty="0" smtClean="0"/>
-              <a:t>the hash is 32 characters </a:t>
-            </a:r>
-            <a:r>
-              <a:rPr lang="en-AU" dirty="0" smtClean="0"/>
-              <a:t>long</a:t>
-            </a:r>
-          </a:p>
-          <a:p>
-            <a:pPr>
-              <a:buNone/>
-            </a:pPr>
-            <a:r>
-              <a:rPr lang="en-AU" dirty="0" smtClean="0"/>
-              <a:t>and </a:t>
-            </a:r>
-            <a:r>
-              <a:rPr lang="en-AU" dirty="0" smtClean="0"/>
-              <a:t>the hash is not equal to the input string</a:t>
-            </a:r>
-            <a:endParaRPr lang="en-AU" dirty="0"/>
-          </a:p>
-        </p:txBody>
-      </p:sp>
+            <a:r>
+              <a:rPr lang="en-AU" b="1" dirty="0" smtClean="0"/>
+              <a:t>Behaviour-Driven Development Workflow</a:t>
+            </a:r>
+            <a:endParaRPr lang="en-AU" b="1" dirty="0"/>
+          </a:p>
+        </p:txBody>
+      </p:sp>
+      <p:graphicFrame>
+        <p:nvGraphicFramePr>
+          <p:cNvPr id="4" name="Diagram 3"/>
+          <p:cNvGraphicFramePr/>
+          <p:nvPr/>
+        </p:nvGraphicFramePr>
+        <p:xfrm>
+          <a:off x="0" y="1071618"/>
+          <a:ext cx="9144000" cy="5857844"/>
+        </p:xfrm>
+        <a:graphic>
+          <a:graphicData uri="http://schemas.openxmlformats.org/drawingml/2006/diagram">
+            <dgm:relIds xmlns:dgm="http://schemas.openxmlformats.org/drawingml/2006/diagram" xmlns:r="http://schemas.openxmlformats.org/officeDocument/2006/relationships" r:dm="rId3" r:lo="rId4" r:qs="rId5" r:cs="rId6"/>
+          </a:graphicData>
+        </a:graphic>
+      </p:graphicFrame>
     </p:spTree>
   </p:cSld>
   <p:clrMapOvr>
@@ -4562,6 +7420,31 @@
       </p:grpSpPr>
       <p:sp>
         <p:nvSpPr>
+          <p:cNvPr id="2" name="Title 1"/>
+          <p:cNvSpPr>
+            <a:spLocks noGrp="1"/>
+          </p:cNvSpPr>
+          <p:nvPr>
+            <p:ph type="title"/>
+          </p:nvPr>
+        </p:nvSpPr>
+        <p:spPr/>
+        <p:txBody>
+          <a:bodyPr>
+            <a:normAutofit/>
+          </a:bodyPr>
+          <a:lstStyle/>
+          <a:p>
+            <a:r>
+              <a:rPr lang="en-AU" dirty="0" smtClean="0"/>
+              <a:t>Hash Functions</a:t>
+            </a:r>
+            <a:endParaRPr lang="en-AU" dirty="0"/>
+          </a:p>
+        </p:txBody>
+      </p:sp>
+      <p:sp>
+        <p:nvSpPr>
           <p:cNvPr id="3" name="Content Placeholder 2"/>
           <p:cNvSpPr>
             <a:spLocks noGrp="1"/>
@@ -4570,82 +7453,49 @@
             <p:ph idx="1"/>
           </p:nvPr>
         </p:nvSpPr>
-        <p:spPr>
-          <a:xfrm>
-            <a:off x="467544" y="1124744"/>
-            <a:ext cx="8229600" cy="4525963"/>
-          </a:xfrm>
-        </p:spPr>
+        <p:spPr/>
         <p:txBody>
           <a:bodyPr/>
           <a:lstStyle/>
           <a:p>
-            <a:pPr>
+            <a:pPr marL="0">
               <a:buNone/>
             </a:pPr>
             <a:r>
               <a:rPr lang="en-AU" dirty="0" smtClean="0"/>
-              <a:t>Scenario: Generate a hash </a:t>
-            </a:r>
-            <a:r>
-              <a:rPr lang="en-AU" dirty="0" err="1" smtClean="0"/>
-              <a:t>repeatably</a:t>
+              <a:t>“A </a:t>
+            </a:r>
+            <a:r>
+              <a:rPr lang="en-AU" b="1" dirty="0" smtClean="0"/>
+              <a:t>hash function</a:t>
             </a:r>
             <a:r>
               <a:rPr lang="en-AU" dirty="0" smtClean="0"/>
-              <a:t/>
-            </a:r>
-            <a:br>
+              <a:t> is any well-defined procedure or mathematical function that converts a large, possibly variable-sized amount of data into a small datum”</a:t>
+            </a:r>
+          </a:p>
+          <a:p>
+            <a:pPr marL="0">
+              <a:buNone/>
+            </a:pPr>
+            <a:endParaRPr lang="en-AU" dirty="0" smtClean="0"/>
+          </a:p>
+          <a:p>
+            <a:pPr marL="0">
+              <a:buNone/>
+            </a:pPr>
+            <a:r>
               <a:rPr lang="en-AU" dirty="0" smtClean="0"/>
-            </a:br>
-            <a:endParaRPr lang="en-AU" dirty="0" smtClean="0"/>
-          </a:p>
-          <a:p>
-            <a:pPr>
+              <a:t>Wikipedia</a:t>
+            </a:r>
+          </a:p>
+          <a:p>
+            <a:pPr marL="0">
               <a:buNone/>
             </a:pPr>
             <a:r>
               <a:rPr lang="en-AU" dirty="0" smtClean="0"/>
-              <a:t>Given </a:t>
-            </a:r>
-            <a:r>
-              <a:rPr lang="en-AU" dirty="0" smtClean="0"/>
-              <a:t>a string "A man is rich in proportion to </a:t>
-            </a:r>
-            <a:r>
-              <a:rPr lang="en-AU" dirty="0" smtClean="0"/>
-              <a:t>the</a:t>
-            </a:r>
-          </a:p>
-          <a:p>
-            <a:pPr>
-              <a:buNone/>
-            </a:pPr>
-            <a:r>
-              <a:rPr lang="en-AU" dirty="0" smtClean="0"/>
-              <a:t>number of things he can afford to let alone."</a:t>
-            </a:r>
-          </a:p>
-          <a:p>
-            <a:pPr>
-              <a:buNone/>
-            </a:pPr>
-            <a:r>
-              <a:rPr lang="en-AU" dirty="0" smtClean="0"/>
-              <a:t>When </a:t>
-            </a:r>
-            <a:r>
-              <a:rPr lang="en-AU" dirty="0" smtClean="0"/>
-              <a:t>a hash is generated twice</a:t>
-            </a:r>
-          </a:p>
-          <a:p>
-            <a:pPr>
-              <a:buNone/>
-            </a:pPr>
-            <a:r>
-              <a:rPr lang="en-AU" dirty="0" smtClean="0"/>
-              <a:t>Then the first result is equal to the second result</a:t>
+              <a:t>http://en.wikipedia.org/wiki/Hash_function</a:t>
             </a:r>
             <a:endParaRPr lang="en-AU" dirty="0"/>
           </a:p>
@@ -4685,20 +7535,138 @@
       </p:grpSpPr>
       <p:sp>
         <p:nvSpPr>
-          <p:cNvPr id="4" name="TextBox 3"/>
-          <p:cNvSpPr txBox="1"/>
-          <p:nvPr/>
+          <p:cNvPr id="2" name="Title 1"/>
+          <p:cNvSpPr>
+            <a:spLocks noGrp="1"/>
+          </p:cNvSpPr>
+          <p:nvPr>
+            <p:ph type="title"/>
+          </p:nvPr>
+        </p:nvSpPr>
+        <p:spPr/>
+        <p:txBody>
+          <a:bodyPr/>
+          <a:lstStyle/>
+          <a:p>
+            <a:r>
+              <a:rPr lang="en-AU" dirty="0" smtClean="0"/>
+              <a:t>A String Hasher</a:t>
+            </a:r>
+            <a:endParaRPr lang="en-AU" dirty="0"/>
+          </a:p>
+        </p:txBody>
+      </p:sp>
+      <p:sp>
+        <p:nvSpPr>
+          <p:cNvPr id="3" name="Content Placeholder 2"/>
+          <p:cNvSpPr>
+            <a:spLocks noGrp="1"/>
+          </p:cNvSpPr>
+          <p:nvPr>
+            <p:ph idx="1"/>
+          </p:nvPr>
         </p:nvSpPr>
         <p:spPr>
           <a:xfrm>
-            <a:off x="467544" y="1124744"/>
-            <a:ext cx="8208912" cy="4031873"/>
+            <a:off x="457200" y="1314448"/>
+            <a:ext cx="8229600" cy="3186122"/>
+          </a:xfrm>
+        </p:spPr>
+        <p:txBody>
+          <a:bodyPr lIns="0"/>
+          <a:lstStyle/>
+          <a:p>
+            <a:pPr marL="0">
+              <a:buNone/>
+            </a:pPr>
+            <a:r>
+              <a:rPr lang="en-AU" dirty="0" smtClean="0"/>
+              <a:t>Story is Generate a hash of a string</a:t>
+            </a:r>
+          </a:p>
+          <a:p>
+            <a:pPr marL="0">
+              <a:buNone/>
+            </a:pPr>
+            <a:r>
+              <a:rPr lang="en-AU" dirty="0" smtClean="0"/>
+              <a:t>In order to reliably generate a consistent short representation of some text</a:t>
+            </a:r>
+          </a:p>
+          <a:p>
+            <a:pPr marL="0">
+              <a:buNone/>
+            </a:pPr>
+            <a:r>
+              <a:rPr lang="en-AU" dirty="0" smtClean="0"/>
+              <a:t>As a application user</a:t>
+            </a:r>
+          </a:p>
+          <a:p>
+            <a:pPr marL="0">
+              <a:buNone/>
+            </a:pPr>
+            <a:r>
+              <a:rPr lang="en-AU" dirty="0" smtClean="0"/>
+              <a:t>I want to generate a hash of a string</a:t>
+            </a:r>
+          </a:p>
+          <a:p>
+            <a:pPr marL="0">
+              <a:buNone/>
+            </a:pPr>
+            <a:endParaRPr lang="en-AU" dirty="0" smtClean="0"/>
+          </a:p>
+          <a:p>
+            <a:pPr marL="0">
+              <a:buNone/>
+            </a:pPr>
+            <a:endParaRPr lang="en-AU" dirty="0" smtClean="0"/>
+          </a:p>
+        </p:txBody>
+      </p:sp>
+      <p:pic>
+        <p:nvPicPr>
+          <p:cNvPr id="3075" name="Picture 3" descr="C:\Users\Liam\AppData\Local\Microsoft\Windows\Temporary Internet Files\Content.IE5\ZJZ9XSQ3\MC900105200[1].wmf"/>
+          <p:cNvPicPr>
+            <a:picLocks noChangeAspect="1" noChangeArrowheads="1"/>
+          </p:cNvPicPr>
+          <p:nvPr/>
+        </p:nvPicPr>
+        <p:blipFill>
+          <a:blip r:embed="rId2"/>
+          <a:srcRect/>
+          <a:stretch>
+            <a:fillRect/>
+          </a:stretch>
+        </p:blipFill>
+        <p:spPr bwMode="auto">
+          <a:xfrm>
+            <a:off x="357158" y="4786322"/>
+            <a:ext cx="1811426" cy="1804111"/>
           </a:xfrm>
           <a:prstGeom prst="rect">
             <a:avLst/>
           </a:prstGeom>
           <a:noFill/>
         </p:spPr>
+      </p:pic>
+      <p:sp>
+        <p:nvSpPr>
+          <p:cNvPr id="6" name="TextBox 5"/>
+          <p:cNvSpPr txBox="1"/>
+          <p:nvPr/>
+        </p:nvSpPr>
+        <p:spPr>
+          <a:xfrm>
+            <a:off x="2428860" y="5137864"/>
+            <a:ext cx="6429420" cy="1077218"/>
+          </a:xfrm>
+          <a:prstGeom prst="rect">
+            <a:avLst/>
+          </a:prstGeom>
+          <a:noFill/>
+        </p:spPr>
         <p:txBody>
           <a:bodyPr wrap="square" rtlCol="0">
             <a:spAutoFit/>
@@ -4707,36 +7675,7 @@
           <a:p>
             <a:r>
               <a:rPr lang="en-AU" sz="3200" dirty="0" smtClean="0"/>
-              <a:t>Scenario: Generate different hashes</a:t>
-            </a:r>
-          </a:p>
-          <a:p>
-            <a:r>
-              <a:rPr lang="en-AU" sz="3200" dirty="0" smtClean="0"/>
-              <a:t/>
-            </a:r>
-            <a:br>
-              <a:rPr lang="en-AU" sz="3200" dirty="0" smtClean="0"/>
-            </a:br>
-            <a:r>
-              <a:rPr lang="en-AU" sz="3200" dirty="0" smtClean="0"/>
-              <a:t>Given </a:t>
-            </a:r>
-            <a:r>
-              <a:rPr lang="en-AU" sz="3200" dirty="0" smtClean="0"/>
-              <a:t>the strings "cellar door" and "A man is rich in proportion to the number of things he can afford to let alone."</a:t>
-            </a:r>
-          </a:p>
-          <a:p>
-            <a:r>
-              <a:rPr lang="en-AU" sz="3200" dirty="0" smtClean="0"/>
-              <a:t>When a hash is generated for each string</a:t>
-            </a:r>
-          </a:p>
-          <a:p>
-            <a:r>
-              <a:rPr lang="en-AU" sz="3200" dirty="0" smtClean="0"/>
-              <a:t>Then the first result is not equal to the second result</a:t>
+              <a:t>What are the properties of a successful hash?</a:t>
             </a:r>
             <a:endParaRPr lang="en-AU" sz="3200" dirty="0"/>
           </a:p>
@@ -4776,57 +7715,67 @@
       </p:grpSpPr>
       <p:sp>
         <p:nvSpPr>
-          <p:cNvPr id="2" name="Title 1"/>
-          <p:cNvSpPr>
-            <a:spLocks noGrp="1"/>
-          </p:cNvSpPr>
-          <p:nvPr>
-            <p:ph type="title"/>
-          </p:nvPr>
-        </p:nvSpPr>
-        <p:spPr/>
+          <p:cNvPr id="3" name="Content Placeholder 2"/>
+          <p:cNvSpPr>
+            <a:spLocks noGrp="1"/>
+          </p:cNvSpPr>
+          <p:nvPr>
+            <p:ph idx="1"/>
+          </p:nvPr>
+        </p:nvSpPr>
+        <p:spPr>
+          <a:xfrm>
+            <a:off x="457200" y="1135285"/>
+            <a:ext cx="8229600" cy="4525963"/>
+          </a:xfrm>
+        </p:spPr>
         <p:txBody>
           <a:bodyPr/>
           <a:lstStyle/>
           <a:p>
-            <a:r>
-              <a:rPr lang="en-AU" dirty="0" err="1" smtClean="0"/>
-              <a:t>StoryQ</a:t>
-            </a:r>
-            <a:endParaRPr lang="en-AU" dirty="0"/>
-          </a:p>
-        </p:txBody>
-      </p:sp>
-      <p:sp>
-        <p:nvSpPr>
-          <p:cNvPr id="3" name="Content Placeholder 2"/>
-          <p:cNvSpPr>
-            <a:spLocks noGrp="1"/>
-          </p:cNvSpPr>
-          <p:nvPr>
-            <p:ph idx="1"/>
-          </p:nvPr>
-        </p:nvSpPr>
-        <p:spPr/>
-        <p:txBody>
-          <a:bodyPr/>
-          <a:lstStyle/>
-          <a:p>
             <a:pPr>
               <a:buNone/>
             </a:pPr>
             <a:r>
-              <a:rPr lang="en-AU" dirty="0" smtClean="0">
-                <a:hlinkClick r:id="rId2"/>
-              </a:rPr>
-              <a:t>http://storyq.codeplex.com/</a:t>
-            </a:r>
-            <a:endParaRPr lang="en-AU" dirty="0" smtClean="0"/>
+              <a:rPr lang="en-AU" dirty="0" smtClean="0"/>
+              <a:t>with scenario Generate a hash of string</a:t>
+            </a:r>
           </a:p>
           <a:p>
             <a:pPr>
               <a:buNone/>
             </a:pPr>
+            <a:r>
+              <a:rPr lang="en-AU" dirty="0" smtClean="0"/>
+              <a:t>given a string "cellar door”</a:t>
+            </a:r>
+          </a:p>
+          <a:p>
+            <a:pPr>
+              <a:buNone/>
+            </a:pPr>
+            <a:r>
+              <a:rPr lang="en-AU" dirty="0" smtClean="0"/>
+              <a:t>when the hash is generated</a:t>
+            </a:r>
+          </a:p>
+          <a:p>
+            <a:pPr>
+              <a:buNone/>
+            </a:pPr>
+            <a:r>
+              <a:rPr lang="en-AU" dirty="0" smtClean="0"/>
+              <a:t>then the hash is 32 characters long</a:t>
+            </a:r>
+          </a:p>
+          <a:p>
+            <a:pPr>
+              <a:buNone/>
+            </a:pPr>
+            <a:r>
+              <a:rPr lang="en-AU" dirty="0" smtClean="0"/>
+              <a:t>and the hash is not equal to the input string</a:t>
+            </a:r>
             <a:endParaRPr lang="en-AU" dirty="0"/>
           </a:p>
         </p:txBody>

</xml_diff>

<commit_message>
added sound to ppt
</commit_message>
<xml_diff>
--- a/storyq/Behaviour-Driven Development.pptx
+++ b/storyq/Behaviour-Driven Development.pptx
@@ -2443,7 +2443,7 @@
             <a:fld id="{86A6A338-5E60-4AC9-B283-A898931FB0A1}" type="datetimeFigureOut">
               <a:rPr lang="en-AU" smtClean="0"/>
               <a:pPr/>
-              <a:t>1/11/2010</a:t>
+              <a:t>3/11/2010</a:t>
             </a:fld>
             <a:endParaRPr lang="en-AU"/>
           </a:p>
@@ -3274,7 +3274,7 @@
             <a:fld id="{56F824FB-4E7C-457B-8E7E-4E137938C231}" type="datetimeFigureOut">
               <a:rPr lang="en-AU" smtClean="0"/>
               <a:pPr/>
-              <a:t>1/11/2010</a:t>
+              <a:t>3/11/2010</a:t>
             </a:fld>
             <a:endParaRPr lang="en-AU"/>
           </a:p>
@@ -3441,7 +3441,7 @@
             <a:fld id="{56F824FB-4E7C-457B-8E7E-4E137938C231}" type="datetimeFigureOut">
               <a:rPr lang="en-AU" smtClean="0"/>
               <a:pPr/>
-              <a:t>1/11/2010</a:t>
+              <a:t>3/11/2010</a:t>
             </a:fld>
             <a:endParaRPr lang="en-AU"/>
           </a:p>
@@ -3618,7 +3618,7 @@
             <a:fld id="{56F824FB-4E7C-457B-8E7E-4E137938C231}" type="datetimeFigureOut">
               <a:rPr lang="en-AU" smtClean="0"/>
               <a:pPr/>
-              <a:t>1/11/2010</a:t>
+              <a:t>3/11/2010</a:t>
             </a:fld>
             <a:endParaRPr lang="en-AU"/>
           </a:p>
@@ -3785,7 +3785,7 @@
             <a:fld id="{56F824FB-4E7C-457B-8E7E-4E137938C231}" type="datetimeFigureOut">
               <a:rPr lang="en-AU" smtClean="0"/>
               <a:pPr/>
-              <a:t>1/11/2010</a:t>
+              <a:t>3/11/2010</a:t>
             </a:fld>
             <a:endParaRPr lang="en-AU"/>
           </a:p>
@@ -4028,7 +4028,7 @@
             <a:fld id="{56F824FB-4E7C-457B-8E7E-4E137938C231}" type="datetimeFigureOut">
               <a:rPr lang="en-AU" smtClean="0"/>
               <a:pPr/>
-              <a:t>1/11/2010</a:t>
+              <a:t>3/11/2010</a:t>
             </a:fld>
             <a:endParaRPr lang="en-AU"/>
           </a:p>
@@ -4313,7 +4313,7 @@
             <a:fld id="{56F824FB-4E7C-457B-8E7E-4E137938C231}" type="datetimeFigureOut">
               <a:rPr lang="en-AU" smtClean="0"/>
               <a:pPr/>
-              <a:t>1/11/2010</a:t>
+              <a:t>3/11/2010</a:t>
             </a:fld>
             <a:endParaRPr lang="en-AU"/>
           </a:p>
@@ -4732,7 +4732,7 @@
             <a:fld id="{56F824FB-4E7C-457B-8E7E-4E137938C231}" type="datetimeFigureOut">
               <a:rPr lang="en-AU" smtClean="0"/>
               <a:pPr/>
-              <a:t>1/11/2010</a:t>
+              <a:t>3/11/2010</a:t>
             </a:fld>
             <a:endParaRPr lang="en-AU"/>
           </a:p>
@@ -4847,7 +4847,7 @@
             <a:fld id="{56F824FB-4E7C-457B-8E7E-4E137938C231}" type="datetimeFigureOut">
               <a:rPr lang="en-AU" smtClean="0"/>
               <a:pPr/>
-              <a:t>1/11/2010</a:t>
+              <a:t>3/11/2010</a:t>
             </a:fld>
             <a:endParaRPr lang="en-AU"/>
           </a:p>
@@ -4939,7 +4939,7 @@
             <a:fld id="{56F824FB-4E7C-457B-8E7E-4E137938C231}" type="datetimeFigureOut">
               <a:rPr lang="en-AU" smtClean="0"/>
               <a:pPr/>
-              <a:t>1/11/2010</a:t>
+              <a:t>3/11/2010</a:t>
             </a:fld>
             <a:endParaRPr lang="en-AU"/>
           </a:p>
@@ -5213,7 +5213,7 @@
             <a:fld id="{56F824FB-4E7C-457B-8E7E-4E137938C231}" type="datetimeFigureOut">
               <a:rPr lang="en-AU" smtClean="0"/>
               <a:pPr/>
-              <a:t>1/11/2010</a:t>
+              <a:t>3/11/2010</a:t>
             </a:fld>
             <a:endParaRPr lang="en-AU"/>
           </a:p>
@@ -5463,7 +5463,7 @@
             <a:fld id="{56F824FB-4E7C-457B-8E7E-4E137938C231}" type="datetimeFigureOut">
               <a:rPr lang="en-AU" smtClean="0"/>
               <a:pPr/>
-              <a:t>1/11/2010</a:t>
+              <a:t>3/11/2010</a:t>
             </a:fld>
             <a:endParaRPr lang="en-AU"/>
           </a:p>
@@ -5673,7 +5673,7 @@
             <a:fld id="{56F824FB-4E7C-457B-8E7E-4E137938C231}" type="datetimeFigureOut">
               <a:rPr lang="en-AU" smtClean="0"/>
               <a:pPr/>
-              <a:t>1/11/2010</a:t>
+              <a:t>3/11/2010</a:t>
             </a:fld>
             <a:endParaRPr lang="en-AU"/>
           </a:p>
@@ -6176,7 +6176,7 @@
           <p:nvPr/>
         </p:nvPicPr>
         <p:blipFill>
-          <a:blip r:embed="rId2" cstate="print"/>
+          <a:blip r:embed="rId3" cstate="print"/>
           <a:srcRect/>
           <a:stretch>
             <a:fillRect/>
@@ -6208,7 +6208,7 @@
           <p:nvPr/>
         </p:nvPicPr>
         <p:blipFill>
-          <a:blip r:embed="rId3"/>
+          <a:blip r:embed="rId4"/>
           <a:srcRect/>
           <a:stretch>
             <a:fillRect/>
@@ -6229,6 +6229,34 @@
             <a:headEnd/>
             <a:tailEnd/>
           </a:ln>
+        </p:spPr>
+      </p:pic>
+      <p:pic>
+        <p:nvPicPr>
+          <p:cNvPr id="6" name="fett.wav">
+            <a:hlinkClick r:id="" action="ppaction://media"/>
+          </p:cNvPr>
+          <p:cNvPicPr>
+            <a:picLocks noRot="1" noChangeAspect="1"/>
+          </p:cNvPicPr>
+          <p:nvPr>
+            <a:audioFile r:link="rId1"/>
+          </p:nvPr>
+        </p:nvPicPr>
+        <p:blipFill>
+          <a:blip r:embed="rId5"/>
+          <a:stretch>
+            <a:fillRect/>
+          </a:stretch>
+        </p:blipFill>
+        <p:spPr>
+          <a:xfrm>
+            <a:off x="4419600" y="3276600"/>
+            <a:ext cx="304800" cy="304800"/>
+          </a:xfrm>
+          <a:prstGeom prst="rect">
+            <a:avLst/>
+          </a:prstGeom>
         </p:spPr>
       </p:pic>
     </p:spTree>
@@ -6385,6 +6413,32 @@
                             </p:childTnLst>
                           </p:cTn>
                         </p:par>
+                        <p:par>
+                          <p:cTn id="14" fill="hold">
+                            <p:stCondLst>
+                              <p:cond delay="3000"/>
+                            </p:stCondLst>
+                            <p:childTnLst>
+                              <p:par>
+                                <p:cTn id="15" presetID="1" presetClass="mediacall" presetSubtype="0" fill="hold" nodeType="afterEffect">
+                                  <p:stCondLst>
+                                    <p:cond delay="0"/>
+                                  </p:stCondLst>
+                                  <p:childTnLst>
+                                    <p:cmd type="call" cmd="playFrom(0.0)">
+                                      <p:cBhvr>
+                                        <p:cTn id="16" dur="3367" fill="hold"/>
+                                        <p:tgtEl>
+                                          <p:spTgt spid="6"/>
+                                        </p:tgtEl>
+                                      </p:cBhvr>
+                                    </p:cmd>
+                                  </p:childTnLst>
+                                </p:cTn>
+                              </p:par>
+                            </p:childTnLst>
+                          </p:cTn>
+                        </p:par>
                       </p:childTnLst>
                     </p:cTn>
                   </p:par>
@@ -6405,6 +6459,35 @@
                 </p:cond>
               </p:nextCondLst>
             </p:seq>
+            <p:audio>
+              <p:cMediaNode vol="80000">
+                <p:cTn id="17" fill="hold" display="0">
+                  <p:stCondLst>
+                    <p:cond delay="indefinite"/>
+                  </p:stCondLst>
+                  <p:endCondLst>
+                    <p:cond evt="onNext" delay="0">
+                      <p:tgtEl>
+                        <p:sldTgt/>
+                      </p:tgtEl>
+                    </p:cond>
+                    <p:cond evt="onPrev" delay="0">
+                      <p:tgtEl>
+                        <p:sldTgt/>
+                      </p:tgtEl>
+                    </p:cond>
+                    <p:cond evt="onStopAudio" delay="0">
+                      <p:tgtEl>
+                        <p:sldTgt/>
+                      </p:tgtEl>
+                    </p:cond>
+                  </p:endCondLst>
+                </p:cTn>
+                <p:tgtEl>
+                  <p:spTgt spid="6"/>
+                </p:tgtEl>
+              </p:cMediaNode>
+            </p:audio>
           </p:childTnLst>
         </p:cTn>
       </p:par>
@@ -6854,13 +6937,7 @@
               <a:rPr lang="en-AU" dirty="0" smtClean="0">
                 <a:hlinkClick r:id="rId3"/>
               </a:rPr>
-              <a:t>http://</a:t>
-            </a:r>
-            <a:r>
-              <a:rPr lang="en-AU" dirty="0" smtClean="0">
-                <a:hlinkClick r:id="rId3"/>
-              </a:rPr>
-              <a:t>www.code-magazine.com/article.aspx?quickid=0805061</a:t>
+              <a:t>http://www.code-magazine.com/article.aspx?quickid=0805061</a:t>
             </a:r>
             <a:endParaRPr lang="en-AU" dirty="0" smtClean="0"/>
           </a:p>

</xml_diff>

<commit_message>
minor changes to ppt and specs
</commit_message>
<xml_diff>
--- a/storyq/Behaviour-Driven Development.pptx
+++ b/storyq/Behaviour-Driven Development.pptx
@@ -5,7 +5,7 @@
     <p:sldMasterId id="2147483648" r:id="rId1"/>
   </p:sldMasterIdLst>
   <p:notesMasterIdLst>
-    <p:notesMasterId r:id="rId19"/>
+    <p:notesMasterId r:id="rId20"/>
   </p:notesMasterIdLst>
   <p:sldIdLst>
     <p:sldId id="256" r:id="rId2"/>
@@ -17,14 +17,15 @@
     <p:sldId id="273" r:id="rId8"/>
     <p:sldId id="274" r:id="rId9"/>
     <p:sldId id="275" r:id="rId10"/>
-    <p:sldId id="266" r:id="rId11"/>
-    <p:sldId id="260" r:id="rId12"/>
-    <p:sldId id="264" r:id="rId13"/>
-    <p:sldId id="276" r:id="rId14"/>
-    <p:sldId id="277" r:id="rId15"/>
-    <p:sldId id="278" r:id="rId16"/>
-    <p:sldId id="267" r:id="rId17"/>
-    <p:sldId id="272" r:id="rId18"/>
+    <p:sldId id="279" r:id="rId11"/>
+    <p:sldId id="266" r:id="rId12"/>
+    <p:sldId id="260" r:id="rId13"/>
+    <p:sldId id="264" r:id="rId14"/>
+    <p:sldId id="276" r:id="rId15"/>
+    <p:sldId id="277" r:id="rId16"/>
+    <p:sldId id="278" r:id="rId17"/>
+    <p:sldId id="267" r:id="rId18"/>
+    <p:sldId id="272" r:id="rId19"/>
   </p:sldIdLst>
   <p:sldSz cx="9144000" cy="6858000" type="screen4x3"/>
   <p:notesSz cx="6858000" cy="9144000"/>
@@ -9148,7 +9149,7 @@
             <a:fld id="{86A6A338-5E60-4AC9-B283-A898931FB0A1}" type="datetimeFigureOut">
               <a:rPr lang="en-AU" smtClean="0"/>
               <a:pPr/>
-              <a:t>20/11/2010</a:t>
+              <a:t>21/11/2010</a:t>
             </a:fld>
             <a:endParaRPr lang="en-AU"/>
           </a:p>
@@ -9865,7 +9866,7 @@
             <a:fld id="{9965E4C6-BEFA-461A-9D1C-3128EBE9C339}" type="slidenum">
               <a:rPr lang="en-AU" smtClean="0"/>
               <a:pPr/>
-              <a:t>12</a:t>
+              <a:t>13</a:t>
             </a:fld>
             <a:endParaRPr lang="en-AU"/>
           </a:p>
@@ -10061,7 +10062,7 @@
             <a:fld id="{56F824FB-4E7C-457B-8E7E-4E137938C231}" type="datetimeFigureOut">
               <a:rPr lang="en-AU" smtClean="0"/>
               <a:pPr/>
-              <a:t>20/11/2010</a:t>
+              <a:t>21/11/2010</a:t>
             </a:fld>
             <a:endParaRPr lang="en-AU"/>
           </a:p>
@@ -10228,7 +10229,7 @@
             <a:fld id="{56F824FB-4E7C-457B-8E7E-4E137938C231}" type="datetimeFigureOut">
               <a:rPr lang="en-AU" smtClean="0"/>
               <a:pPr/>
-              <a:t>20/11/2010</a:t>
+              <a:t>21/11/2010</a:t>
             </a:fld>
             <a:endParaRPr lang="en-AU"/>
           </a:p>
@@ -10405,7 +10406,7 @@
             <a:fld id="{56F824FB-4E7C-457B-8E7E-4E137938C231}" type="datetimeFigureOut">
               <a:rPr lang="en-AU" smtClean="0"/>
               <a:pPr/>
-              <a:t>20/11/2010</a:t>
+              <a:t>21/11/2010</a:t>
             </a:fld>
             <a:endParaRPr lang="en-AU"/>
           </a:p>
@@ -10572,7 +10573,7 @@
             <a:fld id="{56F824FB-4E7C-457B-8E7E-4E137938C231}" type="datetimeFigureOut">
               <a:rPr lang="en-AU" smtClean="0"/>
               <a:pPr/>
-              <a:t>20/11/2010</a:t>
+              <a:t>21/11/2010</a:t>
             </a:fld>
             <a:endParaRPr lang="en-AU"/>
           </a:p>
@@ -10815,7 +10816,7 @@
             <a:fld id="{56F824FB-4E7C-457B-8E7E-4E137938C231}" type="datetimeFigureOut">
               <a:rPr lang="en-AU" smtClean="0"/>
               <a:pPr/>
-              <a:t>20/11/2010</a:t>
+              <a:t>21/11/2010</a:t>
             </a:fld>
             <a:endParaRPr lang="en-AU"/>
           </a:p>
@@ -11100,7 +11101,7 @@
             <a:fld id="{56F824FB-4E7C-457B-8E7E-4E137938C231}" type="datetimeFigureOut">
               <a:rPr lang="en-AU" smtClean="0"/>
               <a:pPr/>
-              <a:t>20/11/2010</a:t>
+              <a:t>21/11/2010</a:t>
             </a:fld>
             <a:endParaRPr lang="en-AU"/>
           </a:p>
@@ -11519,7 +11520,7 @@
             <a:fld id="{56F824FB-4E7C-457B-8E7E-4E137938C231}" type="datetimeFigureOut">
               <a:rPr lang="en-AU" smtClean="0"/>
               <a:pPr/>
-              <a:t>20/11/2010</a:t>
+              <a:t>21/11/2010</a:t>
             </a:fld>
             <a:endParaRPr lang="en-AU"/>
           </a:p>
@@ -11634,7 +11635,7 @@
             <a:fld id="{56F824FB-4E7C-457B-8E7E-4E137938C231}" type="datetimeFigureOut">
               <a:rPr lang="en-AU" smtClean="0"/>
               <a:pPr/>
-              <a:t>20/11/2010</a:t>
+              <a:t>21/11/2010</a:t>
             </a:fld>
             <a:endParaRPr lang="en-AU"/>
           </a:p>
@@ -11726,7 +11727,7 @@
             <a:fld id="{56F824FB-4E7C-457B-8E7E-4E137938C231}" type="datetimeFigureOut">
               <a:rPr lang="en-AU" smtClean="0"/>
               <a:pPr/>
-              <a:t>20/11/2010</a:t>
+              <a:t>21/11/2010</a:t>
             </a:fld>
             <a:endParaRPr lang="en-AU"/>
           </a:p>
@@ -12000,7 +12001,7 @@
             <a:fld id="{56F824FB-4E7C-457B-8E7E-4E137938C231}" type="datetimeFigureOut">
               <a:rPr lang="en-AU" smtClean="0"/>
               <a:pPr/>
-              <a:t>20/11/2010</a:t>
+              <a:t>21/11/2010</a:t>
             </a:fld>
             <a:endParaRPr lang="en-AU"/>
           </a:p>
@@ -12250,7 +12251,7 @@
             <a:fld id="{56F824FB-4E7C-457B-8E7E-4E137938C231}" type="datetimeFigureOut">
               <a:rPr lang="en-AU" smtClean="0"/>
               <a:pPr/>
-              <a:t>20/11/2010</a:t>
+              <a:t>21/11/2010</a:t>
             </a:fld>
             <a:endParaRPr lang="en-AU"/>
           </a:p>
@@ -12460,7 +12461,7 @@
             <a:fld id="{56F824FB-4E7C-457B-8E7E-4E137938C231}" type="datetimeFigureOut">
               <a:rPr lang="en-AU" smtClean="0"/>
               <a:pPr/>
-              <a:t>20/11/2010</a:t>
+              <a:t>21/11/2010</a:t>
             </a:fld>
             <a:endParaRPr lang="en-AU"/>
           </a:p>
@@ -13152,6 +13153,372 @@
           <a:lstStyle/>
           <a:p>
             <a:r>
+              <a:rPr lang="en-AU" dirty="0" smtClean="0"/>
+              <a:t>Domain Specific Languages</a:t>
+            </a:r>
+            <a:endParaRPr lang="en-AU" dirty="0"/>
+          </a:p>
+        </p:txBody>
+      </p:sp>
+      <p:sp>
+        <p:nvSpPr>
+          <p:cNvPr id="3" name="Content Placeholder 2"/>
+          <p:cNvSpPr>
+            <a:spLocks noGrp="1"/>
+          </p:cNvSpPr>
+          <p:nvPr>
+            <p:ph idx="1"/>
+          </p:nvPr>
+        </p:nvSpPr>
+        <p:spPr/>
+        <p:txBody>
+          <a:bodyPr/>
+          <a:lstStyle/>
+          <a:p>
+            <a:r>
+              <a:rPr lang="en-AU" dirty="0" smtClean="0"/>
+              <a:t>Special purpose language</a:t>
+            </a:r>
+          </a:p>
+          <a:p>
+            <a:r>
+              <a:rPr lang="en-AU" dirty="0" smtClean="0"/>
+              <a:t>Internal or external</a:t>
+            </a:r>
+          </a:p>
+          <a:p>
+            <a:r>
+              <a:rPr lang="en-AU" dirty="0" smtClean="0"/>
+              <a:t>SQL</a:t>
+            </a:r>
+          </a:p>
+          <a:p>
+            <a:r>
+              <a:rPr lang="en-AU" dirty="0" smtClean="0"/>
+              <a:t>CSS</a:t>
+            </a:r>
+            <a:endParaRPr lang="en-AU" dirty="0"/>
+          </a:p>
+        </p:txBody>
+      </p:sp>
+    </p:spTree>
+  </p:cSld>
+  <p:clrMapOvr>
+    <a:masterClrMapping/>
+  </p:clrMapOvr>
+  <p:timing>
+    <p:tnLst>
+      <p:par>
+        <p:cTn id="1" dur="indefinite" restart="never" nodeType="tmRoot">
+          <p:childTnLst>
+            <p:seq concurrent="1" nextAc="seek">
+              <p:cTn id="2" dur="indefinite" nodeType="mainSeq">
+                <p:childTnLst>
+                  <p:par>
+                    <p:cTn id="3" fill="hold">
+                      <p:stCondLst>
+                        <p:cond delay="indefinite"/>
+                      </p:stCondLst>
+                      <p:childTnLst>
+                        <p:par>
+                          <p:cTn id="4" fill="hold">
+                            <p:stCondLst>
+                              <p:cond delay="0"/>
+                            </p:stCondLst>
+                            <p:childTnLst>
+                              <p:par>
+                                <p:cTn id="5" presetID="10" presetClass="entr" presetSubtype="0" fill="hold" grpId="0" nodeType="clickEffect">
+                                  <p:stCondLst>
+                                    <p:cond delay="0"/>
+                                  </p:stCondLst>
+                                  <p:childTnLst>
+                                    <p:set>
+                                      <p:cBhvr>
+                                        <p:cTn id="6" dur="1" fill="hold">
+                                          <p:stCondLst>
+                                            <p:cond delay="0"/>
+                                          </p:stCondLst>
+                                        </p:cTn>
+                                        <p:tgtEl>
+                                          <p:spTgt spid="3">
+                                            <p:txEl>
+                                              <p:pRg st="0" end="0"/>
+                                            </p:txEl>
+                                          </p:spTgt>
+                                        </p:tgtEl>
+                                        <p:attrNameLst>
+                                          <p:attrName>style.visibility</p:attrName>
+                                        </p:attrNameLst>
+                                      </p:cBhvr>
+                                      <p:to>
+                                        <p:strVal val="visible"/>
+                                      </p:to>
+                                    </p:set>
+                                    <p:animEffect transition="in" filter="fade">
+                                      <p:cBhvr>
+                                        <p:cTn id="7" dur="2000"/>
+                                        <p:tgtEl>
+                                          <p:spTgt spid="3">
+                                            <p:txEl>
+                                              <p:pRg st="0" end="0"/>
+                                            </p:txEl>
+                                          </p:spTgt>
+                                        </p:tgtEl>
+                                      </p:cBhvr>
+                                    </p:animEffect>
+                                  </p:childTnLst>
+                                </p:cTn>
+                              </p:par>
+                            </p:childTnLst>
+                          </p:cTn>
+                        </p:par>
+                      </p:childTnLst>
+                    </p:cTn>
+                  </p:par>
+                  <p:par>
+                    <p:cTn id="8" fill="hold">
+                      <p:stCondLst>
+                        <p:cond delay="indefinite"/>
+                      </p:stCondLst>
+                      <p:childTnLst>
+                        <p:par>
+                          <p:cTn id="9" fill="hold">
+                            <p:stCondLst>
+                              <p:cond delay="0"/>
+                            </p:stCondLst>
+                            <p:childTnLst>
+                              <p:par>
+                                <p:cTn id="10" presetID="10" presetClass="entr" presetSubtype="0" fill="hold" grpId="0" nodeType="clickEffect">
+                                  <p:stCondLst>
+                                    <p:cond delay="0"/>
+                                  </p:stCondLst>
+                                  <p:childTnLst>
+                                    <p:set>
+                                      <p:cBhvr>
+                                        <p:cTn id="11" dur="1" fill="hold">
+                                          <p:stCondLst>
+                                            <p:cond delay="0"/>
+                                          </p:stCondLst>
+                                        </p:cTn>
+                                        <p:tgtEl>
+                                          <p:spTgt spid="3">
+                                            <p:txEl>
+                                              <p:pRg st="1" end="1"/>
+                                            </p:txEl>
+                                          </p:spTgt>
+                                        </p:tgtEl>
+                                        <p:attrNameLst>
+                                          <p:attrName>style.visibility</p:attrName>
+                                        </p:attrNameLst>
+                                      </p:cBhvr>
+                                      <p:to>
+                                        <p:strVal val="visible"/>
+                                      </p:to>
+                                    </p:set>
+                                    <p:animEffect transition="in" filter="fade">
+                                      <p:cBhvr>
+                                        <p:cTn id="12" dur="2000"/>
+                                        <p:tgtEl>
+                                          <p:spTgt spid="3">
+                                            <p:txEl>
+                                              <p:pRg st="1" end="1"/>
+                                            </p:txEl>
+                                          </p:spTgt>
+                                        </p:tgtEl>
+                                      </p:cBhvr>
+                                    </p:animEffect>
+                                  </p:childTnLst>
+                                </p:cTn>
+                              </p:par>
+                            </p:childTnLst>
+                          </p:cTn>
+                        </p:par>
+                      </p:childTnLst>
+                    </p:cTn>
+                  </p:par>
+                  <p:par>
+                    <p:cTn id="13" fill="hold">
+                      <p:stCondLst>
+                        <p:cond delay="indefinite"/>
+                      </p:stCondLst>
+                      <p:childTnLst>
+                        <p:par>
+                          <p:cTn id="14" fill="hold">
+                            <p:stCondLst>
+                              <p:cond delay="0"/>
+                            </p:stCondLst>
+                            <p:childTnLst>
+                              <p:par>
+                                <p:cTn id="15" presetID="10" presetClass="entr" presetSubtype="0" fill="hold" grpId="0" nodeType="clickEffect">
+                                  <p:stCondLst>
+                                    <p:cond delay="0"/>
+                                  </p:stCondLst>
+                                  <p:childTnLst>
+                                    <p:set>
+                                      <p:cBhvr>
+                                        <p:cTn id="16" dur="1" fill="hold">
+                                          <p:stCondLst>
+                                            <p:cond delay="0"/>
+                                          </p:stCondLst>
+                                        </p:cTn>
+                                        <p:tgtEl>
+                                          <p:spTgt spid="3">
+                                            <p:txEl>
+                                              <p:pRg st="2" end="2"/>
+                                            </p:txEl>
+                                          </p:spTgt>
+                                        </p:tgtEl>
+                                        <p:attrNameLst>
+                                          <p:attrName>style.visibility</p:attrName>
+                                        </p:attrNameLst>
+                                      </p:cBhvr>
+                                      <p:to>
+                                        <p:strVal val="visible"/>
+                                      </p:to>
+                                    </p:set>
+                                    <p:animEffect transition="in" filter="fade">
+                                      <p:cBhvr>
+                                        <p:cTn id="17" dur="2000"/>
+                                        <p:tgtEl>
+                                          <p:spTgt spid="3">
+                                            <p:txEl>
+                                              <p:pRg st="2" end="2"/>
+                                            </p:txEl>
+                                          </p:spTgt>
+                                        </p:tgtEl>
+                                      </p:cBhvr>
+                                    </p:animEffect>
+                                  </p:childTnLst>
+                                </p:cTn>
+                              </p:par>
+                            </p:childTnLst>
+                          </p:cTn>
+                        </p:par>
+                      </p:childTnLst>
+                    </p:cTn>
+                  </p:par>
+                  <p:par>
+                    <p:cTn id="18" fill="hold">
+                      <p:stCondLst>
+                        <p:cond delay="indefinite"/>
+                      </p:stCondLst>
+                      <p:childTnLst>
+                        <p:par>
+                          <p:cTn id="19" fill="hold">
+                            <p:stCondLst>
+                              <p:cond delay="0"/>
+                            </p:stCondLst>
+                            <p:childTnLst>
+                              <p:par>
+                                <p:cTn id="20" presetID="10" presetClass="entr" presetSubtype="0" fill="hold" grpId="0" nodeType="clickEffect">
+                                  <p:stCondLst>
+                                    <p:cond delay="0"/>
+                                  </p:stCondLst>
+                                  <p:childTnLst>
+                                    <p:set>
+                                      <p:cBhvr>
+                                        <p:cTn id="21" dur="1" fill="hold">
+                                          <p:stCondLst>
+                                            <p:cond delay="0"/>
+                                          </p:stCondLst>
+                                        </p:cTn>
+                                        <p:tgtEl>
+                                          <p:spTgt spid="3">
+                                            <p:txEl>
+                                              <p:pRg st="3" end="3"/>
+                                            </p:txEl>
+                                          </p:spTgt>
+                                        </p:tgtEl>
+                                        <p:attrNameLst>
+                                          <p:attrName>style.visibility</p:attrName>
+                                        </p:attrNameLst>
+                                      </p:cBhvr>
+                                      <p:to>
+                                        <p:strVal val="visible"/>
+                                      </p:to>
+                                    </p:set>
+                                    <p:animEffect transition="in" filter="fade">
+                                      <p:cBhvr>
+                                        <p:cTn id="22" dur="2000"/>
+                                        <p:tgtEl>
+                                          <p:spTgt spid="3">
+                                            <p:txEl>
+                                              <p:pRg st="3" end="3"/>
+                                            </p:txEl>
+                                          </p:spTgt>
+                                        </p:tgtEl>
+                                      </p:cBhvr>
+                                    </p:animEffect>
+                                  </p:childTnLst>
+                                </p:cTn>
+                              </p:par>
+                            </p:childTnLst>
+                          </p:cTn>
+                        </p:par>
+                      </p:childTnLst>
+                    </p:cTn>
+                  </p:par>
+                </p:childTnLst>
+              </p:cTn>
+              <p:prevCondLst>
+                <p:cond evt="onPrev" delay="0">
+                  <p:tgtEl>
+                    <p:sldTgt/>
+                  </p:tgtEl>
+                </p:cond>
+              </p:prevCondLst>
+              <p:nextCondLst>
+                <p:cond evt="onNext" delay="0">
+                  <p:tgtEl>
+                    <p:sldTgt/>
+                  </p:tgtEl>
+                </p:cond>
+              </p:nextCondLst>
+            </p:seq>
+          </p:childTnLst>
+        </p:cTn>
+      </p:par>
+    </p:tnLst>
+    <p:bldLst>
+      <p:bldP spid="3" grpId="0" build="p"/>
+    </p:bldLst>
+  </p:timing>
+</p:sld>
+</file>
+
+<file path=ppt/slides/slide11.xml><?xml version="1.0" encoding="utf-8"?>
+<p:sld xmlns:a="http://schemas.openxmlformats.org/drawingml/2006/main" xmlns:r="http://schemas.openxmlformats.org/officeDocument/2006/relationships" xmlns:p="http://schemas.openxmlformats.org/presentationml/2006/main">
+  <p:cSld>
+    <p:spTree>
+      <p:nvGrpSpPr>
+        <p:cNvPr id="1" name=""/>
+        <p:cNvGrpSpPr/>
+        <p:nvPr/>
+      </p:nvGrpSpPr>
+      <p:grpSpPr>
+        <a:xfrm>
+          <a:off x="0" y="0"/>
+          <a:ext cx="0" cy="0"/>
+          <a:chOff x="0" y="0"/>
+          <a:chExt cx="0" cy="0"/>
+        </a:xfrm>
+      </p:grpSpPr>
+      <p:sp>
+        <p:nvSpPr>
+          <p:cNvPr id="2" name="Title 1"/>
+          <p:cNvSpPr>
+            <a:spLocks noGrp="1"/>
+          </p:cNvSpPr>
+          <p:nvPr>
+            <p:ph type="title"/>
+          </p:nvPr>
+        </p:nvSpPr>
+        <p:spPr/>
+        <p:txBody>
+          <a:bodyPr/>
+          <a:lstStyle/>
+          <a:p>
+            <a:r>
               <a:rPr lang="en-AU" dirty="0" err="1" smtClean="0"/>
               <a:t>StoryQ</a:t>
             </a:r>
@@ -13256,7 +13623,7 @@
 </p:sld>
 </file>
 
-<file path=ppt/slides/slide11.xml><?xml version="1.0" encoding="utf-8"?>
+<file path=ppt/slides/slide12.xml><?xml version="1.0" encoding="utf-8"?>
 <p:sld xmlns:a="http://schemas.openxmlformats.org/drawingml/2006/main" xmlns:r="http://schemas.openxmlformats.org/officeDocument/2006/relationships" xmlns:p="http://schemas.openxmlformats.org/presentationml/2006/main">
   <p:cSld>
     <p:spTree>
@@ -14519,7 +14886,7 @@
 </p:sld>
 </file>
 
-<file path=ppt/slides/slide12.xml><?xml version="1.0" encoding="utf-8"?>
+<file path=ppt/slides/slide13.xml><?xml version="1.0" encoding="utf-8"?>
 <p:sld xmlns:a="http://schemas.openxmlformats.org/drawingml/2006/main" xmlns:r="http://schemas.openxmlformats.org/officeDocument/2006/relationships" xmlns:p="http://schemas.openxmlformats.org/presentationml/2006/main">
   <p:cSld>
     <p:spTree>
@@ -15744,76 +16111,6 @@
 </p:sld>
 </file>
 
-<file path=ppt/slides/slide13.xml><?xml version="1.0" encoding="utf-8"?>
-<p:sld xmlns:a="http://schemas.openxmlformats.org/drawingml/2006/main" xmlns:r="http://schemas.openxmlformats.org/officeDocument/2006/relationships" xmlns:p="http://schemas.openxmlformats.org/presentationml/2006/main">
-  <p:cSld>
-    <p:spTree>
-      <p:nvGrpSpPr>
-        <p:cNvPr id="1" name=""/>
-        <p:cNvGrpSpPr/>
-        <p:nvPr/>
-      </p:nvGrpSpPr>
-      <p:grpSpPr>
-        <a:xfrm>
-          <a:off x="0" y="0"/>
-          <a:ext cx="0" cy="0"/>
-          <a:chOff x="0" y="0"/>
-          <a:chExt cx="0" cy="0"/>
-        </a:xfrm>
-      </p:grpSpPr>
-      <p:sp>
-        <p:nvSpPr>
-          <p:cNvPr id="2" name="Title 1"/>
-          <p:cNvSpPr>
-            <a:spLocks noGrp="1"/>
-          </p:cNvSpPr>
-          <p:nvPr>
-            <p:ph type="title"/>
-          </p:nvPr>
-        </p:nvSpPr>
-        <p:spPr/>
-        <p:txBody>
-          <a:bodyPr/>
-          <a:lstStyle/>
-          <a:p>
-            <a:endParaRPr lang="en-AU"/>
-          </a:p>
-        </p:txBody>
-      </p:sp>
-      <p:sp>
-        <p:nvSpPr>
-          <p:cNvPr id="3" name="Content Placeholder 2"/>
-          <p:cNvSpPr>
-            <a:spLocks noGrp="1"/>
-          </p:cNvSpPr>
-          <p:nvPr>
-            <p:ph idx="1"/>
-          </p:nvPr>
-        </p:nvSpPr>
-        <p:spPr/>
-        <p:txBody>
-          <a:bodyPr/>
-          <a:lstStyle/>
-          <a:p>
-            <a:endParaRPr lang="en-AU"/>
-          </a:p>
-        </p:txBody>
-      </p:sp>
-    </p:spTree>
-  </p:cSld>
-  <p:clrMapOvr>
-    <a:masterClrMapping/>
-  </p:clrMapOvr>
-  <p:timing>
-    <p:tnLst>
-      <p:par>
-        <p:cTn id="1" dur="indefinite" restart="never" nodeType="tmRoot"/>
-      </p:par>
-    </p:tnLst>
-  </p:timing>
-</p:sld>
-</file>
-
 <file path=ppt/slides/slide14.xml><?xml version="1.0" encoding="utf-8"?>
 <p:sld xmlns:a="http://schemas.openxmlformats.org/drawingml/2006/main" xmlns:r="http://schemas.openxmlformats.org/officeDocument/2006/relationships" xmlns:p="http://schemas.openxmlformats.org/presentationml/2006/main">
   <p:cSld>
@@ -15846,11 +16143,7 @@
           <a:bodyPr/>
           <a:lstStyle/>
           <a:p>
-            <a:r>
-              <a:rPr lang="en-AU" dirty="0" smtClean="0"/>
-              <a:t>User Story</a:t>
-            </a:r>
-            <a:endParaRPr lang="en-AU" dirty="0"/>
+            <a:endParaRPr lang="en-AU"/>
           </a:p>
         </p:txBody>
       </p:sp>
@@ -15869,6 +16162,80 @@
           <a:bodyPr/>
           <a:lstStyle/>
           <a:p>
+            <a:endParaRPr lang="en-AU"/>
+          </a:p>
+        </p:txBody>
+      </p:sp>
+    </p:spTree>
+  </p:cSld>
+  <p:clrMapOvr>
+    <a:masterClrMapping/>
+  </p:clrMapOvr>
+  <p:timing>
+    <p:tnLst>
+      <p:par>
+        <p:cTn id="1" dur="indefinite" restart="never" nodeType="tmRoot"/>
+      </p:par>
+    </p:tnLst>
+  </p:timing>
+</p:sld>
+</file>
+
+<file path=ppt/slides/slide15.xml><?xml version="1.0" encoding="utf-8"?>
+<p:sld xmlns:a="http://schemas.openxmlformats.org/drawingml/2006/main" xmlns:r="http://schemas.openxmlformats.org/officeDocument/2006/relationships" xmlns:p="http://schemas.openxmlformats.org/presentationml/2006/main">
+  <p:cSld>
+    <p:spTree>
+      <p:nvGrpSpPr>
+        <p:cNvPr id="1" name=""/>
+        <p:cNvGrpSpPr/>
+        <p:nvPr/>
+      </p:nvGrpSpPr>
+      <p:grpSpPr>
+        <a:xfrm>
+          <a:off x="0" y="0"/>
+          <a:ext cx="0" cy="0"/>
+          <a:chOff x="0" y="0"/>
+          <a:chExt cx="0" cy="0"/>
+        </a:xfrm>
+      </p:grpSpPr>
+      <p:sp>
+        <p:nvSpPr>
+          <p:cNvPr id="2" name="Title 1"/>
+          <p:cNvSpPr>
+            <a:spLocks noGrp="1"/>
+          </p:cNvSpPr>
+          <p:nvPr>
+            <p:ph type="title"/>
+          </p:nvPr>
+        </p:nvSpPr>
+        <p:spPr/>
+        <p:txBody>
+          <a:bodyPr/>
+          <a:lstStyle/>
+          <a:p>
+            <a:r>
+              <a:rPr lang="en-AU" dirty="0" smtClean="0"/>
+              <a:t>User Story</a:t>
+            </a:r>
+            <a:endParaRPr lang="en-AU" dirty="0"/>
+          </a:p>
+        </p:txBody>
+      </p:sp>
+      <p:sp>
+        <p:nvSpPr>
+          <p:cNvPr id="3" name="Content Placeholder 2"/>
+          <p:cNvSpPr>
+            <a:spLocks noGrp="1"/>
+          </p:cNvSpPr>
+          <p:nvPr>
+            <p:ph idx="1"/>
+          </p:nvPr>
+        </p:nvSpPr>
+        <p:spPr/>
+        <p:txBody>
+          <a:bodyPr/>
+          <a:lstStyle/>
+          <a:p>
             <a:pPr lvl="0">
               <a:buNone/>
             </a:pPr>
@@ -15915,11 +16282,7 @@
             </a:r>
             <a:r>
               <a:rPr lang="en-AU" dirty="0" smtClean="0"/>
-              <a:t>access </a:t>
-            </a:r>
-            <a:r>
-              <a:rPr lang="en-AU" dirty="0" smtClean="0"/>
-              <a:t>secure resources</a:t>
+              <a:t>access secure resources</a:t>
             </a:r>
           </a:p>
           <a:p>
@@ -15969,11 +16332,7 @@
             </a:r>
             <a:r>
               <a:rPr lang="en-AU" dirty="0" smtClean="0"/>
-              <a:t>sign </a:t>
-            </a:r>
-            <a:r>
-              <a:rPr lang="en-AU" dirty="0" smtClean="0"/>
-              <a:t>in</a:t>
+              <a:t>sign in</a:t>
             </a:r>
           </a:p>
           <a:p>
@@ -16298,7 +16657,7 @@
 </p:sld>
 </file>
 
-<file path=ppt/slides/slide15.xml><?xml version="1.0" encoding="utf-8"?>
+<file path=ppt/slides/slide16.xml><?xml version="1.0" encoding="utf-8"?>
 <p:sld xmlns:a="http://schemas.openxmlformats.org/drawingml/2006/main" xmlns:r="http://schemas.openxmlformats.org/officeDocument/2006/relationships" xmlns:p="http://schemas.openxmlformats.org/presentationml/2006/main">
   <p:cSld>
     <p:spTree>
@@ -16368,13 +16727,8 @@
             </a:r>
             <a:r>
               <a:rPr lang="en-AU" dirty="0" smtClean="0"/>
-              <a:t>authenticate </a:t>
-            </a:r>
-            <a:r>
-              <a:rPr lang="en-AU" dirty="0" smtClean="0"/>
-              <a:t>with correct credentials</a:t>
-            </a:r>
-            <a:endParaRPr lang="en-AU" dirty="0" smtClean="0"/>
+              <a:t>authenticate with correct credentials</a:t>
+            </a:r>
           </a:p>
           <a:p>
             <a:pPr lvl="0">
@@ -16475,7 +16829,6 @@
               <a:rPr lang="en-AU" dirty="0" smtClean="0"/>
               <a:t> authentication fails</a:t>
             </a:r>
-            <a:endParaRPr lang="en-AU" dirty="0" smtClean="0"/>
           </a:p>
           <a:p>
             <a:pPr>
@@ -16831,7 +17184,7 @@
 </p:sld>
 </file>
 
-<file path=ppt/slides/slide16.xml><?xml version="1.0" encoding="utf-8"?>
+<file path=ppt/slides/slide17.xml><?xml version="1.0" encoding="utf-8"?>
 <p:sld xmlns:a="http://schemas.openxmlformats.org/drawingml/2006/main" xmlns:r="http://schemas.openxmlformats.org/officeDocument/2006/relationships" xmlns:p="http://schemas.openxmlformats.org/presentationml/2006/main">
   <p:cSld>
     <p:spTree>
@@ -16939,7 +17292,7 @@
 </p:sld>
 </file>
 
-<file path=ppt/slides/slide17.xml><?xml version="1.0" encoding="utf-8"?>
+<file path=ppt/slides/slide18.xml><?xml version="1.0" encoding="utf-8"?>
 <p:sld xmlns:a="http://schemas.openxmlformats.org/drawingml/2006/main" xmlns:r="http://schemas.openxmlformats.org/officeDocument/2006/relationships" xmlns:p="http://schemas.openxmlformats.org/presentationml/2006/main">
   <p:cSld>
     <p:spTree>

</xml_diff>